<commit_message>
Update 1st Half on Proposal_Group&.pptx
</commit_message>
<xml_diff>
--- a/Documentation/Proposal/Proposal_Group7.pptx
+++ b/Documentation/Proposal/Proposal_Group7.pptx
@@ -6,6 +6,12 @@
   </p:sldMasterIdLst>
   <p:sldIdLst>
     <p:sldId id="256" r:id="rId2"/>
+    <p:sldId id="257" r:id="rId3"/>
+    <p:sldId id="259" r:id="rId4"/>
+    <p:sldId id="260" r:id="rId5"/>
+    <p:sldId id="261" r:id="rId6"/>
+    <p:sldId id="262" r:id="rId7"/>
+    <p:sldId id="263" r:id="rId8"/>
   </p:sldIdLst>
   <p:sldSz cx="12192000" cy="6858000"/>
   <p:notesSz cx="6858000" cy="9144000"/>
@@ -104,6 +110,11 @@
       </a:defRPr>
     </a:lvl9pPr>
   </p:defaultTextStyle>
+  <p:extLst>
+    <p:ext uri="{EFAFB233-063F-42B5-8137-9DF3F51BA10A}">
+      <p15:sldGuideLst xmlns:p15="http://schemas.microsoft.com/office/powerpoint/2012/main"/>
+    </p:ext>
+  </p:extLst>
 </p:presentation>
 </file>
 
@@ -599,7 +610,7 @@
           </a:lstStyle>
           <a:p>
             <a:r>
-              <a:rPr lang="en-US" smtClean="0"/>
+              <a:rPr lang="en-US"/>
               <a:t>Click to edit Master title style</a:t>
             </a:r>
             <a:endParaRPr lang="en-US" dirty="0"/>
@@ -716,7 +727,7 @@
           </a:lstStyle>
           <a:p>
             <a:r>
-              <a:rPr lang="en-US" smtClean="0"/>
+              <a:rPr lang="en-US"/>
               <a:t>Click to edit Master subtitle style</a:t>
             </a:r>
             <a:endParaRPr lang="en-US" dirty="0"/>
@@ -753,7 +764,7 @@
           <a:p>
             <a:fld id="{110CAD28-65F7-48D0-9A90-0EC8C2ACC4D7}" type="datetimeFigureOut">
               <a:rPr lang="en-US" smtClean="0"/>
-              <a:t>2/17/2019</a:t>
+              <a:t>2/19/2019</a:t>
             </a:fld>
             <a:endParaRPr lang="en-US"/>
           </a:p>
@@ -1699,7 +1710,7 @@
           </a:lstStyle>
           <a:p>
             <a:r>
-              <a:rPr lang="en-US" smtClean="0"/>
+              <a:rPr lang="en-US"/>
               <a:t>Click to edit Master title style</a:t>
             </a:r>
             <a:endParaRPr lang="en-US" dirty="0"/>
@@ -1778,7 +1789,7 @@
           </a:lstStyle>
           <a:p>
             <a:r>
-              <a:rPr lang="en-US" smtClean="0"/>
+              <a:rPr lang="en-US"/>
               <a:t>Click icon to add picture</a:t>
             </a:r>
             <a:endParaRPr lang="en-US" dirty="0"/>
@@ -1850,7 +1861,7 @@
           <a:p>
             <a:pPr lvl="0"/>
             <a:r>
-              <a:rPr lang="en-US" smtClean="0"/>
+              <a:rPr lang="en-US"/>
               <a:t>Click to edit Master text styles</a:t>
             </a:r>
           </a:p>
@@ -1873,7 +1884,7 @@
           <a:p>
             <a:fld id="{110CAD28-65F7-48D0-9A90-0EC8C2ACC4D7}" type="datetimeFigureOut">
               <a:rPr lang="en-US" smtClean="0"/>
-              <a:t>2/17/2019</a:t>
+              <a:t>2/19/2019</a:t>
             </a:fld>
             <a:endParaRPr lang="en-US"/>
           </a:p>
@@ -2793,7 +2804,7 @@
           </a:lstStyle>
           <a:p>
             <a:r>
-              <a:rPr lang="en-US" smtClean="0"/>
+              <a:rPr lang="en-US"/>
               <a:t>Click to edit Master title style</a:t>
             </a:r>
             <a:endParaRPr lang="en-US" dirty="0"/>
@@ -2861,7 +2872,7 @@
           <a:p>
             <a:pPr lvl="0"/>
             <a:r>
-              <a:rPr lang="en-US" smtClean="0"/>
+              <a:rPr lang="en-US"/>
               <a:t>Click to edit Master text styles</a:t>
             </a:r>
           </a:p>
@@ -2884,7 +2895,7 @@
           <a:p>
             <a:fld id="{110CAD28-65F7-48D0-9A90-0EC8C2ACC4D7}" type="datetimeFigureOut">
               <a:rPr lang="en-US" smtClean="0"/>
-              <a:t>2/17/2019</a:t>
+              <a:t>2/19/2019</a:t>
             </a:fld>
             <a:endParaRPr lang="en-US"/>
           </a:p>
@@ -3890,7 +3901,7 @@
           </a:lstStyle>
           <a:p>
             <a:r>
-              <a:rPr lang="en-US" smtClean="0"/>
+              <a:rPr lang="en-US"/>
               <a:t>Click to edit Master title style</a:t>
             </a:r>
             <a:endParaRPr lang="en-US" dirty="0"/>
@@ -3964,7 +3975,7 @@
           <a:p>
             <a:pPr lvl="0"/>
             <a:r>
-              <a:rPr lang="en-US" smtClean="0"/>
+              <a:rPr lang="en-US"/>
               <a:t>Click to edit Master text styles</a:t>
             </a:r>
           </a:p>
@@ -4031,7 +4042,7 @@
           <a:p>
             <a:pPr lvl="0"/>
             <a:r>
-              <a:rPr lang="en-US" smtClean="0"/>
+              <a:rPr lang="en-US"/>
               <a:t>Click to edit Master text styles</a:t>
             </a:r>
           </a:p>
@@ -4054,7 +4065,7 @@
           <a:p>
             <a:fld id="{110CAD28-65F7-48D0-9A90-0EC8C2ACC4D7}" type="datetimeFigureOut">
               <a:rPr lang="en-US" smtClean="0"/>
-              <a:t>2/17/2019</a:t>
+              <a:t>2/19/2019</a:t>
             </a:fld>
             <a:endParaRPr lang="en-US"/>
           </a:p>
@@ -4974,7 +4985,7 @@
           </a:lstStyle>
           <a:p>
             <a:r>
-              <a:rPr lang="en-US" smtClean="0"/>
+              <a:rPr lang="en-US"/>
               <a:t>Click to edit Master title style</a:t>
             </a:r>
             <a:endParaRPr lang="en-US" dirty="0"/>
@@ -5092,7 +5103,7 @@
           <a:p>
             <a:pPr lvl="0"/>
             <a:r>
-              <a:rPr lang="en-US" smtClean="0"/>
+              <a:rPr lang="en-US"/>
               <a:t>Click to edit Master text styles</a:t>
             </a:r>
           </a:p>
@@ -5115,7 +5126,7 @@
           <a:p>
             <a:fld id="{110CAD28-65F7-48D0-9A90-0EC8C2ACC4D7}" type="datetimeFigureOut">
               <a:rPr lang="en-US" smtClean="0"/>
-              <a:t>2/17/2019</a:t>
+              <a:t>2/19/2019</a:t>
             </a:fld>
             <a:endParaRPr lang="en-US"/>
           </a:p>
@@ -5249,7 +5260,7 @@
           </a:lstStyle>
           <a:p>
             <a:r>
-              <a:rPr lang="en-US" smtClean="0"/>
+              <a:rPr lang="en-US"/>
               <a:t>Click to edit Master title style</a:t>
             </a:r>
             <a:endParaRPr lang="en-US" dirty="0"/>
@@ -5321,7 +5332,7 @@
           <a:p>
             <a:pPr lvl="0"/>
             <a:r>
-              <a:rPr lang="en-US" smtClean="0"/>
+              <a:rPr lang="en-US"/>
               <a:t>Click to edit Master text styles</a:t>
             </a:r>
           </a:p>
@@ -5388,7 +5399,7 @@
           <a:p>
             <a:pPr lvl="0"/>
             <a:r>
-              <a:rPr lang="en-US" smtClean="0"/>
+              <a:rPr lang="en-US"/>
               <a:t>Click to edit Master text styles</a:t>
             </a:r>
           </a:p>
@@ -5459,7 +5470,7 @@
           <a:p>
             <a:pPr lvl="0"/>
             <a:r>
-              <a:rPr lang="en-US" smtClean="0"/>
+              <a:rPr lang="en-US"/>
               <a:t>Click to edit Master text styles</a:t>
             </a:r>
           </a:p>
@@ -5526,7 +5537,7 @@
           <a:p>
             <a:pPr lvl="0"/>
             <a:r>
-              <a:rPr lang="en-US" smtClean="0"/>
+              <a:rPr lang="en-US"/>
               <a:t>Click to edit Master text styles</a:t>
             </a:r>
           </a:p>
@@ -5597,7 +5608,7 @@
           <a:p>
             <a:pPr lvl="0"/>
             <a:r>
-              <a:rPr lang="en-US" smtClean="0"/>
+              <a:rPr lang="en-US"/>
               <a:t>Click to edit Master text styles</a:t>
             </a:r>
           </a:p>
@@ -5664,7 +5675,7 @@
           <a:p>
             <a:pPr lvl="0"/>
             <a:r>
-              <a:rPr lang="en-US" smtClean="0"/>
+              <a:rPr lang="en-US"/>
               <a:t>Click to edit Master text styles</a:t>
             </a:r>
           </a:p>
@@ -5761,7 +5772,7 @@
           <a:p>
             <a:fld id="{110CAD28-65F7-48D0-9A90-0EC8C2ACC4D7}" type="datetimeFigureOut">
               <a:rPr lang="en-US" smtClean="0"/>
-              <a:t>2/17/2019</a:t>
+              <a:t>2/19/2019</a:t>
             </a:fld>
             <a:endParaRPr lang="en-US"/>
           </a:p>
@@ -5859,7 +5870,7 @@
           </a:lstStyle>
           <a:p>
             <a:r>
-              <a:rPr lang="en-US" smtClean="0"/>
+              <a:rPr lang="en-US"/>
               <a:t>Click to edit Master title style</a:t>
             </a:r>
             <a:endParaRPr lang="en-US" dirty="0"/>
@@ -5931,7 +5942,7 @@
           <a:p>
             <a:pPr lvl="0"/>
             <a:r>
-              <a:rPr lang="en-US" smtClean="0"/>
+              <a:rPr lang="en-US"/>
               <a:t>Click to edit Master text styles</a:t>
             </a:r>
           </a:p>
@@ -6009,7 +6020,7 @@
           </a:lstStyle>
           <a:p>
             <a:r>
-              <a:rPr lang="en-US" smtClean="0"/>
+              <a:rPr lang="en-US"/>
               <a:t>Click icon to add picture</a:t>
             </a:r>
             <a:endParaRPr lang="en-US" dirty="0"/>
@@ -6077,7 +6088,7 @@
           <a:p>
             <a:pPr lvl="0"/>
             <a:r>
-              <a:rPr lang="en-US" smtClean="0"/>
+              <a:rPr lang="en-US"/>
               <a:t>Click to edit Master text styles</a:t>
             </a:r>
           </a:p>
@@ -6148,7 +6159,7 @@
           <a:p>
             <a:pPr lvl="0"/>
             <a:r>
-              <a:rPr lang="en-US" smtClean="0"/>
+              <a:rPr lang="en-US"/>
               <a:t>Click to edit Master text styles</a:t>
             </a:r>
           </a:p>
@@ -6226,7 +6237,7 @@
           </a:lstStyle>
           <a:p>
             <a:r>
-              <a:rPr lang="en-US" smtClean="0"/>
+              <a:rPr lang="en-US"/>
               <a:t>Click icon to add picture</a:t>
             </a:r>
             <a:endParaRPr lang="en-US" dirty="0"/>
@@ -6294,7 +6305,7 @@
           <a:p>
             <a:pPr lvl="0"/>
             <a:r>
-              <a:rPr lang="en-US" smtClean="0"/>
+              <a:rPr lang="en-US"/>
               <a:t>Click to edit Master text styles</a:t>
             </a:r>
           </a:p>
@@ -6365,7 +6376,7 @@
           <a:p>
             <a:pPr lvl="0"/>
             <a:r>
-              <a:rPr lang="en-US" smtClean="0"/>
+              <a:rPr lang="en-US"/>
               <a:t>Click to edit Master text styles</a:t>
             </a:r>
           </a:p>
@@ -6443,7 +6454,7 @@
           </a:lstStyle>
           <a:p>
             <a:r>
-              <a:rPr lang="en-US" smtClean="0"/>
+              <a:rPr lang="en-US"/>
               <a:t>Click icon to add picture</a:t>
             </a:r>
             <a:endParaRPr lang="en-US" dirty="0"/>
@@ -6511,7 +6522,7 @@
           <a:p>
             <a:pPr lvl="0"/>
             <a:r>
-              <a:rPr lang="en-US" smtClean="0"/>
+              <a:rPr lang="en-US"/>
               <a:t>Click to edit Master text styles</a:t>
             </a:r>
           </a:p>
@@ -6608,7 +6619,7 @@
           <a:p>
             <a:fld id="{110CAD28-65F7-48D0-9A90-0EC8C2ACC4D7}" type="datetimeFigureOut">
               <a:rPr lang="en-US" smtClean="0"/>
-              <a:t>2/17/2019</a:t>
+              <a:t>2/19/2019</a:t>
             </a:fld>
             <a:endParaRPr lang="en-US"/>
           </a:p>
@@ -6707,7 +6718,7 @@
           <a:lstStyle/>
           <a:p>
             <a:r>
-              <a:rPr lang="en-US" smtClean="0"/>
+              <a:rPr lang="en-US"/>
               <a:t>Click to edit Master title style</a:t>
             </a:r>
             <a:endParaRPr lang="en-US" dirty="0"/>
@@ -6731,35 +6742,35 @@
           <a:p>
             <a:pPr lvl="0"/>
             <a:r>
-              <a:rPr lang="en-US" smtClean="0"/>
+              <a:rPr lang="en-US"/>
               <a:t>Click to edit Master text styles</a:t>
             </a:r>
           </a:p>
           <a:p>
             <a:pPr lvl="1"/>
             <a:r>
-              <a:rPr lang="en-US" smtClean="0"/>
+              <a:rPr lang="en-US"/>
               <a:t>Second level</a:t>
             </a:r>
           </a:p>
           <a:p>
             <a:pPr lvl="2"/>
             <a:r>
-              <a:rPr lang="en-US" smtClean="0"/>
+              <a:rPr lang="en-US"/>
               <a:t>Third level</a:t>
             </a:r>
           </a:p>
           <a:p>
             <a:pPr lvl="3"/>
             <a:r>
-              <a:rPr lang="en-US" smtClean="0"/>
+              <a:rPr lang="en-US"/>
               <a:t>Fourth level</a:t>
             </a:r>
           </a:p>
           <a:p>
             <a:pPr lvl="4"/>
             <a:r>
-              <a:rPr lang="en-US" smtClean="0"/>
+              <a:rPr lang="en-US"/>
               <a:t>Fifth level</a:t>
             </a:r>
             <a:endParaRPr lang="en-US" dirty="0"/>
@@ -6783,7 +6794,7 @@
           <a:p>
             <a:fld id="{110CAD28-65F7-48D0-9A90-0EC8C2ACC4D7}" type="datetimeFigureOut">
               <a:rPr lang="en-US" smtClean="0"/>
-              <a:t>2/17/2019</a:t>
+              <a:t>2/19/2019</a:t>
             </a:fld>
             <a:endParaRPr lang="en-US"/>
           </a:p>
@@ -7700,7 +7711,7 @@
           <a:lstStyle/>
           <a:p>
             <a:r>
-              <a:rPr lang="en-US" smtClean="0"/>
+              <a:rPr lang="en-US"/>
               <a:t>Click to edit Master title style</a:t>
             </a:r>
             <a:endParaRPr lang="en-US" dirty="0"/>
@@ -7729,35 +7740,35 @@
           <a:p>
             <a:pPr lvl="0"/>
             <a:r>
-              <a:rPr lang="en-US" smtClean="0"/>
+              <a:rPr lang="en-US"/>
               <a:t>Click to edit Master text styles</a:t>
             </a:r>
           </a:p>
           <a:p>
             <a:pPr lvl="1"/>
             <a:r>
-              <a:rPr lang="en-US" smtClean="0"/>
+              <a:rPr lang="en-US"/>
               <a:t>Second level</a:t>
             </a:r>
           </a:p>
           <a:p>
             <a:pPr lvl="2"/>
             <a:r>
-              <a:rPr lang="en-US" smtClean="0"/>
+              <a:rPr lang="en-US"/>
               <a:t>Third level</a:t>
             </a:r>
           </a:p>
           <a:p>
             <a:pPr lvl="3"/>
             <a:r>
-              <a:rPr lang="en-US" smtClean="0"/>
+              <a:rPr lang="en-US"/>
               <a:t>Fourth level</a:t>
             </a:r>
           </a:p>
           <a:p>
             <a:pPr lvl="4"/>
             <a:r>
-              <a:rPr lang="en-US" smtClean="0"/>
+              <a:rPr lang="en-US"/>
               <a:t>Fifth level</a:t>
             </a:r>
             <a:endParaRPr lang="en-US" dirty="0"/>
@@ -7781,7 +7792,7 @@
           <a:p>
             <a:fld id="{110CAD28-65F7-48D0-9A90-0EC8C2ACC4D7}" type="datetimeFigureOut">
               <a:rPr lang="en-US" smtClean="0"/>
-              <a:t>2/17/2019</a:t>
+              <a:t>2/19/2019</a:t>
             </a:fld>
             <a:endParaRPr lang="en-US"/>
           </a:p>
@@ -7911,7 +7922,7 @@
           <a:lstStyle/>
           <a:p>
             <a:r>
-              <a:rPr lang="en-US" smtClean="0"/>
+              <a:rPr lang="en-US"/>
               <a:t>Click to edit Master title style</a:t>
             </a:r>
             <a:endParaRPr lang="en-US" dirty="0"/>
@@ -7935,35 +7946,35 @@
           <a:p>
             <a:pPr lvl="0"/>
             <a:r>
-              <a:rPr lang="en-US" smtClean="0"/>
+              <a:rPr lang="en-US"/>
               <a:t>Click to edit Master text styles</a:t>
             </a:r>
           </a:p>
           <a:p>
             <a:pPr lvl="1"/>
             <a:r>
-              <a:rPr lang="en-US" smtClean="0"/>
+              <a:rPr lang="en-US"/>
               <a:t>Second level</a:t>
             </a:r>
           </a:p>
           <a:p>
             <a:pPr lvl="2"/>
             <a:r>
-              <a:rPr lang="en-US" smtClean="0"/>
+              <a:rPr lang="en-US"/>
               <a:t>Third level</a:t>
             </a:r>
           </a:p>
           <a:p>
             <a:pPr lvl="3"/>
             <a:r>
-              <a:rPr lang="en-US" smtClean="0"/>
+              <a:rPr lang="en-US"/>
               <a:t>Fourth level</a:t>
             </a:r>
           </a:p>
           <a:p>
             <a:pPr lvl="4"/>
             <a:r>
-              <a:rPr lang="en-US" smtClean="0"/>
+              <a:rPr lang="en-US"/>
               <a:t>Fifth level</a:t>
             </a:r>
             <a:endParaRPr lang="en-US" dirty="0"/>
@@ -7987,7 +7998,7 @@
           <a:p>
             <a:fld id="{110CAD28-65F7-48D0-9A90-0EC8C2ACC4D7}" type="datetimeFigureOut">
               <a:rPr lang="en-US" smtClean="0"/>
-              <a:t>2/17/2019</a:t>
+              <a:t>2/19/2019</a:t>
             </a:fld>
             <a:endParaRPr lang="en-US"/>
           </a:p>
@@ -8908,7 +8919,7 @@
           </a:lstStyle>
           <a:p>
             <a:r>
-              <a:rPr lang="en-US" smtClean="0"/>
+              <a:rPr lang="en-US"/>
               <a:t>Click to edit Master title style</a:t>
             </a:r>
             <a:endParaRPr lang="en-US" dirty="0"/>
@@ -9026,7 +9037,7 @@
           <a:p>
             <a:pPr lvl="0"/>
             <a:r>
-              <a:rPr lang="en-US" smtClean="0"/>
+              <a:rPr lang="en-US"/>
               <a:t>Click to edit Master text styles</a:t>
             </a:r>
           </a:p>
@@ -9049,7 +9060,7 @@
           <a:p>
             <a:fld id="{110CAD28-65F7-48D0-9A90-0EC8C2ACC4D7}" type="datetimeFigureOut">
               <a:rPr lang="en-US" smtClean="0"/>
-              <a:t>2/17/2019</a:t>
+              <a:t>2/19/2019</a:t>
             </a:fld>
             <a:endParaRPr lang="en-US"/>
           </a:p>
@@ -9179,7 +9190,7 @@
           <a:lstStyle/>
           <a:p>
             <a:r>
-              <a:rPr lang="en-US" smtClean="0"/>
+              <a:rPr lang="en-US"/>
               <a:t>Click to edit Master title style</a:t>
             </a:r>
             <a:endParaRPr lang="en-US" dirty="0"/>
@@ -9210,35 +9221,35 @@
           <a:p>
             <a:pPr lvl="0"/>
             <a:r>
-              <a:rPr lang="en-US" smtClean="0"/>
+              <a:rPr lang="en-US"/>
               <a:t>Click to edit Master text styles</a:t>
             </a:r>
           </a:p>
           <a:p>
             <a:pPr lvl="1"/>
             <a:r>
-              <a:rPr lang="en-US" smtClean="0"/>
+              <a:rPr lang="en-US"/>
               <a:t>Second level</a:t>
             </a:r>
           </a:p>
           <a:p>
             <a:pPr lvl="2"/>
             <a:r>
-              <a:rPr lang="en-US" smtClean="0"/>
+              <a:rPr lang="en-US"/>
               <a:t>Third level</a:t>
             </a:r>
           </a:p>
           <a:p>
             <a:pPr lvl="3"/>
             <a:r>
-              <a:rPr lang="en-US" smtClean="0"/>
+              <a:rPr lang="en-US"/>
               <a:t>Fourth level</a:t>
             </a:r>
           </a:p>
           <a:p>
             <a:pPr lvl="4"/>
             <a:r>
-              <a:rPr lang="en-US" smtClean="0"/>
+              <a:rPr lang="en-US"/>
               <a:t>Fifth level</a:t>
             </a:r>
             <a:endParaRPr lang="en-US" dirty="0"/>
@@ -9269,35 +9280,35 @@
           <a:p>
             <a:pPr lvl="0"/>
             <a:r>
-              <a:rPr lang="en-US" smtClean="0"/>
+              <a:rPr lang="en-US"/>
               <a:t>Click to edit Master text styles</a:t>
             </a:r>
           </a:p>
           <a:p>
             <a:pPr lvl="1"/>
             <a:r>
-              <a:rPr lang="en-US" smtClean="0"/>
+              <a:rPr lang="en-US"/>
               <a:t>Second level</a:t>
             </a:r>
           </a:p>
           <a:p>
             <a:pPr lvl="2"/>
             <a:r>
-              <a:rPr lang="en-US" smtClean="0"/>
+              <a:rPr lang="en-US"/>
               <a:t>Third level</a:t>
             </a:r>
           </a:p>
           <a:p>
             <a:pPr lvl="3"/>
             <a:r>
-              <a:rPr lang="en-US" smtClean="0"/>
+              <a:rPr lang="en-US"/>
               <a:t>Fourth level</a:t>
             </a:r>
           </a:p>
           <a:p>
             <a:pPr lvl="4"/>
             <a:r>
-              <a:rPr lang="en-US" smtClean="0"/>
+              <a:rPr lang="en-US"/>
               <a:t>Fifth level</a:t>
             </a:r>
             <a:endParaRPr lang="en-US" dirty="0"/>
@@ -9321,7 +9332,7 @@
           <a:p>
             <a:fld id="{110CAD28-65F7-48D0-9A90-0EC8C2ACC4D7}" type="datetimeFigureOut">
               <a:rPr lang="en-US" smtClean="0"/>
-              <a:t>2/17/2019</a:t>
+              <a:t>2/19/2019</a:t>
             </a:fld>
             <a:endParaRPr lang="en-US"/>
           </a:p>
@@ -9419,7 +9430,7 @@
           </a:lstStyle>
           <a:p>
             <a:r>
-              <a:rPr lang="en-US" smtClean="0"/>
+              <a:rPr lang="en-US"/>
               <a:t>Click to edit Master title style</a:t>
             </a:r>
             <a:endParaRPr lang="en-US" dirty="0"/>
@@ -9491,7 +9502,7 @@
           <a:p>
             <a:pPr lvl="0"/>
             <a:r>
-              <a:rPr lang="en-US" smtClean="0"/>
+              <a:rPr lang="en-US"/>
               <a:t>Click to edit Master text styles</a:t>
             </a:r>
           </a:p>
@@ -9521,35 +9532,35 @@
           <a:p>
             <a:pPr lvl="0"/>
             <a:r>
-              <a:rPr lang="en-US" smtClean="0"/>
+              <a:rPr lang="en-US"/>
               <a:t>Click to edit Master text styles</a:t>
             </a:r>
           </a:p>
           <a:p>
             <a:pPr lvl="1"/>
             <a:r>
-              <a:rPr lang="en-US" smtClean="0"/>
+              <a:rPr lang="en-US"/>
               <a:t>Second level</a:t>
             </a:r>
           </a:p>
           <a:p>
             <a:pPr lvl="2"/>
             <a:r>
-              <a:rPr lang="en-US" smtClean="0"/>
+              <a:rPr lang="en-US"/>
               <a:t>Third level</a:t>
             </a:r>
           </a:p>
           <a:p>
             <a:pPr lvl="3"/>
             <a:r>
-              <a:rPr lang="en-US" smtClean="0"/>
+              <a:rPr lang="en-US"/>
               <a:t>Fourth level</a:t>
             </a:r>
           </a:p>
           <a:p>
             <a:pPr lvl="4"/>
             <a:r>
-              <a:rPr lang="en-US" smtClean="0"/>
+              <a:rPr lang="en-US"/>
               <a:t>Fifth level</a:t>
             </a:r>
             <a:endParaRPr lang="en-US" dirty="0"/>
@@ -9621,7 +9632,7 @@
           <a:p>
             <a:pPr lvl="0"/>
             <a:r>
-              <a:rPr lang="en-US" smtClean="0"/>
+              <a:rPr lang="en-US"/>
               <a:t>Click to edit Master text styles</a:t>
             </a:r>
           </a:p>
@@ -9651,35 +9662,35 @@
           <a:p>
             <a:pPr lvl="0"/>
             <a:r>
-              <a:rPr lang="en-US" smtClean="0"/>
+              <a:rPr lang="en-US"/>
               <a:t>Click to edit Master text styles</a:t>
             </a:r>
           </a:p>
           <a:p>
             <a:pPr lvl="1"/>
             <a:r>
-              <a:rPr lang="en-US" smtClean="0"/>
+              <a:rPr lang="en-US"/>
               <a:t>Second level</a:t>
             </a:r>
           </a:p>
           <a:p>
             <a:pPr lvl="2"/>
             <a:r>
-              <a:rPr lang="en-US" smtClean="0"/>
+              <a:rPr lang="en-US"/>
               <a:t>Third level</a:t>
             </a:r>
           </a:p>
           <a:p>
             <a:pPr lvl="3"/>
             <a:r>
-              <a:rPr lang="en-US" smtClean="0"/>
+              <a:rPr lang="en-US"/>
               <a:t>Fourth level</a:t>
             </a:r>
           </a:p>
           <a:p>
             <a:pPr lvl="4"/>
             <a:r>
-              <a:rPr lang="en-US" smtClean="0"/>
+              <a:rPr lang="en-US"/>
               <a:t>Fifth level</a:t>
             </a:r>
             <a:endParaRPr lang="en-US" dirty="0"/>
@@ -9703,7 +9714,7 @@
           <a:p>
             <a:fld id="{110CAD28-65F7-48D0-9A90-0EC8C2ACC4D7}" type="datetimeFigureOut">
               <a:rPr lang="en-US" smtClean="0"/>
-              <a:t>2/17/2019</a:t>
+              <a:t>2/19/2019</a:t>
             </a:fld>
             <a:endParaRPr lang="en-US"/>
           </a:p>
@@ -9797,7 +9808,7 @@
           <a:lstStyle/>
           <a:p>
             <a:r>
-              <a:rPr lang="en-US" smtClean="0"/>
+              <a:rPr lang="en-US"/>
               <a:t>Click to edit Master title style</a:t>
             </a:r>
             <a:endParaRPr lang="en-US" dirty="0"/>
@@ -9821,7 +9832,7 @@
           <a:p>
             <a:fld id="{110CAD28-65F7-48D0-9A90-0EC8C2ACC4D7}" type="datetimeFigureOut">
               <a:rPr lang="en-US" smtClean="0"/>
-              <a:t>2/17/2019</a:t>
+              <a:t>2/19/2019</a:t>
             </a:fld>
             <a:endParaRPr lang="en-US"/>
           </a:p>
@@ -9916,7 +9927,7 @@
           <a:p>
             <a:fld id="{110CAD28-65F7-48D0-9A90-0EC8C2ACC4D7}" type="datetimeFigureOut">
               <a:rPr lang="en-US" smtClean="0"/>
-              <a:t>2/17/2019</a:t>
+              <a:t>2/19/2019</a:t>
             </a:fld>
             <a:endParaRPr lang="en-US"/>
           </a:p>
@@ -10873,7 +10884,7 @@
           </a:lstStyle>
           <a:p>
             <a:r>
-              <a:rPr lang="en-US" smtClean="0"/>
+              <a:rPr lang="en-US"/>
               <a:t>Click to edit Master title style</a:t>
             </a:r>
             <a:endParaRPr lang="en-US" dirty="0"/>
@@ -10904,35 +10915,35 @@
           <a:p>
             <a:pPr lvl="0"/>
             <a:r>
-              <a:rPr lang="en-US" smtClean="0"/>
+              <a:rPr lang="en-US"/>
               <a:t>Click to edit Master text styles</a:t>
             </a:r>
           </a:p>
           <a:p>
             <a:pPr lvl="1"/>
             <a:r>
-              <a:rPr lang="en-US" smtClean="0"/>
+              <a:rPr lang="en-US"/>
               <a:t>Second level</a:t>
             </a:r>
           </a:p>
           <a:p>
             <a:pPr lvl="2"/>
             <a:r>
-              <a:rPr lang="en-US" smtClean="0"/>
+              <a:rPr lang="en-US"/>
               <a:t>Third level</a:t>
             </a:r>
           </a:p>
           <a:p>
             <a:pPr lvl="3"/>
             <a:r>
-              <a:rPr lang="en-US" smtClean="0"/>
+              <a:rPr lang="en-US"/>
               <a:t>Fourth level</a:t>
             </a:r>
           </a:p>
           <a:p>
             <a:pPr lvl="4"/>
             <a:r>
-              <a:rPr lang="en-US" smtClean="0"/>
+              <a:rPr lang="en-US"/>
               <a:t>Fifth level</a:t>
             </a:r>
             <a:endParaRPr lang="en-US" dirty="0"/>
@@ -11002,7 +11013,7 @@
           <a:p>
             <a:pPr lvl="0"/>
             <a:r>
-              <a:rPr lang="en-US" smtClean="0"/>
+              <a:rPr lang="en-US"/>
               <a:t>Click to edit Master text styles</a:t>
             </a:r>
           </a:p>
@@ -11025,7 +11036,7 @@
           <a:p>
             <a:fld id="{110CAD28-65F7-48D0-9A90-0EC8C2ACC4D7}" type="datetimeFigureOut">
               <a:rPr lang="en-US" smtClean="0"/>
-              <a:t>2/17/2019</a:t>
+              <a:t>2/19/2019</a:t>
             </a:fld>
             <a:endParaRPr lang="en-US"/>
           </a:p>
@@ -11984,7 +11995,7 @@
           </a:lstStyle>
           <a:p>
             <a:r>
-              <a:rPr lang="en-US" smtClean="0"/>
+              <a:rPr lang="en-US"/>
               <a:t>Click to edit Master title style</a:t>
             </a:r>
             <a:endParaRPr lang="en-US" dirty="0"/>
@@ -12063,7 +12074,7 @@
           </a:lstStyle>
           <a:p>
             <a:r>
-              <a:rPr lang="en-US" smtClean="0"/>
+              <a:rPr lang="en-US"/>
               <a:t>Click icon to add picture</a:t>
             </a:r>
             <a:endParaRPr lang="en-US" dirty="0"/>
@@ -12135,7 +12146,7 @@
           <a:p>
             <a:pPr lvl="0"/>
             <a:r>
-              <a:rPr lang="en-US" smtClean="0"/>
+              <a:rPr lang="en-US"/>
               <a:t>Click to edit Master text styles</a:t>
             </a:r>
           </a:p>
@@ -12158,7 +12169,7 @@
           <a:p>
             <a:fld id="{110CAD28-65F7-48D0-9A90-0EC8C2ACC4D7}" type="datetimeFigureOut">
               <a:rPr lang="en-US" smtClean="0"/>
-              <a:t>2/17/2019</a:t>
+              <a:t>2/19/2019</a:t>
             </a:fld>
             <a:endParaRPr lang="en-US"/>
           </a:p>
@@ -13084,7 +13095,7 @@
           <a:lstStyle/>
           <a:p>
             <a:r>
-              <a:rPr lang="en-US" smtClean="0"/>
+              <a:rPr lang="en-US"/>
               <a:t>Click to edit Master title style</a:t>
             </a:r>
             <a:endParaRPr lang="en-US" dirty="0"/>
@@ -13118,35 +13129,35 @@
           <a:p>
             <a:pPr lvl="0"/>
             <a:r>
-              <a:rPr lang="en-US" smtClean="0"/>
+              <a:rPr lang="en-US"/>
               <a:t>Click to edit Master text styles</a:t>
             </a:r>
           </a:p>
           <a:p>
             <a:pPr lvl="1"/>
             <a:r>
-              <a:rPr lang="en-US" smtClean="0"/>
+              <a:rPr lang="en-US"/>
               <a:t>Second level</a:t>
             </a:r>
           </a:p>
           <a:p>
             <a:pPr lvl="2"/>
             <a:r>
-              <a:rPr lang="en-US" smtClean="0"/>
+              <a:rPr lang="en-US"/>
               <a:t>Third level</a:t>
             </a:r>
           </a:p>
           <a:p>
             <a:pPr lvl="3"/>
             <a:r>
-              <a:rPr lang="en-US" smtClean="0"/>
+              <a:rPr lang="en-US"/>
               <a:t>Fourth level</a:t>
             </a:r>
           </a:p>
           <a:p>
             <a:pPr lvl="4"/>
             <a:r>
-              <a:rPr lang="en-US" smtClean="0"/>
+              <a:rPr lang="en-US"/>
               <a:t>Fifth level</a:t>
             </a:r>
             <a:endParaRPr lang="en-US" dirty="0"/>
@@ -13186,7 +13197,7 @@
           <a:p>
             <a:fld id="{110CAD28-65F7-48D0-9A90-0EC8C2ACC4D7}" type="datetimeFigureOut">
               <a:rPr lang="en-US" smtClean="0"/>
-              <a:t>2/17/2019</a:t>
+              <a:t>2/19/2019</a:t>
             </a:fld>
             <a:endParaRPr lang="en-US"/>
           </a:p>
@@ -13763,10 +13774,28 @@
           <a:lstStyle/>
           <a:p>
             <a:r>
-              <a:rPr lang="en-US" dirty="0" smtClean="0"/>
-              <a:t>Project Proposal</a:t>
+              <a:rPr lang="en-US" sz="3200" dirty="0"/>
+              <a:t>Project Proposal on</a:t>
             </a:r>
-            <a:endParaRPr lang="en-US" dirty="0"/>
+            <a:br>
+              <a:rPr lang="en-US" dirty="0"/>
+            </a:br>
+            <a:r>
+              <a:rPr lang="en-US" dirty="0"/>
+              <a:t>“</a:t>
+            </a:r>
+            <a:r>
+              <a:rPr lang="en-US" sz="6000" dirty="0">
+                <a:solidFill>
+                  <a:srgbClr val="FFFF00"/>
+                </a:solidFill>
+              </a:rPr>
+              <a:t>Pizza Ordering App</a:t>
+            </a:r>
+            <a:r>
+              <a:rPr lang="en-US" dirty="0"/>
+              <a:t>”</a:t>
+            </a:r>
           </a:p>
         </p:txBody>
       </p:sp>
@@ -13785,9 +13814,27 @@
           <a:bodyPr/>
           <a:lstStyle/>
           <a:p>
+            <a:pPr algn="r"/>
             <a:r>
-              <a:rPr lang="en-US" dirty="0" smtClean="0"/>
-              <a:t>Pizza Ordering App</a:t>
+              <a:rPr lang="en-US" dirty="0">
+                <a:solidFill>
+                  <a:schemeClr val="tx1"/>
+                </a:solidFill>
+                <a:latin typeface="Book Antiqua" panose="02040602050305030304" pitchFamily="18" charset="0"/>
+              </a:rPr>
+              <a:t>Limon Motin – 1620902042</a:t>
+            </a:r>
+          </a:p>
+          <a:p>
+            <a:pPr algn="r"/>
+            <a:r>
+              <a:rPr lang="en-US" dirty="0">
+                <a:solidFill>
+                  <a:schemeClr val="tx1"/>
+                </a:solidFill>
+                <a:latin typeface="Book Antiqua" panose="02040602050305030304" pitchFamily="18" charset="0"/>
+              </a:rPr>
+              <a:t>Md. Golam Rabby Shuvo - 1620044042</a:t>
             </a:r>
           </a:p>
           <a:p>
@@ -13799,6 +13846,570 @@
     <p:extLst>
       <p:ext uri="{BB962C8B-B14F-4D97-AF65-F5344CB8AC3E}">
         <p14:creationId xmlns:p14="http://schemas.microsoft.com/office/powerpoint/2010/main" val="850933021"/>
+      </p:ext>
+    </p:extLst>
+  </p:cSld>
+  <p:clrMapOvr>
+    <a:masterClrMapping/>
+  </p:clrMapOvr>
+</p:sld>
+</file>
+
+<file path=ppt/slides/slide2.xml><?xml version="1.0" encoding="utf-8"?>
+<p:sld xmlns:a="http://schemas.openxmlformats.org/drawingml/2006/main" xmlns:r="http://schemas.openxmlformats.org/officeDocument/2006/relationships" xmlns:p="http://schemas.openxmlformats.org/presentationml/2006/main">
+  <p:cSld>
+    <p:spTree>
+      <p:nvGrpSpPr>
+        <p:cNvPr id="1" name=""/>
+        <p:cNvGrpSpPr/>
+        <p:nvPr/>
+      </p:nvGrpSpPr>
+      <p:grpSpPr>
+        <a:xfrm>
+          <a:off x="0" y="0"/>
+          <a:ext cx="0" cy="0"/>
+          <a:chOff x="0" y="0"/>
+          <a:chExt cx="0" cy="0"/>
+        </a:xfrm>
+      </p:grpSpPr>
+      <p:sp>
+        <p:nvSpPr>
+          <p:cNvPr id="2" name="Title 1">
+            <a:extLst>
+              <a:ext uri="{FF2B5EF4-FFF2-40B4-BE49-F238E27FC236}">
+                <a16:creationId xmlns:a16="http://schemas.microsoft.com/office/drawing/2014/main" id="{3A3A44A3-C234-41A6-97E8-A56683FCD26B}"/>
+              </a:ext>
+            </a:extLst>
+          </p:cNvPr>
+          <p:cNvSpPr>
+            <a:spLocks noGrp="1"/>
+          </p:cNvSpPr>
+          <p:nvPr>
+            <p:ph type="title"/>
+          </p:nvPr>
+        </p:nvSpPr>
+        <p:spPr/>
+        <p:txBody>
+          <a:bodyPr/>
+          <a:lstStyle/>
+          <a:p>
+            <a:r>
+              <a:rPr lang="en-US" b="1"/>
+              <a:t>Introduction</a:t>
+            </a:r>
+            <a:endParaRPr lang="en-US" b="1" dirty="0"/>
+          </a:p>
+        </p:txBody>
+      </p:sp>
+      <p:sp>
+        <p:nvSpPr>
+          <p:cNvPr id="3" name="Content Placeholder 2">
+            <a:extLst>
+              <a:ext uri="{FF2B5EF4-FFF2-40B4-BE49-F238E27FC236}">
+                <a16:creationId xmlns:a16="http://schemas.microsoft.com/office/drawing/2014/main" id="{316A26FA-5144-4898-BD05-6AD0496394ED}"/>
+              </a:ext>
+            </a:extLst>
+          </p:cNvPr>
+          <p:cNvSpPr>
+            <a:spLocks noGrp="1"/>
+          </p:cNvSpPr>
+          <p:nvPr>
+            <p:ph idx="1"/>
+          </p:nvPr>
+        </p:nvSpPr>
+        <p:spPr/>
+        <p:txBody>
+          <a:bodyPr/>
+          <a:lstStyle/>
+          <a:p>
+            <a:pPr marL="0" indent="0" algn="just">
+              <a:buNone/>
+            </a:pPr>
+            <a:r>
+              <a:rPr lang="en-US" dirty="0"/>
+              <a:t>Pizza Ordering App is based on a concept of making pizza orders and payments. Here, the user can login, select pizza sets, quantity and proceed towards payment. Other features include viewing full payment receipt which includes each and every detail. Prices will be displayed in BDT currency. This mini project contains limited features, but the essential ones.</a:t>
+            </a:r>
+          </a:p>
+        </p:txBody>
+      </p:sp>
+    </p:spTree>
+    <p:extLst>
+      <p:ext uri="{BB962C8B-B14F-4D97-AF65-F5344CB8AC3E}">
+        <p14:creationId xmlns:p14="http://schemas.microsoft.com/office/powerpoint/2010/main" val="3362380975"/>
+      </p:ext>
+    </p:extLst>
+  </p:cSld>
+  <p:clrMapOvr>
+    <a:masterClrMapping/>
+  </p:clrMapOvr>
+</p:sld>
+</file>
+
+<file path=ppt/slides/slide3.xml><?xml version="1.0" encoding="utf-8"?>
+<p:sld xmlns:a="http://schemas.openxmlformats.org/drawingml/2006/main" xmlns:r="http://schemas.openxmlformats.org/officeDocument/2006/relationships" xmlns:p="http://schemas.openxmlformats.org/presentationml/2006/main">
+  <p:cSld>
+    <p:spTree>
+      <p:nvGrpSpPr>
+        <p:cNvPr id="1" name=""/>
+        <p:cNvGrpSpPr/>
+        <p:nvPr/>
+      </p:nvGrpSpPr>
+      <p:grpSpPr>
+        <a:xfrm>
+          <a:off x="0" y="0"/>
+          <a:ext cx="0" cy="0"/>
+          <a:chOff x="0" y="0"/>
+          <a:chExt cx="0" cy="0"/>
+        </a:xfrm>
+      </p:grpSpPr>
+      <p:sp>
+        <p:nvSpPr>
+          <p:cNvPr id="2" name="Title 1">
+            <a:extLst>
+              <a:ext uri="{FF2B5EF4-FFF2-40B4-BE49-F238E27FC236}">
+                <a16:creationId xmlns:a16="http://schemas.microsoft.com/office/drawing/2014/main" id="{93193155-613B-4312-AC5E-07AEAE53FBD3}"/>
+              </a:ext>
+            </a:extLst>
+          </p:cNvPr>
+          <p:cNvSpPr>
+            <a:spLocks noGrp="1"/>
+          </p:cNvSpPr>
+          <p:nvPr>
+            <p:ph type="title"/>
+          </p:nvPr>
+        </p:nvSpPr>
+        <p:spPr/>
+        <p:txBody>
+          <a:bodyPr/>
+          <a:lstStyle/>
+          <a:p>
+            <a:r>
+              <a:rPr lang="en-US" b="1" dirty="0"/>
+              <a:t>Objectives</a:t>
+            </a:r>
+          </a:p>
+        </p:txBody>
+      </p:sp>
+      <p:sp>
+        <p:nvSpPr>
+          <p:cNvPr id="3" name="Content Placeholder 2">
+            <a:extLst>
+              <a:ext uri="{FF2B5EF4-FFF2-40B4-BE49-F238E27FC236}">
+                <a16:creationId xmlns:a16="http://schemas.microsoft.com/office/drawing/2014/main" id="{BF5ECD95-9B0A-4F2B-A563-09B3C772A6E8}"/>
+              </a:ext>
+            </a:extLst>
+          </p:cNvPr>
+          <p:cNvSpPr>
+            <a:spLocks noGrp="1"/>
+          </p:cNvSpPr>
+          <p:nvPr>
+            <p:ph idx="1"/>
+          </p:nvPr>
+        </p:nvSpPr>
+        <p:spPr/>
+        <p:txBody>
+          <a:bodyPr/>
+          <a:lstStyle/>
+          <a:p>
+            <a:r>
+              <a:rPr lang="en-US" dirty="0"/>
+              <a:t>Build Your Own Pizza</a:t>
+            </a:r>
+          </a:p>
+          <a:p>
+            <a:r>
+              <a:rPr lang="en-US" dirty="0"/>
+              <a:t>Online Payment</a:t>
+            </a:r>
+          </a:p>
+          <a:p>
+            <a:r>
+              <a:rPr lang="en-US" dirty="0"/>
+              <a:t>Know Delivery Time</a:t>
+            </a:r>
+          </a:p>
+          <a:p>
+            <a:r>
+              <a:rPr lang="en-US" dirty="0"/>
+              <a:t>Better Knowledge</a:t>
+            </a:r>
+          </a:p>
+          <a:p>
+            <a:r>
+              <a:rPr lang="en-US" dirty="0"/>
+              <a:t>Improves Efficiency</a:t>
+            </a:r>
+          </a:p>
+        </p:txBody>
+      </p:sp>
+    </p:spTree>
+    <p:extLst>
+      <p:ext uri="{BB962C8B-B14F-4D97-AF65-F5344CB8AC3E}">
+        <p14:creationId xmlns:p14="http://schemas.microsoft.com/office/powerpoint/2010/main" val="1588103046"/>
+      </p:ext>
+    </p:extLst>
+  </p:cSld>
+  <p:clrMapOvr>
+    <a:masterClrMapping/>
+  </p:clrMapOvr>
+</p:sld>
+</file>
+
+<file path=ppt/slides/slide4.xml><?xml version="1.0" encoding="utf-8"?>
+<p:sld xmlns:a="http://schemas.openxmlformats.org/drawingml/2006/main" xmlns:r="http://schemas.openxmlformats.org/officeDocument/2006/relationships" xmlns:p="http://schemas.openxmlformats.org/presentationml/2006/main">
+  <p:cSld>
+    <p:spTree>
+      <p:nvGrpSpPr>
+        <p:cNvPr id="1" name=""/>
+        <p:cNvGrpSpPr/>
+        <p:nvPr/>
+      </p:nvGrpSpPr>
+      <p:grpSpPr>
+        <a:xfrm>
+          <a:off x="0" y="0"/>
+          <a:ext cx="0" cy="0"/>
+          <a:chOff x="0" y="0"/>
+          <a:chExt cx="0" cy="0"/>
+        </a:xfrm>
+      </p:grpSpPr>
+      <p:sp>
+        <p:nvSpPr>
+          <p:cNvPr id="2" name="Title 1">
+            <a:extLst>
+              <a:ext uri="{FF2B5EF4-FFF2-40B4-BE49-F238E27FC236}">
+                <a16:creationId xmlns:a16="http://schemas.microsoft.com/office/drawing/2014/main" id="{DB1F0797-2856-4F73-A957-637216384404}"/>
+              </a:ext>
+            </a:extLst>
+          </p:cNvPr>
+          <p:cNvSpPr>
+            <a:spLocks noGrp="1"/>
+          </p:cNvSpPr>
+          <p:nvPr>
+            <p:ph type="title"/>
+          </p:nvPr>
+        </p:nvSpPr>
+        <p:spPr/>
+        <p:txBody>
+          <a:bodyPr/>
+          <a:lstStyle/>
+          <a:p>
+            <a:r>
+              <a:rPr lang="en-US" b="1" dirty="0"/>
+              <a:t>Scope</a:t>
+            </a:r>
+          </a:p>
+        </p:txBody>
+      </p:sp>
+      <p:sp>
+        <p:nvSpPr>
+          <p:cNvPr id="3" name="Content Placeholder 2">
+            <a:extLst>
+              <a:ext uri="{FF2B5EF4-FFF2-40B4-BE49-F238E27FC236}">
+                <a16:creationId xmlns:a16="http://schemas.microsoft.com/office/drawing/2014/main" id="{C34A6749-C050-407B-B65A-95338919C099}"/>
+              </a:ext>
+            </a:extLst>
+          </p:cNvPr>
+          <p:cNvSpPr>
+            <a:spLocks noGrp="1"/>
+          </p:cNvSpPr>
+          <p:nvPr>
+            <p:ph idx="1"/>
+          </p:nvPr>
+        </p:nvSpPr>
+        <p:spPr/>
+        <p:txBody>
+          <a:bodyPr/>
+          <a:lstStyle/>
+          <a:p>
+            <a:pPr marL="0" indent="0" algn="just">
+              <a:buNone/>
+            </a:pPr>
+            <a:r>
+              <a:rPr lang="en-US" dirty="0"/>
+              <a:t>The scope of the proposed system will be based on the features and functionalities proposed for pizza restaurant which is located in Bashundhara R/a. Online pizza ordering system will be an android based application whose main language of programming will be Java. Its main aim is to simplify and improve the efficiency of the ordering process for both customer and restaurant, minimize manual data entry and ensure data accuracy and security during order placement process.</a:t>
+            </a:r>
+          </a:p>
+        </p:txBody>
+      </p:sp>
+    </p:spTree>
+    <p:extLst>
+      <p:ext uri="{BB962C8B-B14F-4D97-AF65-F5344CB8AC3E}">
+        <p14:creationId xmlns:p14="http://schemas.microsoft.com/office/powerpoint/2010/main" val="297331808"/>
+      </p:ext>
+    </p:extLst>
+  </p:cSld>
+  <p:clrMapOvr>
+    <a:masterClrMapping/>
+  </p:clrMapOvr>
+</p:sld>
+</file>
+
+<file path=ppt/slides/slide5.xml><?xml version="1.0" encoding="utf-8"?>
+<p:sld xmlns:a="http://schemas.openxmlformats.org/drawingml/2006/main" xmlns:r="http://schemas.openxmlformats.org/officeDocument/2006/relationships" xmlns:p="http://schemas.openxmlformats.org/presentationml/2006/main">
+  <p:cSld>
+    <p:spTree>
+      <p:nvGrpSpPr>
+        <p:cNvPr id="1" name=""/>
+        <p:cNvGrpSpPr/>
+        <p:nvPr/>
+      </p:nvGrpSpPr>
+      <p:grpSpPr>
+        <a:xfrm>
+          <a:off x="0" y="0"/>
+          <a:ext cx="0" cy="0"/>
+          <a:chOff x="0" y="0"/>
+          <a:chExt cx="0" cy="0"/>
+        </a:xfrm>
+      </p:grpSpPr>
+      <p:sp>
+        <p:nvSpPr>
+          <p:cNvPr id="2" name="Title 1">
+            <a:extLst>
+              <a:ext uri="{FF2B5EF4-FFF2-40B4-BE49-F238E27FC236}">
+                <a16:creationId xmlns:a16="http://schemas.microsoft.com/office/drawing/2014/main" id="{A22270A4-3A56-4325-BF56-CB45C33A3805}"/>
+              </a:ext>
+            </a:extLst>
+          </p:cNvPr>
+          <p:cNvSpPr>
+            <a:spLocks noGrp="1"/>
+          </p:cNvSpPr>
+          <p:nvPr>
+            <p:ph type="title"/>
+          </p:nvPr>
+        </p:nvSpPr>
+        <p:spPr/>
+        <p:txBody>
+          <a:bodyPr/>
+          <a:lstStyle/>
+          <a:p>
+            <a:r>
+              <a:rPr lang="en-US" b="1" dirty="0"/>
+              <a:t>Limitation</a:t>
+            </a:r>
+          </a:p>
+        </p:txBody>
+      </p:sp>
+      <p:sp>
+        <p:nvSpPr>
+          <p:cNvPr id="3" name="Content Placeholder 2">
+            <a:extLst>
+              <a:ext uri="{FF2B5EF4-FFF2-40B4-BE49-F238E27FC236}">
+                <a16:creationId xmlns:a16="http://schemas.microsoft.com/office/drawing/2014/main" id="{5570A365-707B-4515-A559-4B633EFFA6B8}"/>
+              </a:ext>
+            </a:extLst>
+          </p:cNvPr>
+          <p:cNvSpPr>
+            <a:spLocks noGrp="1"/>
+          </p:cNvSpPr>
+          <p:nvPr>
+            <p:ph idx="1"/>
+          </p:nvPr>
+        </p:nvSpPr>
+        <p:spPr/>
+        <p:txBody>
+          <a:bodyPr/>
+          <a:lstStyle/>
+          <a:p>
+            <a:r>
+              <a:rPr lang="en-US" dirty="0"/>
+              <a:t>Requires internet connection.</a:t>
+            </a:r>
+          </a:p>
+          <a:p>
+            <a:r>
+              <a:rPr lang="en-US" dirty="0"/>
+              <a:t>The set back of the system is that the customers targeted are adults with access to android phone.</a:t>
+            </a:r>
+          </a:p>
+          <a:p>
+            <a:r>
+              <a:rPr lang="en-US" dirty="0"/>
+              <a:t>The other limitation is that the system will only be convenient to people with a small geographical region.</a:t>
+            </a:r>
+          </a:p>
+        </p:txBody>
+      </p:sp>
+    </p:spTree>
+    <p:extLst>
+      <p:ext uri="{BB962C8B-B14F-4D97-AF65-F5344CB8AC3E}">
+        <p14:creationId xmlns:p14="http://schemas.microsoft.com/office/powerpoint/2010/main" val="2498439126"/>
+      </p:ext>
+    </p:extLst>
+  </p:cSld>
+  <p:clrMapOvr>
+    <a:masterClrMapping/>
+  </p:clrMapOvr>
+</p:sld>
+</file>
+
+<file path=ppt/slides/slide6.xml><?xml version="1.0" encoding="utf-8"?>
+<p:sld xmlns:a="http://schemas.openxmlformats.org/drawingml/2006/main" xmlns:r="http://schemas.openxmlformats.org/officeDocument/2006/relationships" xmlns:p="http://schemas.openxmlformats.org/presentationml/2006/main">
+  <p:cSld>
+    <p:spTree>
+      <p:nvGrpSpPr>
+        <p:cNvPr id="1" name=""/>
+        <p:cNvGrpSpPr/>
+        <p:nvPr/>
+      </p:nvGrpSpPr>
+      <p:grpSpPr>
+        <a:xfrm>
+          <a:off x="0" y="0"/>
+          <a:ext cx="0" cy="0"/>
+          <a:chOff x="0" y="0"/>
+          <a:chExt cx="0" cy="0"/>
+        </a:xfrm>
+      </p:grpSpPr>
+      <p:sp>
+        <p:nvSpPr>
+          <p:cNvPr id="2" name="Title 1">
+            <a:extLst>
+              <a:ext uri="{FF2B5EF4-FFF2-40B4-BE49-F238E27FC236}">
+                <a16:creationId xmlns:a16="http://schemas.microsoft.com/office/drawing/2014/main" id="{554BA979-9361-49D7-A193-E9497DD745C8}"/>
+              </a:ext>
+            </a:extLst>
+          </p:cNvPr>
+          <p:cNvSpPr>
+            <a:spLocks noGrp="1"/>
+          </p:cNvSpPr>
+          <p:nvPr>
+            <p:ph type="title"/>
+          </p:nvPr>
+        </p:nvSpPr>
+        <p:spPr/>
+        <p:txBody>
+          <a:bodyPr/>
+          <a:lstStyle/>
+          <a:p>
+            <a:r>
+              <a:rPr lang="en-US" b="1" dirty="0"/>
+              <a:t>How it works</a:t>
+            </a:r>
+          </a:p>
+        </p:txBody>
+      </p:sp>
+      <p:sp>
+        <p:nvSpPr>
+          <p:cNvPr id="3" name="Content Placeholder 2">
+            <a:extLst>
+              <a:ext uri="{FF2B5EF4-FFF2-40B4-BE49-F238E27FC236}">
+                <a16:creationId xmlns:a16="http://schemas.microsoft.com/office/drawing/2014/main" id="{85BE19C4-BAD8-4D36-8EAB-B14F0535DB0D}"/>
+              </a:ext>
+            </a:extLst>
+          </p:cNvPr>
+          <p:cNvSpPr>
+            <a:spLocks noGrp="1"/>
+          </p:cNvSpPr>
+          <p:nvPr>
+            <p:ph idx="1"/>
+          </p:nvPr>
+        </p:nvSpPr>
+        <p:spPr/>
+        <p:txBody>
+          <a:bodyPr/>
+          <a:lstStyle/>
+          <a:p>
+            <a:endParaRPr lang="en-US"/>
+          </a:p>
+        </p:txBody>
+      </p:sp>
+    </p:spTree>
+    <p:extLst>
+      <p:ext uri="{BB962C8B-B14F-4D97-AF65-F5344CB8AC3E}">
+        <p14:creationId xmlns:p14="http://schemas.microsoft.com/office/powerpoint/2010/main" val="1915145523"/>
+      </p:ext>
+    </p:extLst>
+  </p:cSld>
+  <p:clrMapOvr>
+    <a:masterClrMapping/>
+  </p:clrMapOvr>
+</p:sld>
+</file>
+
+<file path=ppt/slides/slide7.xml><?xml version="1.0" encoding="utf-8"?>
+<p:sld xmlns:a="http://schemas.openxmlformats.org/drawingml/2006/main" xmlns:r="http://schemas.openxmlformats.org/officeDocument/2006/relationships" xmlns:p="http://schemas.openxmlformats.org/presentationml/2006/main">
+  <p:cSld>
+    <p:spTree>
+      <p:nvGrpSpPr>
+        <p:cNvPr id="1" name=""/>
+        <p:cNvGrpSpPr/>
+        <p:nvPr/>
+      </p:nvGrpSpPr>
+      <p:grpSpPr>
+        <a:xfrm>
+          <a:off x="0" y="0"/>
+          <a:ext cx="0" cy="0"/>
+          <a:chOff x="0" y="0"/>
+          <a:chExt cx="0" cy="0"/>
+        </a:xfrm>
+      </p:grpSpPr>
+      <p:sp>
+        <p:nvSpPr>
+          <p:cNvPr id="2" name="Title 1">
+            <a:extLst>
+              <a:ext uri="{FF2B5EF4-FFF2-40B4-BE49-F238E27FC236}">
+                <a16:creationId xmlns:a16="http://schemas.microsoft.com/office/drawing/2014/main" id="{F738B851-F72B-4012-8144-A951C269453F}"/>
+              </a:ext>
+            </a:extLst>
+          </p:cNvPr>
+          <p:cNvSpPr>
+            <a:spLocks noGrp="1"/>
+          </p:cNvSpPr>
+          <p:nvPr>
+            <p:ph type="title"/>
+          </p:nvPr>
+        </p:nvSpPr>
+        <p:spPr/>
+        <p:txBody>
+          <a:bodyPr/>
+          <a:lstStyle/>
+          <a:p>
+            <a:r>
+              <a:rPr lang="en-US" b="1"/>
+              <a:t>ER Diagram</a:t>
+            </a:r>
+            <a:endParaRPr lang="en-US" b="1" dirty="0"/>
+          </a:p>
+        </p:txBody>
+      </p:sp>
+      <p:pic>
+        <p:nvPicPr>
+          <p:cNvPr id="5" name="Content Placeholder 4">
+            <a:extLst>
+              <a:ext uri="{FF2B5EF4-FFF2-40B4-BE49-F238E27FC236}">
+                <a16:creationId xmlns:a16="http://schemas.microsoft.com/office/drawing/2014/main" id="{DC69674D-8240-47D3-99C2-1D9CF40E45AA}"/>
+              </a:ext>
+            </a:extLst>
+          </p:cNvPr>
+          <p:cNvPicPr>
+            <a:picLocks noGrp="1" noChangeAspect="1"/>
+          </p:cNvPicPr>
+          <p:nvPr>
+            <p:ph idx="1"/>
+          </p:nvPr>
+        </p:nvPicPr>
+        <p:blipFill>
+          <a:blip r:embed="rId2">
+            <a:extLst>
+              <a:ext uri="{28A0092B-C50C-407E-A947-70E740481C1C}">
+                <a14:useLocalDpi xmlns:a14="http://schemas.microsoft.com/office/drawing/2010/main" val="0"/>
+              </a:ext>
+            </a:extLst>
+          </a:blip>
+          <a:stretch>
+            <a:fillRect/>
+          </a:stretch>
+        </p:blipFill>
+        <p:spPr>
+          <a:xfrm>
+            <a:off x="1154952" y="2468031"/>
+            <a:ext cx="9916321" cy="3904633"/>
+          </a:xfrm>
+        </p:spPr>
+      </p:pic>
+    </p:spTree>
+    <p:extLst>
+      <p:ext uri="{BB962C8B-B14F-4D97-AF65-F5344CB8AC3E}">
+        <p14:creationId xmlns:p14="http://schemas.microsoft.com/office/powerpoint/2010/main" val="3857193171"/>
       </p:ext>
     </p:extLst>
   </p:cSld>

</xml_diff>

<commit_message>
"Proposal_Group7.pptx" 2nd Half Uploaded
</commit_message>
<xml_diff>
--- a/Documentation/Proposal/Proposal_Group7.pptx
+++ b/Documentation/Proposal/Proposal_Group7.pptx
@@ -6,6 +6,17 @@
   </p:sldMasterIdLst>
   <p:sldIdLst>
     <p:sldId id="256" r:id="rId2"/>
+    <p:sldId id="257" r:id="rId3"/>
+    <p:sldId id="259" r:id="rId4"/>
+    <p:sldId id="260" r:id="rId5"/>
+    <p:sldId id="261" r:id="rId6"/>
+    <p:sldId id="262" r:id="rId7"/>
+    <p:sldId id="263" r:id="rId8"/>
+    <p:sldId id="264" r:id="rId9"/>
+    <p:sldId id="265" r:id="rId10"/>
+    <p:sldId id="266" r:id="rId11"/>
+    <p:sldId id="267" r:id="rId12"/>
+    <p:sldId id="268" r:id="rId13"/>
   </p:sldIdLst>
   <p:sldSz cx="12192000" cy="6858000"/>
   <p:notesSz cx="6858000" cy="9144000"/>
@@ -104,6 +115,11 @@
       </a:defRPr>
     </a:lvl9pPr>
   </p:defaultTextStyle>
+  <p:extLst>
+    <p:ext uri="{EFAFB233-063F-42B5-8137-9DF3F51BA10A}">
+      <p15:sldGuideLst xmlns:p15="http://schemas.microsoft.com/office/powerpoint/2012/main"/>
+    </p:ext>
+  </p:extLst>
 </p:presentation>
 </file>
 
@@ -599,7 +615,7 @@
           </a:lstStyle>
           <a:p>
             <a:r>
-              <a:rPr lang="en-US" smtClean="0"/>
+              <a:rPr lang="en-US"/>
               <a:t>Click to edit Master title style</a:t>
             </a:r>
             <a:endParaRPr lang="en-US" dirty="0"/>
@@ -716,7 +732,7 @@
           </a:lstStyle>
           <a:p>
             <a:r>
-              <a:rPr lang="en-US" smtClean="0"/>
+              <a:rPr lang="en-US"/>
               <a:t>Click to edit Master subtitle style</a:t>
             </a:r>
             <a:endParaRPr lang="en-US" dirty="0"/>
@@ -753,7 +769,7 @@
           <a:p>
             <a:fld id="{110CAD28-65F7-48D0-9A90-0EC8C2ACC4D7}" type="datetimeFigureOut">
               <a:rPr lang="en-US" smtClean="0"/>
-              <a:t>2/17/2019</a:t>
+              <a:t>2/19/2019</a:t>
             </a:fld>
             <a:endParaRPr lang="en-US"/>
           </a:p>
@@ -1699,7 +1715,7 @@
           </a:lstStyle>
           <a:p>
             <a:r>
-              <a:rPr lang="en-US" smtClean="0"/>
+              <a:rPr lang="en-US"/>
               <a:t>Click to edit Master title style</a:t>
             </a:r>
             <a:endParaRPr lang="en-US" dirty="0"/>
@@ -1778,7 +1794,7 @@
           </a:lstStyle>
           <a:p>
             <a:r>
-              <a:rPr lang="en-US" smtClean="0"/>
+              <a:rPr lang="en-US"/>
               <a:t>Click icon to add picture</a:t>
             </a:r>
             <a:endParaRPr lang="en-US" dirty="0"/>
@@ -1850,7 +1866,7 @@
           <a:p>
             <a:pPr lvl="0"/>
             <a:r>
-              <a:rPr lang="en-US" smtClean="0"/>
+              <a:rPr lang="en-US"/>
               <a:t>Click to edit Master text styles</a:t>
             </a:r>
           </a:p>
@@ -1873,7 +1889,7 @@
           <a:p>
             <a:fld id="{110CAD28-65F7-48D0-9A90-0EC8C2ACC4D7}" type="datetimeFigureOut">
               <a:rPr lang="en-US" smtClean="0"/>
-              <a:t>2/17/2019</a:t>
+              <a:t>2/19/2019</a:t>
             </a:fld>
             <a:endParaRPr lang="en-US"/>
           </a:p>
@@ -2793,7 +2809,7 @@
           </a:lstStyle>
           <a:p>
             <a:r>
-              <a:rPr lang="en-US" smtClean="0"/>
+              <a:rPr lang="en-US"/>
               <a:t>Click to edit Master title style</a:t>
             </a:r>
             <a:endParaRPr lang="en-US" dirty="0"/>
@@ -2861,7 +2877,7 @@
           <a:p>
             <a:pPr lvl="0"/>
             <a:r>
-              <a:rPr lang="en-US" smtClean="0"/>
+              <a:rPr lang="en-US"/>
               <a:t>Click to edit Master text styles</a:t>
             </a:r>
           </a:p>
@@ -2884,7 +2900,7 @@
           <a:p>
             <a:fld id="{110CAD28-65F7-48D0-9A90-0EC8C2ACC4D7}" type="datetimeFigureOut">
               <a:rPr lang="en-US" smtClean="0"/>
-              <a:t>2/17/2019</a:t>
+              <a:t>2/19/2019</a:t>
             </a:fld>
             <a:endParaRPr lang="en-US"/>
           </a:p>
@@ -3890,7 +3906,7 @@
           </a:lstStyle>
           <a:p>
             <a:r>
-              <a:rPr lang="en-US" smtClean="0"/>
+              <a:rPr lang="en-US"/>
               <a:t>Click to edit Master title style</a:t>
             </a:r>
             <a:endParaRPr lang="en-US" dirty="0"/>
@@ -3964,7 +3980,7 @@
           <a:p>
             <a:pPr lvl="0"/>
             <a:r>
-              <a:rPr lang="en-US" smtClean="0"/>
+              <a:rPr lang="en-US"/>
               <a:t>Click to edit Master text styles</a:t>
             </a:r>
           </a:p>
@@ -4031,7 +4047,7 @@
           <a:p>
             <a:pPr lvl="0"/>
             <a:r>
-              <a:rPr lang="en-US" smtClean="0"/>
+              <a:rPr lang="en-US"/>
               <a:t>Click to edit Master text styles</a:t>
             </a:r>
           </a:p>
@@ -4054,7 +4070,7 @@
           <a:p>
             <a:fld id="{110CAD28-65F7-48D0-9A90-0EC8C2ACC4D7}" type="datetimeFigureOut">
               <a:rPr lang="en-US" smtClean="0"/>
-              <a:t>2/17/2019</a:t>
+              <a:t>2/19/2019</a:t>
             </a:fld>
             <a:endParaRPr lang="en-US"/>
           </a:p>
@@ -4974,7 +4990,7 @@
           </a:lstStyle>
           <a:p>
             <a:r>
-              <a:rPr lang="en-US" smtClean="0"/>
+              <a:rPr lang="en-US"/>
               <a:t>Click to edit Master title style</a:t>
             </a:r>
             <a:endParaRPr lang="en-US" dirty="0"/>
@@ -5092,7 +5108,7 @@
           <a:p>
             <a:pPr lvl="0"/>
             <a:r>
-              <a:rPr lang="en-US" smtClean="0"/>
+              <a:rPr lang="en-US"/>
               <a:t>Click to edit Master text styles</a:t>
             </a:r>
           </a:p>
@@ -5115,7 +5131,7 @@
           <a:p>
             <a:fld id="{110CAD28-65F7-48D0-9A90-0EC8C2ACC4D7}" type="datetimeFigureOut">
               <a:rPr lang="en-US" smtClean="0"/>
-              <a:t>2/17/2019</a:t>
+              <a:t>2/19/2019</a:t>
             </a:fld>
             <a:endParaRPr lang="en-US"/>
           </a:p>
@@ -5249,7 +5265,7 @@
           </a:lstStyle>
           <a:p>
             <a:r>
-              <a:rPr lang="en-US" smtClean="0"/>
+              <a:rPr lang="en-US"/>
               <a:t>Click to edit Master title style</a:t>
             </a:r>
             <a:endParaRPr lang="en-US" dirty="0"/>
@@ -5321,7 +5337,7 @@
           <a:p>
             <a:pPr lvl="0"/>
             <a:r>
-              <a:rPr lang="en-US" smtClean="0"/>
+              <a:rPr lang="en-US"/>
               <a:t>Click to edit Master text styles</a:t>
             </a:r>
           </a:p>
@@ -5388,7 +5404,7 @@
           <a:p>
             <a:pPr lvl="0"/>
             <a:r>
-              <a:rPr lang="en-US" smtClean="0"/>
+              <a:rPr lang="en-US"/>
               <a:t>Click to edit Master text styles</a:t>
             </a:r>
           </a:p>
@@ -5459,7 +5475,7 @@
           <a:p>
             <a:pPr lvl="0"/>
             <a:r>
-              <a:rPr lang="en-US" smtClean="0"/>
+              <a:rPr lang="en-US"/>
               <a:t>Click to edit Master text styles</a:t>
             </a:r>
           </a:p>
@@ -5526,7 +5542,7 @@
           <a:p>
             <a:pPr lvl="0"/>
             <a:r>
-              <a:rPr lang="en-US" smtClean="0"/>
+              <a:rPr lang="en-US"/>
               <a:t>Click to edit Master text styles</a:t>
             </a:r>
           </a:p>
@@ -5597,7 +5613,7 @@
           <a:p>
             <a:pPr lvl="0"/>
             <a:r>
-              <a:rPr lang="en-US" smtClean="0"/>
+              <a:rPr lang="en-US"/>
               <a:t>Click to edit Master text styles</a:t>
             </a:r>
           </a:p>
@@ -5664,7 +5680,7 @@
           <a:p>
             <a:pPr lvl="0"/>
             <a:r>
-              <a:rPr lang="en-US" smtClean="0"/>
+              <a:rPr lang="en-US"/>
               <a:t>Click to edit Master text styles</a:t>
             </a:r>
           </a:p>
@@ -5761,7 +5777,7 @@
           <a:p>
             <a:fld id="{110CAD28-65F7-48D0-9A90-0EC8C2ACC4D7}" type="datetimeFigureOut">
               <a:rPr lang="en-US" smtClean="0"/>
-              <a:t>2/17/2019</a:t>
+              <a:t>2/19/2019</a:t>
             </a:fld>
             <a:endParaRPr lang="en-US"/>
           </a:p>
@@ -5859,7 +5875,7 @@
           </a:lstStyle>
           <a:p>
             <a:r>
-              <a:rPr lang="en-US" smtClean="0"/>
+              <a:rPr lang="en-US"/>
               <a:t>Click to edit Master title style</a:t>
             </a:r>
             <a:endParaRPr lang="en-US" dirty="0"/>
@@ -5931,7 +5947,7 @@
           <a:p>
             <a:pPr lvl="0"/>
             <a:r>
-              <a:rPr lang="en-US" smtClean="0"/>
+              <a:rPr lang="en-US"/>
               <a:t>Click to edit Master text styles</a:t>
             </a:r>
           </a:p>
@@ -6009,7 +6025,7 @@
           </a:lstStyle>
           <a:p>
             <a:r>
-              <a:rPr lang="en-US" smtClean="0"/>
+              <a:rPr lang="en-US"/>
               <a:t>Click icon to add picture</a:t>
             </a:r>
             <a:endParaRPr lang="en-US" dirty="0"/>
@@ -6077,7 +6093,7 @@
           <a:p>
             <a:pPr lvl="0"/>
             <a:r>
-              <a:rPr lang="en-US" smtClean="0"/>
+              <a:rPr lang="en-US"/>
               <a:t>Click to edit Master text styles</a:t>
             </a:r>
           </a:p>
@@ -6148,7 +6164,7 @@
           <a:p>
             <a:pPr lvl="0"/>
             <a:r>
-              <a:rPr lang="en-US" smtClean="0"/>
+              <a:rPr lang="en-US"/>
               <a:t>Click to edit Master text styles</a:t>
             </a:r>
           </a:p>
@@ -6226,7 +6242,7 @@
           </a:lstStyle>
           <a:p>
             <a:r>
-              <a:rPr lang="en-US" smtClean="0"/>
+              <a:rPr lang="en-US"/>
               <a:t>Click icon to add picture</a:t>
             </a:r>
             <a:endParaRPr lang="en-US" dirty="0"/>
@@ -6294,7 +6310,7 @@
           <a:p>
             <a:pPr lvl="0"/>
             <a:r>
-              <a:rPr lang="en-US" smtClean="0"/>
+              <a:rPr lang="en-US"/>
               <a:t>Click to edit Master text styles</a:t>
             </a:r>
           </a:p>
@@ -6365,7 +6381,7 @@
           <a:p>
             <a:pPr lvl="0"/>
             <a:r>
-              <a:rPr lang="en-US" smtClean="0"/>
+              <a:rPr lang="en-US"/>
               <a:t>Click to edit Master text styles</a:t>
             </a:r>
           </a:p>
@@ -6443,7 +6459,7 @@
           </a:lstStyle>
           <a:p>
             <a:r>
-              <a:rPr lang="en-US" smtClean="0"/>
+              <a:rPr lang="en-US"/>
               <a:t>Click icon to add picture</a:t>
             </a:r>
             <a:endParaRPr lang="en-US" dirty="0"/>
@@ -6511,7 +6527,7 @@
           <a:p>
             <a:pPr lvl="0"/>
             <a:r>
-              <a:rPr lang="en-US" smtClean="0"/>
+              <a:rPr lang="en-US"/>
               <a:t>Click to edit Master text styles</a:t>
             </a:r>
           </a:p>
@@ -6608,7 +6624,7 @@
           <a:p>
             <a:fld id="{110CAD28-65F7-48D0-9A90-0EC8C2ACC4D7}" type="datetimeFigureOut">
               <a:rPr lang="en-US" smtClean="0"/>
-              <a:t>2/17/2019</a:t>
+              <a:t>2/19/2019</a:t>
             </a:fld>
             <a:endParaRPr lang="en-US"/>
           </a:p>
@@ -6707,7 +6723,7 @@
           <a:lstStyle/>
           <a:p>
             <a:r>
-              <a:rPr lang="en-US" smtClean="0"/>
+              <a:rPr lang="en-US"/>
               <a:t>Click to edit Master title style</a:t>
             </a:r>
             <a:endParaRPr lang="en-US" dirty="0"/>
@@ -6731,35 +6747,35 @@
           <a:p>
             <a:pPr lvl="0"/>
             <a:r>
-              <a:rPr lang="en-US" smtClean="0"/>
+              <a:rPr lang="en-US"/>
               <a:t>Click to edit Master text styles</a:t>
             </a:r>
           </a:p>
           <a:p>
             <a:pPr lvl="1"/>
             <a:r>
-              <a:rPr lang="en-US" smtClean="0"/>
+              <a:rPr lang="en-US"/>
               <a:t>Second level</a:t>
             </a:r>
           </a:p>
           <a:p>
             <a:pPr lvl="2"/>
             <a:r>
-              <a:rPr lang="en-US" smtClean="0"/>
+              <a:rPr lang="en-US"/>
               <a:t>Third level</a:t>
             </a:r>
           </a:p>
           <a:p>
             <a:pPr lvl="3"/>
             <a:r>
-              <a:rPr lang="en-US" smtClean="0"/>
+              <a:rPr lang="en-US"/>
               <a:t>Fourth level</a:t>
             </a:r>
           </a:p>
           <a:p>
             <a:pPr lvl="4"/>
             <a:r>
-              <a:rPr lang="en-US" smtClean="0"/>
+              <a:rPr lang="en-US"/>
               <a:t>Fifth level</a:t>
             </a:r>
             <a:endParaRPr lang="en-US" dirty="0"/>
@@ -6783,7 +6799,7 @@
           <a:p>
             <a:fld id="{110CAD28-65F7-48D0-9A90-0EC8C2ACC4D7}" type="datetimeFigureOut">
               <a:rPr lang="en-US" smtClean="0"/>
-              <a:t>2/17/2019</a:t>
+              <a:t>2/19/2019</a:t>
             </a:fld>
             <a:endParaRPr lang="en-US"/>
           </a:p>
@@ -7700,7 +7716,7 @@
           <a:lstStyle/>
           <a:p>
             <a:r>
-              <a:rPr lang="en-US" smtClean="0"/>
+              <a:rPr lang="en-US"/>
               <a:t>Click to edit Master title style</a:t>
             </a:r>
             <a:endParaRPr lang="en-US" dirty="0"/>
@@ -7729,35 +7745,35 @@
           <a:p>
             <a:pPr lvl="0"/>
             <a:r>
-              <a:rPr lang="en-US" smtClean="0"/>
+              <a:rPr lang="en-US"/>
               <a:t>Click to edit Master text styles</a:t>
             </a:r>
           </a:p>
           <a:p>
             <a:pPr lvl="1"/>
             <a:r>
-              <a:rPr lang="en-US" smtClean="0"/>
+              <a:rPr lang="en-US"/>
               <a:t>Second level</a:t>
             </a:r>
           </a:p>
           <a:p>
             <a:pPr lvl="2"/>
             <a:r>
-              <a:rPr lang="en-US" smtClean="0"/>
+              <a:rPr lang="en-US"/>
               <a:t>Third level</a:t>
             </a:r>
           </a:p>
           <a:p>
             <a:pPr lvl="3"/>
             <a:r>
-              <a:rPr lang="en-US" smtClean="0"/>
+              <a:rPr lang="en-US"/>
               <a:t>Fourth level</a:t>
             </a:r>
           </a:p>
           <a:p>
             <a:pPr lvl="4"/>
             <a:r>
-              <a:rPr lang="en-US" smtClean="0"/>
+              <a:rPr lang="en-US"/>
               <a:t>Fifth level</a:t>
             </a:r>
             <a:endParaRPr lang="en-US" dirty="0"/>
@@ -7781,7 +7797,7 @@
           <a:p>
             <a:fld id="{110CAD28-65F7-48D0-9A90-0EC8C2ACC4D7}" type="datetimeFigureOut">
               <a:rPr lang="en-US" smtClean="0"/>
-              <a:t>2/17/2019</a:t>
+              <a:t>2/19/2019</a:t>
             </a:fld>
             <a:endParaRPr lang="en-US"/>
           </a:p>
@@ -7911,7 +7927,7 @@
           <a:lstStyle/>
           <a:p>
             <a:r>
-              <a:rPr lang="en-US" smtClean="0"/>
+              <a:rPr lang="en-US"/>
               <a:t>Click to edit Master title style</a:t>
             </a:r>
             <a:endParaRPr lang="en-US" dirty="0"/>
@@ -7935,35 +7951,35 @@
           <a:p>
             <a:pPr lvl="0"/>
             <a:r>
-              <a:rPr lang="en-US" smtClean="0"/>
+              <a:rPr lang="en-US"/>
               <a:t>Click to edit Master text styles</a:t>
             </a:r>
           </a:p>
           <a:p>
             <a:pPr lvl="1"/>
             <a:r>
-              <a:rPr lang="en-US" smtClean="0"/>
+              <a:rPr lang="en-US"/>
               <a:t>Second level</a:t>
             </a:r>
           </a:p>
           <a:p>
             <a:pPr lvl="2"/>
             <a:r>
-              <a:rPr lang="en-US" smtClean="0"/>
+              <a:rPr lang="en-US"/>
               <a:t>Third level</a:t>
             </a:r>
           </a:p>
           <a:p>
             <a:pPr lvl="3"/>
             <a:r>
-              <a:rPr lang="en-US" smtClean="0"/>
+              <a:rPr lang="en-US"/>
               <a:t>Fourth level</a:t>
             </a:r>
           </a:p>
           <a:p>
             <a:pPr lvl="4"/>
             <a:r>
-              <a:rPr lang="en-US" smtClean="0"/>
+              <a:rPr lang="en-US"/>
               <a:t>Fifth level</a:t>
             </a:r>
             <a:endParaRPr lang="en-US" dirty="0"/>
@@ -7987,7 +8003,7 @@
           <a:p>
             <a:fld id="{110CAD28-65F7-48D0-9A90-0EC8C2ACC4D7}" type="datetimeFigureOut">
               <a:rPr lang="en-US" smtClean="0"/>
-              <a:t>2/17/2019</a:t>
+              <a:t>2/19/2019</a:t>
             </a:fld>
             <a:endParaRPr lang="en-US"/>
           </a:p>
@@ -8908,7 +8924,7 @@
           </a:lstStyle>
           <a:p>
             <a:r>
-              <a:rPr lang="en-US" smtClean="0"/>
+              <a:rPr lang="en-US"/>
               <a:t>Click to edit Master title style</a:t>
             </a:r>
             <a:endParaRPr lang="en-US" dirty="0"/>
@@ -9026,7 +9042,7 @@
           <a:p>
             <a:pPr lvl="0"/>
             <a:r>
-              <a:rPr lang="en-US" smtClean="0"/>
+              <a:rPr lang="en-US"/>
               <a:t>Click to edit Master text styles</a:t>
             </a:r>
           </a:p>
@@ -9049,7 +9065,7 @@
           <a:p>
             <a:fld id="{110CAD28-65F7-48D0-9A90-0EC8C2ACC4D7}" type="datetimeFigureOut">
               <a:rPr lang="en-US" smtClean="0"/>
-              <a:t>2/17/2019</a:t>
+              <a:t>2/19/2019</a:t>
             </a:fld>
             <a:endParaRPr lang="en-US"/>
           </a:p>
@@ -9179,7 +9195,7 @@
           <a:lstStyle/>
           <a:p>
             <a:r>
-              <a:rPr lang="en-US" smtClean="0"/>
+              <a:rPr lang="en-US"/>
               <a:t>Click to edit Master title style</a:t>
             </a:r>
             <a:endParaRPr lang="en-US" dirty="0"/>
@@ -9210,35 +9226,35 @@
           <a:p>
             <a:pPr lvl="0"/>
             <a:r>
-              <a:rPr lang="en-US" smtClean="0"/>
+              <a:rPr lang="en-US"/>
               <a:t>Click to edit Master text styles</a:t>
             </a:r>
           </a:p>
           <a:p>
             <a:pPr lvl="1"/>
             <a:r>
-              <a:rPr lang="en-US" smtClean="0"/>
+              <a:rPr lang="en-US"/>
               <a:t>Second level</a:t>
             </a:r>
           </a:p>
           <a:p>
             <a:pPr lvl="2"/>
             <a:r>
-              <a:rPr lang="en-US" smtClean="0"/>
+              <a:rPr lang="en-US"/>
               <a:t>Third level</a:t>
             </a:r>
           </a:p>
           <a:p>
             <a:pPr lvl="3"/>
             <a:r>
-              <a:rPr lang="en-US" smtClean="0"/>
+              <a:rPr lang="en-US"/>
               <a:t>Fourth level</a:t>
             </a:r>
           </a:p>
           <a:p>
             <a:pPr lvl="4"/>
             <a:r>
-              <a:rPr lang="en-US" smtClean="0"/>
+              <a:rPr lang="en-US"/>
               <a:t>Fifth level</a:t>
             </a:r>
             <a:endParaRPr lang="en-US" dirty="0"/>
@@ -9269,35 +9285,35 @@
           <a:p>
             <a:pPr lvl="0"/>
             <a:r>
-              <a:rPr lang="en-US" smtClean="0"/>
+              <a:rPr lang="en-US"/>
               <a:t>Click to edit Master text styles</a:t>
             </a:r>
           </a:p>
           <a:p>
             <a:pPr lvl="1"/>
             <a:r>
-              <a:rPr lang="en-US" smtClean="0"/>
+              <a:rPr lang="en-US"/>
               <a:t>Second level</a:t>
             </a:r>
           </a:p>
           <a:p>
             <a:pPr lvl="2"/>
             <a:r>
-              <a:rPr lang="en-US" smtClean="0"/>
+              <a:rPr lang="en-US"/>
               <a:t>Third level</a:t>
             </a:r>
           </a:p>
           <a:p>
             <a:pPr lvl="3"/>
             <a:r>
-              <a:rPr lang="en-US" smtClean="0"/>
+              <a:rPr lang="en-US"/>
               <a:t>Fourth level</a:t>
             </a:r>
           </a:p>
           <a:p>
             <a:pPr lvl="4"/>
             <a:r>
-              <a:rPr lang="en-US" smtClean="0"/>
+              <a:rPr lang="en-US"/>
               <a:t>Fifth level</a:t>
             </a:r>
             <a:endParaRPr lang="en-US" dirty="0"/>
@@ -9321,7 +9337,7 @@
           <a:p>
             <a:fld id="{110CAD28-65F7-48D0-9A90-0EC8C2ACC4D7}" type="datetimeFigureOut">
               <a:rPr lang="en-US" smtClean="0"/>
-              <a:t>2/17/2019</a:t>
+              <a:t>2/19/2019</a:t>
             </a:fld>
             <a:endParaRPr lang="en-US"/>
           </a:p>
@@ -9419,7 +9435,7 @@
           </a:lstStyle>
           <a:p>
             <a:r>
-              <a:rPr lang="en-US" smtClean="0"/>
+              <a:rPr lang="en-US"/>
               <a:t>Click to edit Master title style</a:t>
             </a:r>
             <a:endParaRPr lang="en-US" dirty="0"/>
@@ -9491,7 +9507,7 @@
           <a:p>
             <a:pPr lvl="0"/>
             <a:r>
-              <a:rPr lang="en-US" smtClean="0"/>
+              <a:rPr lang="en-US"/>
               <a:t>Click to edit Master text styles</a:t>
             </a:r>
           </a:p>
@@ -9521,35 +9537,35 @@
           <a:p>
             <a:pPr lvl="0"/>
             <a:r>
-              <a:rPr lang="en-US" smtClean="0"/>
+              <a:rPr lang="en-US"/>
               <a:t>Click to edit Master text styles</a:t>
             </a:r>
           </a:p>
           <a:p>
             <a:pPr lvl="1"/>
             <a:r>
-              <a:rPr lang="en-US" smtClean="0"/>
+              <a:rPr lang="en-US"/>
               <a:t>Second level</a:t>
             </a:r>
           </a:p>
           <a:p>
             <a:pPr lvl="2"/>
             <a:r>
-              <a:rPr lang="en-US" smtClean="0"/>
+              <a:rPr lang="en-US"/>
               <a:t>Third level</a:t>
             </a:r>
           </a:p>
           <a:p>
             <a:pPr lvl="3"/>
             <a:r>
-              <a:rPr lang="en-US" smtClean="0"/>
+              <a:rPr lang="en-US"/>
               <a:t>Fourth level</a:t>
             </a:r>
           </a:p>
           <a:p>
             <a:pPr lvl="4"/>
             <a:r>
-              <a:rPr lang="en-US" smtClean="0"/>
+              <a:rPr lang="en-US"/>
               <a:t>Fifth level</a:t>
             </a:r>
             <a:endParaRPr lang="en-US" dirty="0"/>
@@ -9621,7 +9637,7 @@
           <a:p>
             <a:pPr lvl="0"/>
             <a:r>
-              <a:rPr lang="en-US" smtClean="0"/>
+              <a:rPr lang="en-US"/>
               <a:t>Click to edit Master text styles</a:t>
             </a:r>
           </a:p>
@@ -9651,35 +9667,35 @@
           <a:p>
             <a:pPr lvl="0"/>
             <a:r>
-              <a:rPr lang="en-US" smtClean="0"/>
+              <a:rPr lang="en-US"/>
               <a:t>Click to edit Master text styles</a:t>
             </a:r>
           </a:p>
           <a:p>
             <a:pPr lvl="1"/>
             <a:r>
-              <a:rPr lang="en-US" smtClean="0"/>
+              <a:rPr lang="en-US"/>
               <a:t>Second level</a:t>
             </a:r>
           </a:p>
           <a:p>
             <a:pPr lvl="2"/>
             <a:r>
-              <a:rPr lang="en-US" smtClean="0"/>
+              <a:rPr lang="en-US"/>
               <a:t>Third level</a:t>
             </a:r>
           </a:p>
           <a:p>
             <a:pPr lvl="3"/>
             <a:r>
-              <a:rPr lang="en-US" smtClean="0"/>
+              <a:rPr lang="en-US"/>
               <a:t>Fourth level</a:t>
             </a:r>
           </a:p>
           <a:p>
             <a:pPr lvl="4"/>
             <a:r>
-              <a:rPr lang="en-US" smtClean="0"/>
+              <a:rPr lang="en-US"/>
               <a:t>Fifth level</a:t>
             </a:r>
             <a:endParaRPr lang="en-US" dirty="0"/>
@@ -9703,7 +9719,7 @@
           <a:p>
             <a:fld id="{110CAD28-65F7-48D0-9A90-0EC8C2ACC4D7}" type="datetimeFigureOut">
               <a:rPr lang="en-US" smtClean="0"/>
-              <a:t>2/17/2019</a:t>
+              <a:t>2/19/2019</a:t>
             </a:fld>
             <a:endParaRPr lang="en-US"/>
           </a:p>
@@ -9797,7 +9813,7 @@
           <a:lstStyle/>
           <a:p>
             <a:r>
-              <a:rPr lang="en-US" smtClean="0"/>
+              <a:rPr lang="en-US"/>
               <a:t>Click to edit Master title style</a:t>
             </a:r>
             <a:endParaRPr lang="en-US" dirty="0"/>
@@ -9821,7 +9837,7 @@
           <a:p>
             <a:fld id="{110CAD28-65F7-48D0-9A90-0EC8C2ACC4D7}" type="datetimeFigureOut">
               <a:rPr lang="en-US" smtClean="0"/>
-              <a:t>2/17/2019</a:t>
+              <a:t>2/19/2019</a:t>
             </a:fld>
             <a:endParaRPr lang="en-US"/>
           </a:p>
@@ -9916,7 +9932,7 @@
           <a:p>
             <a:fld id="{110CAD28-65F7-48D0-9A90-0EC8C2ACC4D7}" type="datetimeFigureOut">
               <a:rPr lang="en-US" smtClean="0"/>
-              <a:t>2/17/2019</a:t>
+              <a:t>2/19/2019</a:t>
             </a:fld>
             <a:endParaRPr lang="en-US"/>
           </a:p>
@@ -10873,7 +10889,7 @@
           </a:lstStyle>
           <a:p>
             <a:r>
-              <a:rPr lang="en-US" smtClean="0"/>
+              <a:rPr lang="en-US"/>
               <a:t>Click to edit Master title style</a:t>
             </a:r>
             <a:endParaRPr lang="en-US" dirty="0"/>
@@ -10904,35 +10920,35 @@
           <a:p>
             <a:pPr lvl="0"/>
             <a:r>
-              <a:rPr lang="en-US" smtClean="0"/>
+              <a:rPr lang="en-US"/>
               <a:t>Click to edit Master text styles</a:t>
             </a:r>
           </a:p>
           <a:p>
             <a:pPr lvl="1"/>
             <a:r>
-              <a:rPr lang="en-US" smtClean="0"/>
+              <a:rPr lang="en-US"/>
               <a:t>Second level</a:t>
             </a:r>
           </a:p>
           <a:p>
             <a:pPr lvl="2"/>
             <a:r>
-              <a:rPr lang="en-US" smtClean="0"/>
+              <a:rPr lang="en-US"/>
               <a:t>Third level</a:t>
             </a:r>
           </a:p>
           <a:p>
             <a:pPr lvl="3"/>
             <a:r>
-              <a:rPr lang="en-US" smtClean="0"/>
+              <a:rPr lang="en-US"/>
               <a:t>Fourth level</a:t>
             </a:r>
           </a:p>
           <a:p>
             <a:pPr lvl="4"/>
             <a:r>
-              <a:rPr lang="en-US" smtClean="0"/>
+              <a:rPr lang="en-US"/>
               <a:t>Fifth level</a:t>
             </a:r>
             <a:endParaRPr lang="en-US" dirty="0"/>
@@ -11002,7 +11018,7 @@
           <a:p>
             <a:pPr lvl="0"/>
             <a:r>
-              <a:rPr lang="en-US" smtClean="0"/>
+              <a:rPr lang="en-US"/>
               <a:t>Click to edit Master text styles</a:t>
             </a:r>
           </a:p>
@@ -11025,7 +11041,7 @@
           <a:p>
             <a:fld id="{110CAD28-65F7-48D0-9A90-0EC8C2ACC4D7}" type="datetimeFigureOut">
               <a:rPr lang="en-US" smtClean="0"/>
-              <a:t>2/17/2019</a:t>
+              <a:t>2/19/2019</a:t>
             </a:fld>
             <a:endParaRPr lang="en-US"/>
           </a:p>
@@ -11984,7 +12000,7 @@
           </a:lstStyle>
           <a:p>
             <a:r>
-              <a:rPr lang="en-US" smtClean="0"/>
+              <a:rPr lang="en-US"/>
               <a:t>Click to edit Master title style</a:t>
             </a:r>
             <a:endParaRPr lang="en-US" dirty="0"/>
@@ -12063,7 +12079,7 @@
           </a:lstStyle>
           <a:p>
             <a:r>
-              <a:rPr lang="en-US" smtClean="0"/>
+              <a:rPr lang="en-US"/>
               <a:t>Click icon to add picture</a:t>
             </a:r>
             <a:endParaRPr lang="en-US" dirty="0"/>
@@ -12135,7 +12151,7 @@
           <a:p>
             <a:pPr lvl="0"/>
             <a:r>
-              <a:rPr lang="en-US" smtClean="0"/>
+              <a:rPr lang="en-US"/>
               <a:t>Click to edit Master text styles</a:t>
             </a:r>
           </a:p>
@@ -12158,7 +12174,7 @@
           <a:p>
             <a:fld id="{110CAD28-65F7-48D0-9A90-0EC8C2ACC4D7}" type="datetimeFigureOut">
               <a:rPr lang="en-US" smtClean="0"/>
-              <a:t>2/17/2019</a:t>
+              <a:t>2/19/2019</a:t>
             </a:fld>
             <a:endParaRPr lang="en-US"/>
           </a:p>
@@ -13084,7 +13100,7 @@
           <a:lstStyle/>
           <a:p>
             <a:r>
-              <a:rPr lang="en-US" smtClean="0"/>
+              <a:rPr lang="en-US"/>
               <a:t>Click to edit Master title style</a:t>
             </a:r>
             <a:endParaRPr lang="en-US" dirty="0"/>
@@ -13118,35 +13134,35 @@
           <a:p>
             <a:pPr lvl="0"/>
             <a:r>
-              <a:rPr lang="en-US" smtClean="0"/>
+              <a:rPr lang="en-US"/>
               <a:t>Click to edit Master text styles</a:t>
             </a:r>
           </a:p>
           <a:p>
             <a:pPr lvl="1"/>
             <a:r>
-              <a:rPr lang="en-US" smtClean="0"/>
+              <a:rPr lang="en-US"/>
               <a:t>Second level</a:t>
             </a:r>
           </a:p>
           <a:p>
             <a:pPr lvl="2"/>
             <a:r>
-              <a:rPr lang="en-US" smtClean="0"/>
+              <a:rPr lang="en-US"/>
               <a:t>Third level</a:t>
             </a:r>
           </a:p>
           <a:p>
             <a:pPr lvl="3"/>
             <a:r>
-              <a:rPr lang="en-US" smtClean="0"/>
+              <a:rPr lang="en-US"/>
               <a:t>Fourth level</a:t>
             </a:r>
           </a:p>
           <a:p>
             <a:pPr lvl="4"/>
             <a:r>
-              <a:rPr lang="en-US" smtClean="0"/>
+              <a:rPr lang="en-US"/>
               <a:t>Fifth level</a:t>
             </a:r>
             <a:endParaRPr lang="en-US" dirty="0"/>
@@ -13186,7 +13202,7 @@
           <a:p>
             <a:fld id="{110CAD28-65F7-48D0-9A90-0EC8C2ACC4D7}" type="datetimeFigureOut">
               <a:rPr lang="en-US" smtClean="0"/>
-              <a:t>2/17/2019</a:t>
+              <a:t>2/19/2019</a:t>
             </a:fld>
             <a:endParaRPr lang="en-US"/>
           </a:p>
@@ -13763,10 +13779,32 @@
           <a:lstStyle/>
           <a:p>
             <a:r>
-              <a:rPr lang="en-US" dirty="0" smtClean="0"/>
-              <a:t>Project Proposal</a:t>
-            </a:r>
-            <a:endParaRPr lang="en-US" dirty="0"/>
+              <a:rPr lang="en-US" sz="3200" dirty="0"/>
+              <a:t>Project Proposal on</a:t>
+            </a:r>
+            <a:r>
+              <a:rPr lang="en-US" dirty="0"/>
+              <a:t/>
+            </a:r>
+            <a:br>
+              <a:rPr lang="en-US" dirty="0"/>
+            </a:br>
+            <a:r>
+              <a:rPr lang="en-US" dirty="0"/>
+              <a:t>“</a:t>
+            </a:r>
+            <a:r>
+              <a:rPr lang="en-US" sz="6000" dirty="0">
+                <a:solidFill>
+                  <a:srgbClr val="FFFF00"/>
+                </a:solidFill>
+              </a:rPr>
+              <a:t>Pizza Ordering App</a:t>
+            </a:r>
+            <a:r>
+              <a:rPr lang="en-US" dirty="0"/>
+              <a:t>”</a:t>
+            </a:r>
           </a:p>
         </p:txBody>
       </p:sp>
@@ -13785,9 +13823,27 @@
           <a:bodyPr/>
           <a:lstStyle/>
           <a:p>
-            <a:r>
-              <a:rPr lang="en-US" dirty="0" smtClean="0"/>
-              <a:t>Pizza Ordering App</a:t>
+            <a:pPr algn="r"/>
+            <a:r>
+              <a:rPr lang="en-US" dirty="0">
+                <a:solidFill>
+                  <a:schemeClr val="tx1"/>
+                </a:solidFill>
+                <a:latin typeface="Book Antiqua" panose="02040602050305030304" pitchFamily="18" charset="0"/>
+              </a:rPr>
+              <a:t>Limon Motin – 1620902042</a:t>
+            </a:r>
+          </a:p>
+          <a:p>
+            <a:pPr algn="r"/>
+            <a:r>
+              <a:rPr lang="en-US" dirty="0">
+                <a:solidFill>
+                  <a:schemeClr val="tx1"/>
+                </a:solidFill>
+                <a:latin typeface="Book Antiqua" panose="02040602050305030304" pitchFamily="18" charset="0"/>
+              </a:rPr>
+              <a:t>Md. Golam Rabby Shuvo - 1620044042</a:t>
             </a:r>
           </a:p>
           <a:p>
@@ -13799,6 +13855,1232 @@
     <p:extLst>
       <p:ext uri="{BB962C8B-B14F-4D97-AF65-F5344CB8AC3E}">
         <p14:creationId xmlns:p14="http://schemas.microsoft.com/office/powerpoint/2010/main" val="850933021"/>
+      </p:ext>
+    </p:extLst>
+  </p:cSld>
+  <p:clrMapOvr>
+    <a:masterClrMapping/>
+  </p:clrMapOvr>
+</p:sld>
+</file>
+
+<file path=ppt/slides/slide10.xml><?xml version="1.0" encoding="utf-8"?>
+<p:sld xmlns:a="http://schemas.openxmlformats.org/drawingml/2006/main" xmlns:r="http://schemas.openxmlformats.org/officeDocument/2006/relationships" xmlns:p="http://schemas.openxmlformats.org/presentationml/2006/main">
+  <p:cSld>
+    <p:spTree>
+      <p:nvGrpSpPr>
+        <p:cNvPr id="1" name=""/>
+        <p:cNvGrpSpPr/>
+        <p:nvPr/>
+      </p:nvGrpSpPr>
+      <p:grpSpPr>
+        <a:xfrm>
+          <a:off x="0" y="0"/>
+          <a:ext cx="0" cy="0"/>
+          <a:chOff x="0" y="0"/>
+          <a:chExt cx="0" cy="0"/>
+        </a:xfrm>
+      </p:grpSpPr>
+      <p:sp>
+        <p:nvSpPr>
+          <p:cNvPr id="2" name="Title 1"/>
+          <p:cNvSpPr>
+            <a:spLocks noGrp="1"/>
+          </p:cNvSpPr>
+          <p:nvPr>
+            <p:ph type="title"/>
+          </p:nvPr>
+        </p:nvSpPr>
+        <p:spPr/>
+        <p:txBody>
+          <a:bodyPr/>
+          <a:lstStyle/>
+          <a:p>
+            <a:r>
+              <a:rPr lang="en-US" dirty="0" smtClean="0"/>
+              <a:t>Planning</a:t>
+            </a:r>
+            <a:endParaRPr lang="en-US" dirty="0"/>
+          </a:p>
+        </p:txBody>
+      </p:sp>
+      <p:sp>
+        <p:nvSpPr>
+          <p:cNvPr id="6" name="Content Placeholder 5"/>
+          <p:cNvSpPr>
+            <a:spLocks noGrp="1"/>
+          </p:cNvSpPr>
+          <p:nvPr>
+            <p:ph idx="1"/>
+          </p:nvPr>
+        </p:nvSpPr>
+        <p:spPr/>
+        <p:txBody>
+          <a:bodyPr/>
+          <a:lstStyle/>
+          <a:p>
+            <a:r>
+              <a:rPr lang="en-US" dirty="0" smtClean="0"/>
+              <a:t>Gantt Chart:</a:t>
+            </a:r>
+          </a:p>
+          <a:p>
+            <a:endParaRPr lang="en-US" dirty="0"/>
+          </a:p>
+        </p:txBody>
+      </p:sp>
+      <p:pic>
+        <p:nvPicPr>
+          <p:cNvPr id="9" name="Content Placeholder 6"/>
+          <p:cNvPicPr>
+            <a:picLocks/>
+          </p:cNvPicPr>
+          <p:nvPr/>
+        </p:nvPicPr>
+        <p:blipFill>
+          <a:blip r:embed="rId2">
+            <a:extLst>
+              <a:ext uri="{28A0092B-C50C-407E-A947-70E740481C1C}">
+                <a14:useLocalDpi xmlns:a14="http://schemas.microsoft.com/office/drawing/2010/main" val="0"/>
+              </a:ext>
+            </a:extLst>
+          </a:blip>
+          <a:stretch>
+            <a:fillRect/>
+          </a:stretch>
+        </p:blipFill>
+        <p:spPr>
+          <a:xfrm>
+            <a:off x="2096513" y="2937622"/>
+            <a:ext cx="8761413" cy="3291161"/>
+          </a:xfrm>
+          <a:prstGeom prst="rect">
+            <a:avLst/>
+          </a:prstGeom>
+        </p:spPr>
+      </p:pic>
+    </p:spTree>
+    <p:extLst>
+      <p:ext uri="{BB962C8B-B14F-4D97-AF65-F5344CB8AC3E}">
+        <p14:creationId xmlns:p14="http://schemas.microsoft.com/office/powerpoint/2010/main" val="3394607143"/>
+      </p:ext>
+    </p:extLst>
+  </p:cSld>
+  <p:clrMapOvr>
+    <a:masterClrMapping/>
+  </p:clrMapOvr>
+</p:sld>
+</file>
+
+<file path=ppt/slides/slide11.xml><?xml version="1.0" encoding="utf-8"?>
+<p:sld xmlns:a="http://schemas.openxmlformats.org/drawingml/2006/main" xmlns:r="http://schemas.openxmlformats.org/officeDocument/2006/relationships" xmlns:p="http://schemas.openxmlformats.org/presentationml/2006/main">
+  <p:cSld>
+    <p:spTree>
+      <p:nvGrpSpPr>
+        <p:cNvPr id="1" name=""/>
+        <p:cNvGrpSpPr/>
+        <p:nvPr/>
+      </p:nvGrpSpPr>
+      <p:grpSpPr>
+        <a:xfrm>
+          <a:off x="0" y="0"/>
+          <a:ext cx="0" cy="0"/>
+          <a:chOff x="0" y="0"/>
+          <a:chExt cx="0" cy="0"/>
+        </a:xfrm>
+      </p:grpSpPr>
+      <p:sp>
+        <p:nvSpPr>
+          <p:cNvPr id="2" name="Title 1"/>
+          <p:cNvSpPr>
+            <a:spLocks noGrp="1"/>
+          </p:cNvSpPr>
+          <p:nvPr>
+            <p:ph type="title"/>
+          </p:nvPr>
+        </p:nvSpPr>
+        <p:spPr/>
+        <p:txBody>
+          <a:bodyPr/>
+          <a:lstStyle/>
+          <a:p>
+            <a:endParaRPr lang="en-US"/>
+          </a:p>
+        </p:txBody>
+      </p:sp>
+      <p:sp>
+        <p:nvSpPr>
+          <p:cNvPr id="3" name="Content Placeholder 2"/>
+          <p:cNvSpPr>
+            <a:spLocks noGrp="1"/>
+          </p:cNvSpPr>
+          <p:nvPr>
+            <p:ph idx="1"/>
+          </p:nvPr>
+        </p:nvSpPr>
+        <p:spPr/>
+        <p:txBody>
+          <a:bodyPr/>
+          <a:lstStyle/>
+          <a:p>
+            <a:r>
+              <a:rPr lang="en-US" dirty="0" smtClean="0"/>
+              <a:t>Process Model:</a:t>
+            </a:r>
+          </a:p>
+          <a:p>
+            <a:endParaRPr lang="en-US" dirty="0"/>
+          </a:p>
+        </p:txBody>
+      </p:sp>
+      <p:pic>
+        <p:nvPicPr>
+          <p:cNvPr id="4" name="Picture 3"/>
+          <p:cNvPicPr/>
+          <p:nvPr/>
+        </p:nvPicPr>
+        <p:blipFill>
+          <a:blip r:embed="rId2">
+            <a:extLst>
+              <a:ext uri="{28A0092B-C50C-407E-A947-70E740481C1C}">
+                <a14:useLocalDpi xmlns:a14="http://schemas.microsoft.com/office/drawing/2010/main" val="0"/>
+              </a:ext>
+            </a:extLst>
+          </a:blip>
+          <a:stretch>
+            <a:fillRect/>
+          </a:stretch>
+        </p:blipFill>
+        <p:spPr>
+          <a:xfrm>
+            <a:off x="2519958" y="3017067"/>
+            <a:ext cx="7013340" cy="3302252"/>
+          </a:xfrm>
+          <a:prstGeom prst="rect">
+            <a:avLst/>
+          </a:prstGeom>
+        </p:spPr>
+      </p:pic>
+    </p:spTree>
+    <p:extLst>
+      <p:ext uri="{BB962C8B-B14F-4D97-AF65-F5344CB8AC3E}">
+        <p14:creationId xmlns:p14="http://schemas.microsoft.com/office/powerpoint/2010/main" val="360794255"/>
+      </p:ext>
+    </p:extLst>
+  </p:cSld>
+  <p:clrMapOvr>
+    <a:masterClrMapping/>
+  </p:clrMapOvr>
+</p:sld>
+</file>
+
+<file path=ppt/slides/slide12.xml><?xml version="1.0" encoding="utf-8"?>
+<p:sld xmlns:a="http://schemas.openxmlformats.org/drawingml/2006/main" xmlns:r="http://schemas.openxmlformats.org/officeDocument/2006/relationships" xmlns:p="http://schemas.openxmlformats.org/presentationml/2006/main">
+  <p:cSld>
+    <p:spTree>
+      <p:nvGrpSpPr>
+        <p:cNvPr id="1" name=""/>
+        <p:cNvGrpSpPr/>
+        <p:nvPr/>
+      </p:nvGrpSpPr>
+      <p:grpSpPr>
+        <a:xfrm>
+          <a:off x="0" y="0"/>
+          <a:ext cx="0" cy="0"/>
+          <a:chOff x="0" y="0"/>
+          <a:chExt cx="0" cy="0"/>
+        </a:xfrm>
+      </p:grpSpPr>
+      <p:sp>
+        <p:nvSpPr>
+          <p:cNvPr id="2" name="Title 1"/>
+          <p:cNvSpPr>
+            <a:spLocks noGrp="1"/>
+          </p:cNvSpPr>
+          <p:nvPr>
+            <p:ph type="title"/>
+          </p:nvPr>
+        </p:nvSpPr>
+        <p:spPr/>
+        <p:txBody>
+          <a:bodyPr/>
+          <a:lstStyle/>
+          <a:p>
+            <a:r>
+              <a:rPr lang="en-US" dirty="0" smtClean="0"/>
+              <a:t>Conclusion</a:t>
+            </a:r>
+            <a:endParaRPr lang="en-US" dirty="0"/>
+          </a:p>
+        </p:txBody>
+      </p:sp>
+      <p:sp>
+        <p:nvSpPr>
+          <p:cNvPr id="3" name="Content Placeholder 2"/>
+          <p:cNvSpPr>
+            <a:spLocks noGrp="1"/>
+          </p:cNvSpPr>
+          <p:nvPr>
+            <p:ph idx="1"/>
+          </p:nvPr>
+        </p:nvSpPr>
+        <p:spPr/>
+        <p:txBody>
+          <a:bodyPr/>
+          <a:lstStyle/>
+          <a:p>
+            <a:r>
+              <a:rPr lang="en-US" dirty="0"/>
+              <a:t>This project is not difficult to use, operate and understand by the users. Design of this project is </a:t>
+            </a:r>
+            <a:r>
+              <a:rPr lang="en-US" dirty="0" smtClean="0"/>
+              <a:t>pretty responsive </a:t>
+            </a:r>
+            <a:r>
+              <a:rPr lang="en-US" dirty="0"/>
+              <a:t>so that user won’t find it difficult to understand, use and navigate. This project provides the simplest system for managing </a:t>
+            </a:r>
+            <a:r>
+              <a:rPr lang="en-US"/>
+              <a:t>pizza </a:t>
+            </a:r>
+            <a:r>
+              <a:rPr lang="en-US" smtClean="0"/>
+              <a:t>orders. </a:t>
+            </a:r>
+            <a:endParaRPr lang="en-US" dirty="0"/>
+          </a:p>
+        </p:txBody>
+      </p:sp>
+    </p:spTree>
+    <p:extLst>
+      <p:ext uri="{BB962C8B-B14F-4D97-AF65-F5344CB8AC3E}">
+        <p14:creationId xmlns:p14="http://schemas.microsoft.com/office/powerpoint/2010/main" val="2632949503"/>
+      </p:ext>
+    </p:extLst>
+  </p:cSld>
+  <p:clrMapOvr>
+    <a:masterClrMapping/>
+  </p:clrMapOvr>
+</p:sld>
+</file>
+
+<file path=ppt/slides/slide2.xml><?xml version="1.0" encoding="utf-8"?>
+<p:sld xmlns:a="http://schemas.openxmlformats.org/drawingml/2006/main" xmlns:r="http://schemas.openxmlformats.org/officeDocument/2006/relationships" xmlns:p="http://schemas.openxmlformats.org/presentationml/2006/main">
+  <p:cSld>
+    <p:spTree>
+      <p:nvGrpSpPr>
+        <p:cNvPr id="1" name=""/>
+        <p:cNvGrpSpPr/>
+        <p:nvPr/>
+      </p:nvGrpSpPr>
+      <p:grpSpPr>
+        <a:xfrm>
+          <a:off x="0" y="0"/>
+          <a:ext cx="0" cy="0"/>
+          <a:chOff x="0" y="0"/>
+          <a:chExt cx="0" cy="0"/>
+        </a:xfrm>
+      </p:grpSpPr>
+      <p:sp>
+        <p:nvSpPr>
+          <p:cNvPr id="2" name="Title 1">
+            <a:extLst>
+              <a:ext uri="{FF2B5EF4-FFF2-40B4-BE49-F238E27FC236}">
+                <a16:creationId xmlns:a16="http://schemas.microsoft.com/office/drawing/2014/main" xmlns="" id="{3A3A44A3-C234-41A6-97E8-A56683FCD26B}"/>
+              </a:ext>
+            </a:extLst>
+          </p:cNvPr>
+          <p:cNvSpPr>
+            <a:spLocks noGrp="1"/>
+          </p:cNvSpPr>
+          <p:nvPr>
+            <p:ph type="title"/>
+          </p:nvPr>
+        </p:nvSpPr>
+        <p:spPr/>
+        <p:txBody>
+          <a:bodyPr/>
+          <a:lstStyle/>
+          <a:p>
+            <a:r>
+              <a:rPr lang="en-US" b="1"/>
+              <a:t>Introduction</a:t>
+            </a:r>
+            <a:endParaRPr lang="en-US" b="1" dirty="0"/>
+          </a:p>
+        </p:txBody>
+      </p:sp>
+      <p:sp>
+        <p:nvSpPr>
+          <p:cNvPr id="3" name="Content Placeholder 2">
+            <a:extLst>
+              <a:ext uri="{FF2B5EF4-FFF2-40B4-BE49-F238E27FC236}">
+                <a16:creationId xmlns:a16="http://schemas.microsoft.com/office/drawing/2014/main" xmlns="" id="{316A26FA-5144-4898-BD05-6AD0496394ED}"/>
+              </a:ext>
+            </a:extLst>
+          </p:cNvPr>
+          <p:cNvSpPr>
+            <a:spLocks noGrp="1"/>
+          </p:cNvSpPr>
+          <p:nvPr>
+            <p:ph idx="1"/>
+          </p:nvPr>
+        </p:nvSpPr>
+        <p:spPr/>
+        <p:txBody>
+          <a:bodyPr/>
+          <a:lstStyle/>
+          <a:p>
+            <a:pPr marL="0" indent="0" algn="just">
+              <a:buNone/>
+            </a:pPr>
+            <a:r>
+              <a:rPr lang="en-US" dirty="0"/>
+              <a:t>Pizza Ordering App is based on a concept of making pizza orders and payments. Here, the user can login, select pizza sets, quantity and proceed towards payment. Other features include viewing full payment receipt which includes each and every detail. Prices will be displayed in BDT currency. This mini project contains limited features, but the essential ones.</a:t>
+            </a:r>
+          </a:p>
+        </p:txBody>
+      </p:sp>
+    </p:spTree>
+    <p:extLst>
+      <p:ext uri="{BB962C8B-B14F-4D97-AF65-F5344CB8AC3E}">
+        <p14:creationId xmlns:p14="http://schemas.microsoft.com/office/powerpoint/2010/main" val="3362380975"/>
+      </p:ext>
+    </p:extLst>
+  </p:cSld>
+  <p:clrMapOvr>
+    <a:masterClrMapping/>
+  </p:clrMapOvr>
+</p:sld>
+</file>
+
+<file path=ppt/slides/slide3.xml><?xml version="1.0" encoding="utf-8"?>
+<p:sld xmlns:a="http://schemas.openxmlformats.org/drawingml/2006/main" xmlns:r="http://schemas.openxmlformats.org/officeDocument/2006/relationships" xmlns:p="http://schemas.openxmlformats.org/presentationml/2006/main">
+  <p:cSld>
+    <p:spTree>
+      <p:nvGrpSpPr>
+        <p:cNvPr id="1" name=""/>
+        <p:cNvGrpSpPr/>
+        <p:nvPr/>
+      </p:nvGrpSpPr>
+      <p:grpSpPr>
+        <a:xfrm>
+          <a:off x="0" y="0"/>
+          <a:ext cx="0" cy="0"/>
+          <a:chOff x="0" y="0"/>
+          <a:chExt cx="0" cy="0"/>
+        </a:xfrm>
+      </p:grpSpPr>
+      <p:sp>
+        <p:nvSpPr>
+          <p:cNvPr id="2" name="Title 1">
+            <a:extLst>
+              <a:ext uri="{FF2B5EF4-FFF2-40B4-BE49-F238E27FC236}">
+                <a16:creationId xmlns:a16="http://schemas.microsoft.com/office/drawing/2014/main" xmlns="" id="{93193155-613B-4312-AC5E-07AEAE53FBD3}"/>
+              </a:ext>
+            </a:extLst>
+          </p:cNvPr>
+          <p:cNvSpPr>
+            <a:spLocks noGrp="1"/>
+          </p:cNvSpPr>
+          <p:nvPr>
+            <p:ph type="title"/>
+          </p:nvPr>
+        </p:nvSpPr>
+        <p:spPr/>
+        <p:txBody>
+          <a:bodyPr/>
+          <a:lstStyle/>
+          <a:p>
+            <a:r>
+              <a:rPr lang="en-US" b="1" dirty="0"/>
+              <a:t>Objectives</a:t>
+            </a:r>
+          </a:p>
+        </p:txBody>
+      </p:sp>
+      <p:sp>
+        <p:nvSpPr>
+          <p:cNvPr id="3" name="Content Placeholder 2">
+            <a:extLst>
+              <a:ext uri="{FF2B5EF4-FFF2-40B4-BE49-F238E27FC236}">
+                <a16:creationId xmlns:a16="http://schemas.microsoft.com/office/drawing/2014/main" xmlns="" id="{BF5ECD95-9B0A-4F2B-A563-09B3C772A6E8}"/>
+              </a:ext>
+            </a:extLst>
+          </p:cNvPr>
+          <p:cNvSpPr>
+            <a:spLocks noGrp="1"/>
+          </p:cNvSpPr>
+          <p:nvPr>
+            <p:ph idx="1"/>
+          </p:nvPr>
+        </p:nvSpPr>
+        <p:spPr/>
+        <p:txBody>
+          <a:bodyPr/>
+          <a:lstStyle/>
+          <a:p>
+            <a:r>
+              <a:rPr lang="en-US" dirty="0"/>
+              <a:t>Build Your Own Pizza</a:t>
+            </a:r>
+          </a:p>
+          <a:p>
+            <a:r>
+              <a:rPr lang="en-US" dirty="0"/>
+              <a:t>Online Payment</a:t>
+            </a:r>
+          </a:p>
+          <a:p>
+            <a:r>
+              <a:rPr lang="en-US" dirty="0"/>
+              <a:t>Know Delivery Time</a:t>
+            </a:r>
+          </a:p>
+          <a:p>
+            <a:r>
+              <a:rPr lang="en-US" dirty="0"/>
+              <a:t>Better Knowledge</a:t>
+            </a:r>
+          </a:p>
+          <a:p>
+            <a:r>
+              <a:rPr lang="en-US" dirty="0"/>
+              <a:t>Improves Efficiency</a:t>
+            </a:r>
+          </a:p>
+        </p:txBody>
+      </p:sp>
+    </p:spTree>
+    <p:extLst>
+      <p:ext uri="{BB962C8B-B14F-4D97-AF65-F5344CB8AC3E}">
+        <p14:creationId xmlns:p14="http://schemas.microsoft.com/office/powerpoint/2010/main" val="1588103046"/>
+      </p:ext>
+    </p:extLst>
+  </p:cSld>
+  <p:clrMapOvr>
+    <a:masterClrMapping/>
+  </p:clrMapOvr>
+</p:sld>
+</file>
+
+<file path=ppt/slides/slide4.xml><?xml version="1.0" encoding="utf-8"?>
+<p:sld xmlns:a="http://schemas.openxmlformats.org/drawingml/2006/main" xmlns:r="http://schemas.openxmlformats.org/officeDocument/2006/relationships" xmlns:p="http://schemas.openxmlformats.org/presentationml/2006/main">
+  <p:cSld>
+    <p:spTree>
+      <p:nvGrpSpPr>
+        <p:cNvPr id="1" name=""/>
+        <p:cNvGrpSpPr/>
+        <p:nvPr/>
+      </p:nvGrpSpPr>
+      <p:grpSpPr>
+        <a:xfrm>
+          <a:off x="0" y="0"/>
+          <a:ext cx="0" cy="0"/>
+          <a:chOff x="0" y="0"/>
+          <a:chExt cx="0" cy="0"/>
+        </a:xfrm>
+      </p:grpSpPr>
+      <p:sp>
+        <p:nvSpPr>
+          <p:cNvPr id="2" name="Title 1">
+            <a:extLst>
+              <a:ext uri="{FF2B5EF4-FFF2-40B4-BE49-F238E27FC236}">
+                <a16:creationId xmlns:a16="http://schemas.microsoft.com/office/drawing/2014/main" xmlns="" id="{DB1F0797-2856-4F73-A957-637216384404}"/>
+              </a:ext>
+            </a:extLst>
+          </p:cNvPr>
+          <p:cNvSpPr>
+            <a:spLocks noGrp="1"/>
+          </p:cNvSpPr>
+          <p:nvPr>
+            <p:ph type="title"/>
+          </p:nvPr>
+        </p:nvSpPr>
+        <p:spPr/>
+        <p:txBody>
+          <a:bodyPr/>
+          <a:lstStyle/>
+          <a:p>
+            <a:r>
+              <a:rPr lang="en-US" b="1" dirty="0"/>
+              <a:t>Scope</a:t>
+            </a:r>
+          </a:p>
+        </p:txBody>
+      </p:sp>
+      <p:sp>
+        <p:nvSpPr>
+          <p:cNvPr id="3" name="Content Placeholder 2">
+            <a:extLst>
+              <a:ext uri="{FF2B5EF4-FFF2-40B4-BE49-F238E27FC236}">
+                <a16:creationId xmlns:a16="http://schemas.microsoft.com/office/drawing/2014/main" xmlns="" id="{C34A6749-C050-407B-B65A-95338919C099}"/>
+              </a:ext>
+            </a:extLst>
+          </p:cNvPr>
+          <p:cNvSpPr>
+            <a:spLocks noGrp="1"/>
+          </p:cNvSpPr>
+          <p:nvPr>
+            <p:ph idx="1"/>
+          </p:nvPr>
+        </p:nvSpPr>
+        <p:spPr/>
+        <p:txBody>
+          <a:bodyPr/>
+          <a:lstStyle/>
+          <a:p>
+            <a:pPr marL="0" indent="0" algn="just">
+              <a:buNone/>
+            </a:pPr>
+            <a:r>
+              <a:rPr lang="en-US" dirty="0"/>
+              <a:t>The scope of the proposed system will be based on the features and functionalities proposed for pizza restaurant which is located in Bashundhara R/a. Online pizza ordering system will be an android based application whose main language of programming will be Java. Its main aim is to simplify and improve the efficiency of the ordering process for both customer and restaurant, minimize manual data entry and ensure data accuracy and security during order placement process.</a:t>
+            </a:r>
+          </a:p>
+        </p:txBody>
+      </p:sp>
+    </p:spTree>
+    <p:extLst>
+      <p:ext uri="{BB962C8B-B14F-4D97-AF65-F5344CB8AC3E}">
+        <p14:creationId xmlns:p14="http://schemas.microsoft.com/office/powerpoint/2010/main" val="297331808"/>
+      </p:ext>
+    </p:extLst>
+  </p:cSld>
+  <p:clrMapOvr>
+    <a:masterClrMapping/>
+  </p:clrMapOvr>
+</p:sld>
+</file>
+
+<file path=ppt/slides/slide5.xml><?xml version="1.0" encoding="utf-8"?>
+<p:sld xmlns:a="http://schemas.openxmlformats.org/drawingml/2006/main" xmlns:r="http://schemas.openxmlformats.org/officeDocument/2006/relationships" xmlns:p="http://schemas.openxmlformats.org/presentationml/2006/main">
+  <p:cSld>
+    <p:spTree>
+      <p:nvGrpSpPr>
+        <p:cNvPr id="1" name=""/>
+        <p:cNvGrpSpPr/>
+        <p:nvPr/>
+      </p:nvGrpSpPr>
+      <p:grpSpPr>
+        <a:xfrm>
+          <a:off x="0" y="0"/>
+          <a:ext cx="0" cy="0"/>
+          <a:chOff x="0" y="0"/>
+          <a:chExt cx="0" cy="0"/>
+        </a:xfrm>
+      </p:grpSpPr>
+      <p:sp>
+        <p:nvSpPr>
+          <p:cNvPr id="2" name="Title 1">
+            <a:extLst>
+              <a:ext uri="{FF2B5EF4-FFF2-40B4-BE49-F238E27FC236}">
+                <a16:creationId xmlns:a16="http://schemas.microsoft.com/office/drawing/2014/main" xmlns="" id="{A22270A4-3A56-4325-BF56-CB45C33A3805}"/>
+              </a:ext>
+            </a:extLst>
+          </p:cNvPr>
+          <p:cNvSpPr>
+            <a:spLocks noGrp="1"/>
+          </p:cNvSpPr>
+          <p:nvPr>
+            <p:ph type="title"/>
+          </p:nvPr>
+        </p:nvSpPr>
+        <p:spPr/>
+        <p:txBody>
+          <a:bodyPr/>
+          <a:lstStyle/>
+          <a:p>
+            <a:r>
+              <a:rPr lang="en-US" b="1" dirty="0"/>
+              <a:t>Limitation</a:t>
+            </a:r>
+          </a:p>
+        </p:txBody>
+      </p:sp>
+      <p:sp>
+        <p:nvSpPr>
+          <p:cNvPr id="3" name="Content Placeholder 2">
+            <a:extLst>
+              <a:ext uri="{FF2B5EF4-FFF2-40B4-BE49-F238E27FC236}">
+                <a16:creationId xmlns:a16="http://schemas.microsoft.com/office/drawing/2014/main" xmlns="" id="{5570A365-707B-4515-A559-4B633EFFA6B8}"/>
+              </a:ext>
+            </a:extLst>
+          </p:cNvPr>
+          <p:cNvSpPr>
+            <a:spLocks noGrp="1"/>
+          </p:cNvSpPr>
+          <p:nvPr>
+            <p:ph idx="1"/>
+          </p:nvPr>
+        </p:nvSpPr>
+        <p:spPr/>
+        <p:txBody>
+          <a:bodyPr/>
+          <a:lstStyle/>
+          <a:p>
+            <a:r>
+              <a:rPr lang="en-US" dirty="0"/>
+              <a:t>Requires internet connection.</a:t>
+            </a:r>
+          </a:p>
+          <a:p>
+            <a:r>
+              <a:rPr lang="en-US" dirty="0"/>
+              <a:t>The set back of the system is that the customers targeted are adults with access to android phone.</a:t>
+            </a:r>
+          </a:p>
+          <a:p>
+            <a:r>
+              <a:rPr lang="en-US" dirty="0"/>
+              <a:t>The other limitation is that the system will only be convenient to people with a small geographical region.</a:t>
+            </a:r>
+          </a:p>
+        </p:txBody>
+      </p:sp>
+    </p:spTree>
+    <p:extLst>
+      <p:ext uri="{BB962C8B-B14F-4D97-AF65-F5344CB8AC3E}">
+        <p14:creationId xmlns:p14="http://schemas.microsoft.com/office/powerpoint/2010/main" val="2498439126"/>
+      </p:ext>
+    </p:extLst>
+  </p:cSld>
+  <p:clrMapOvr>
+    <a:masterClrMapping/>
+  </p:clrMapOvr>
+</p:sld>
+</file>
+
+<file path=ppt/slides/slide6.xml><?xml version="1.0" encoding="utf-8"?>
+<p:sld xmlns:a="http://schemas.openxmlformats.org/drawingml/2006/main" xmlns:r="http://schemas.openxmlformats.org/officeDocument/2006/relationships" xmlns:p="http://schemas.openxmlformats.org/presentationml/2006/main">
+  <p:cSld>
+    <p:spTree>
+      <p:nvGrpSpPr>
+        <p:cNvPr id="1" name=""/>
+        <p:cNvGrpSpPr/>
+        <p:nvPr/>
+      </p:nvGrpSpPr>
+      <p:grpSpPr>
+        <a:xfrm>
+          <a:off x="0" y="0"/>
+          <a:ext cx="0" cy="0"/>
+          <a:chOff x="0" y="0"/>
+          <a:chExt cx="0" cy="0"/>
+        </a:xfrm>
+      </p:grpSpPr>
+      <p:sp>
+        <p:nvSpPr>
+          <p:cNvPr id="2" name="Title 1">
+            <a:extLst>
+              <a:ext uri="{FF2B5EF4-FFF2-40B4-BE49-F238E27FC236}">
+                <a16:creationId xmlns:a16="http://schemas.microsoft.com/office/drawing/2014/main" xmlns="" id="{554BA979-9361-49D7-A193-E9497DD745C8}"/>
+              </a:ext>
+            </a:extLst>
+          </p:cNvPr>
+          <p:cNvSpPr>
+            <a:spLocks noGrp="1"/>
+          </p:cNvSpPr>
+          <p:nvPr>
+            <p:ph type="title"/>
+          </p:nvPr>
+        </p:nvSpPr>
+        <p:spPr/>
+        <p:txBody>
+          <a:bodyPr/>
+          <a:lstStyle/>
+          <a:p>
+            <a:r>
+              <a:rPr lang="en-US" b="1" dirty="0"/>
+              <a:t>How it works</a:t>
+            </a:r>
+          </a:p>
+        </p:txBody>
+      </p:sp>
+      <p:sp>
+        <p:nvSpPr>
+          <p:cNvPr id="3" name="Content Placeholder 2">
+            <a:extLst>
+              <a:ext uri="{FF2B5EF4-FFF2-40B4-BE49-F238E27FC236}">
+                <a16:creationId xmlns:a16="http://schemas.microsoft.com/office/drawing/2014/main" xmlns="" id="{85BE19C4-BAD8-4D36-8EAB-B14F0535DB0D}"/>
+              </a:ext>
+            </a:extLst>
+          </p:cNvPr>
+          <p:cNvSpPr>
+            <a:spLocks noGrp="1"/>
+          </p:cNvSpPr>
+          <p:nvPr>
+            <p:ph idx="1"/>
+          </p:nvPr>
+        </p:nvSpPr>
+        <p:spPr/>
+        <p:txBody>
+          <a:bodyPr>
+            <a:normAutofit/>
+          </a:bodyPr>
+          <a:lstStyle/>
+          <a:p>
+            <a:r>
+              <a:rPr lang="en-US" dirty="0" smtClean="0"/>
+              <a:t>Firstly, the </a:t>
+            </a:r>
+            <a:r>
+              <a:rPr lang="en-US" dirty="0"/>
+              <a:t>customer has to provide his/her details like name, phone number, address, email id into the registration field. </a:t>
+            </a:r>
+          </a:p>
+          <a:p>
+            <a:r>
+              <a:rPr lang="en-US" dirty="0"/>
+              <a:t>After successfully logging in, the menu will be visible to the customer with the pizza customizations and other non-pizza products on </a:t>
+            </a:r>
+            <a:r>
+              <a:rPr lang="en-US" dirty="0" smtClean="0"/>
+              <a:t>offers</a:t>
+            </a:r>
+            <a:r>
+              <a:rPr lang="en-US" dirty="0"/>
+              <a:t> </a:t>
+            </a:r>
+            <a:r>
+              <a:rPr lang="en-US" dirty="0" smtClean="0"/>
+              <a:t>along with the prices.</a:t>
+            </a:r>
+            <a:endParaRPr lang="en-US" dirty="0"/>
+          </a:p>
+          <a:p>
+            <a:r>
+              <a:rPr lang="en-US" dirty="0"/>
+              <a:t>Next, </a:t>
+            </a:r>
+            <a:r>
+              <a:rPr lang="en-US" dirty="0" smtClean="0"/>
+              <a:t>after adding the items </a:t>
+            </a:r>
+            <a:r>
+              <a:rPr lang="en-US" dirty="0"/>
+              <a:t>to be ordered, the customer will select the type of drop-off process whether it will be a home delivery or a pick up.</a:t>
+            </a:r>
+          </a:p>
+          <a:p>
+            <a:r>
+              <a:rPr lang="en-US" dirty="0"/>
+              <a:t>Lastly, the payment option will be shown to the customer. He/she will choose from the various online payment methods or cash on delivery option</a:t>
+            </a:r>
+            <a:r>
+              <a:rPr lang="en-US" dirty="0" smtClean="0"/>
+              <a:t>.</a:t>
+            </a:r>
+            <a:endParaRPr lang="en-US" dirty="0"/>
+          </a:p>
+          <a:p>
+            <a:endParaRPr lang="en-US" dirty="0"/>
+          </a:p>
+        </p:txBody>
+      </p:sp>
+    </p:spTree>
+    <p:extLst>
+      <p:ext uri="{BB962C8B-B14F-4D97-AF65-F5344CB8AC3E}">
+        <p14:creationId xmlns:p14="http://schemas.microsoft.com/office/powerpoint/2010/main" val="1915145523"/>
+      </p:ext>
+    </p:extLst>
+  </p:cSld>
+  <p:clrMapOvr>
+    <a:masterClrMapping/>
+  </p:clrMapOvr>
+</p:sld>
+</file>
+
+<file path=ppt/slides/slide7.xml><?xml version="1.0" encoding="utf-8"?>
+<p:sld xmlns:a="http://schemas.openxmlformats.org/drawingml/2006/main" xmlns:r="http://schemas.openxmlformats.org/officeDocument/2006/relationships" xmlns:p="http://schemas.openxmlformats.org/presentationml/2006/main">
+  <p:cSld>
+    <p:spTree>
+      <p:nvGrpSpPr>
+        <p:cNvPr id="1" name=""/>
+        <p:cNvGrpSpPr/>
+        <p:nvPr/>
+      </p:nvGrpSpPr>
+      <p:grpSpPr>
+        <a:xfrm>
+          <a:off x="0" y="0"/>
+          <a:ext cx="0" cy="0"/>
+          <a:chOff x="0" y="0"/>
+          <a:chExt cx="0" cy="0"/>
+        </a:xfrm>
+      </p:grpSpPr>
+      <p:sp>
+        <p:nvSpPr>
+          <p:cNvPr id="2" name="Title 1">
+            <a:extLst>
+              <a:ext uri="{FF2B5EF4-FFF2-40B4-BE49-F238E27FC236}">
+                <a16:creationId xmlns:a16="http://schemas.microsoft.com/office/drawing/2014/main" xmlns="" id="{F738B851-F72B-4012-8144-A951C269453F}"/>
+              </a:ext>
+            </a:extLst>
+          </p:cNvPr>
+          <p:cNvSpPr>
+            <a:spLocks noGrp="1"/>
+          </p:cNvSpPr>
+          <p:nvPr>
+            <p:ph type="title"/>
+          </p:nvPr>
+        </p:nvSpPr>
+        <p:spPr/>
+        <p:txBody>
+          <a:bodyPr/>
+          <a:lstStyle/>
+          <a:p>
+            <a:r>
+              <a:rPr lang="en-US" b="1"/>
+              <a:t>ER Diagram</a:t>
+            </a:r>
+            <a:endParaRPr lang="en-US" b="1" dirty="0"/>
+          </a:p>
+        </p:txBody>
+      </p:sp>
+      <p:pic>
+        <p:nvPicPr>
+          <p:cNvPr id="5" name="Content Placeholder 4">
+            <a:extLst>
+              <a:ext uri="{FF2B5EF4-FFF2-40B4-BE49-F238E27FC236}">
+                <a16:creationId xmlns:a16="http://schemas.microsoft.com/office/drawing/2014/main" xmlns="" id="{DC69674D-8240-47D3-99C2-1D9CF40E45AA}"/>
+              </a:ext>
+            </a:extLst>
+          </p:cNvPr>
+          <p:cNvPicPr>
+            <a:picLocks noGrp="1" noChangeAspect="1"/>
+          </p:cNvPicPr>
+          <p:nvPr>
+            <p:ph idx="1"/>
+          </p:nvPr>
+        </p:nvPicPr>
+        <p:blipFill>
+          <a:blip r:embed="rId2">
+            <a:extLst>
+              <a:ext uri="{28A0092B-C50C-407E-A947-70E740481C1C}">
+                <a14:useLocalDpi xmlns:a14="http://schemas.microsoft.com/office/drawing/2010/main" val="0"/>
+              </a:ext>
+            </a:extLst>
+          </a:blip>
+          <a:stretch>
+            <a:fillRect/>
+          </a:stretch>
+        </p:blipFill>
+        <p:spPr>
+          <a:xfrm>
+            <a:off x="1154952" y="2468031"/>
+            <a:ext cx="9916321" cy="3904633"/>
+          </a:xfrm>
+        </p:spPr>
+      </p:pic>
+    </p:spTree>
+    <p:extLst>
+      <p:ext uri="{BB962C8B-B14F-4D97-AF65-F5344CB8AC3E}">
+        <p14:creationId xmlns:p14="http://schemas.microsoft.com/office/powerpoint/2010/main" val="3857193171"/>
+      </p:ext>
+    </p:extLst>
+  </p:cSld>
+  <p:clrMapOvr>
+    <a:masterClrMapping/>
+  </p:clrMapOvr>
+</p:sld>
+</file>
+
+<file path=ppt/slides/slide8.xml><?xml version="1.0" encoding="utf-8"?>
+<p:sld xmlns:a="http://schemas.openxmlformats.org/drawingml/2006/main" xmlns:r="http://schemas.openxmlformats.org/officeDocument/2006/relationships" xmlns:p="http://schemas.openxmlformats.org/presentationml/2006/main">
+  <p:cSld>
+    <p:spTree>
+      <p:nvGrpSpPr>
+        <p:cNvPr id="1" name=""/>
+        <p:cNvGrpSpPr/>
+        <p:nvPr/>
+      </p:nvGrpSpPr>
+      <p:grpSpPr>
+        <a:xfrm>
+          <a:off x="0" y="0"/>
+          <a:ext cx="0" cy="0"/>
+          <a:chOff x="0" y="0"/>
+          <a:chExt cx="0" cy="0"/>
+        </a:xfrm>
+      </p:grpSpPr>
+      <p:sp>
+        <p:nvSpPr>
+          <p:cNvPr id="2" name="Title 1"/>
+          <p:cNvSpPr>
+            <a:spLocks noGrp="1"/>
+          </p:cNvSpPr>
+          <p:nvPr>
+            <p:ph type="title"/>
+          </p:nvPr>
+        </p:nvSpPr>
+        <p:spPr/>
+        <p:txBody>
+          <a:bodyPr/>
+          <a:lstStyle/>
+          <a:p>
+            <a:r>
+              <a:rPr lang="en-US" dirty="0" smtClean="0"/>
+              <a:t>Requirements</a:t>
+            </a:r>
+            <a:endParaRPr lang="en-US" dirty="0"/>
+          </a:p>
+        </p:txBody>
+      </p:sp>
+      <p:sp>
+        <p:nvSpPr>
+          <p:cNvPr id="3" name="Content Placeholder 2"/>
+          <p:cNvSpPr>
+            <a:spLocks noGrp="1"/>
+          </p:cNvSpPr>
+          <p:nvPr>
+            <p:ph idx="1"/>
+          </p:nvPr>
+        </p:nvSpPr>
+        <p:spPr/>
+        <p:txBody>
+          <a:bodyPr>
+            <a:noAutofit/>
+          </a:bodyPr>
+          <a:lstStyle/>
+          <a:p>
+            <a:pPr marL="0" lvl="0" indent="0">
+              <a:buNone/>
+            </a:pPr>
+            <a:r>
+              <a:rPr lang="en-US" sz="1600" b="1" u="sng" dirty="0"/>
+              <a:t>Hardware Requirements:</a:t>
+            </a:r>
+            <a:endParaRPr lang="en-US" sz="1600" u="sng" dirty="0"/>
+          </a:p>
+          <a:p>
+            <a:pPr lvl="0"/>
+            <a:r>
+              <a:rPr lang="en-US" sz="1600" b="1" dirty="0"/>
+              <a:t>Processor:</a:t>
+            </a:r>
+            <a:r>
+              <a:rPr lang="en-US" sz="1600" dirty="0"/>
+              <a:t> Intel dual core or above</a:t>
+            </a:r>
+          </a:p>
+          <a:p>
+            <a:pPr lvl="0"/>
+            <a:r>
+              <a:rPr lang="en-US" sz="1600" b="1" dirty="0"/>
+              <a:t>Processor Speed:</a:t>
+            </a:r>
+            <a:r>
+              <a:rPr lang="en-US" sz="1600" dirty="0"/>
+              <a:t> 1.0GHZ or above</a:t>
+            </a:r>
+          </a:p>
+          <a:p>
+            <a:pPr lvl="0"/>
+            <a:r>
+              <a:rPr lang="en-US" sz="1600" b="1" dirty="0"/>
+              <a:t>RAM:</a:t>
+            </a:r>
+            <a:r>
+              <a:rPr lang="en-US" sz="1600" dirty="0"/>
+              <a:t> 1 GB RAM or above</a:t>
+            </a:r>
+          </a:p>
+          <a:p>
+            <a:pPr lvl="0"/>
+            <a:r>
+              <a:rPr lang="en-US" sz="1600" b="1" dirty="0"/>
+              <a:t>Hard Disk:</a:t>
+            </a:r>
+            <a:r>
+              <a:rPr lang="en-US" sz="1600" dirty="0"/>
+              <a:t> 20 GB hard disk or above</a:t>
+            </a:r>
+          </a:p>
+          <a:p>
+            <a:pPr lvl="0"/>
+            <a:r>
+              <a:rPr lang="en-US" sz="1600" b="1" dirty="0"/>
+              <a:t>Mobile:</a:t>
+            </a:r>
+            <a:r>
+              <a:rPr lang="en-US" sz="1600" dirty="0"/>
+              <a:t> Android phone</a:t>
+            </a:r>
+          </a:p>
+          <a:p>
+            <a:pPr lvl="0"/>
+            <a:r>
+              <a:rPr lang="en-US" sz="1600" dirty="0"/>
+              <a:t>USB flash disk (At least 2GB)</a:t>
+            </a:r>
+          </a:p>
+          <a:p>
+            <a:pPr marL="0" indent="0">
+              <a:buNone/>
+            </a:pPr>
+            <a:endParaRPr lang="en-US" sz="1600" dirty="0"/>
+          </a:p>
+        </p:txBody>
+      </p:sp>
+    </p:spTree>
+    <p:extLst>
+      <p:ext uri="{BB962C8B-B14F-4D97-AF65-F5344CB8AC3E}">
+        <p14:creationId xmlns:p14="http://schemas.microsoft.com/office/powerpoint/2010/main" val="524867340"/>
+      </p:ext>
+    </p:extLst>
+  </p:cSld>
+  <p:clrMapOvr>
+    <a:masterClrMapping/>
+  </p:clrMapOvr>
+</p:sld>
+</file>
+
+<file path=ppt/slides/slide9.xml><?xml version="1.0" encoding="utf-8"?>
+<p:sld xmlns:a="http://schemas.openxmlformats.org/drawingml/2006/main" xmlns:r="http://schemas.openxmlformats.org/officeDocument/2006/relationships" xmlns:p="http://schemas.openxmlformats.org/presentationml/2006/main">
+  <p:cSld>
+    <p:spTree>
+      <p:nvGrpSpPr>
+        <p:cNvPr id="1" name=""/>
+        <p:cNvGrpSpPr/>
+        <p:nvPr/>
+      </p:nvGrpSpPr>
+      <p:grpSpPr>
+        <a:xfrm>
+          <a:off x="0" y="0"/>
+          <a:ext cx="0" cy="0"/>
+          <a:chOff x="0" y="0"/>
+          <a:chExt cx="0" cy="0"/>
+        </a:xfrm>
+      </p:grpSpPr>
+      <p:sp>
+        <p:nvSpPr>
+          <p:cNvPr id="2" name="Title 1"/>
+          <p:cNvSpPr>
+            <a:spLocks noGrp="1"/>
+          </p:cNvSpPr>
+          <p:nvPr>
+            <p:ph type="title"/>
+          </p:nvPr>
+        </p:nvSpPr>
+        <p:spPr/>
+        <p:txBody>
+          <a:bodyPr/>
+          <a:lstStyle/>
+          <a:p>
+            <a:endParaRPr lang="en-US"/>
+          </a:p>
+        </p:txBody>
+      </p:sp>
+      <p:sp>
+        <p:nvSpPr>
+          <p:cNvPr id="3" name="Content Placeholder 2"/>
+          <p:cNvSpPr>
+            <a:spLocks noGrp="1"/>
+          </p:cNvSpPr>
+          <p:nvPr>
+            <p:ph idx="1"/>
+          </p:nvPr>
+        </p:nvSpPr>
+        <p:spPr/>
+        <p:txBody>
+          <a:bodyPr>
+            <a:normAutofit lnSpcReduction="10000"/>
+          </a:bodyPr>
+          <a:lstStyle/>
+          <a:p>
+            <a:pPr marL="0" lvl="0" indent="0">
+              <a:buNone/>
+            </a:pPr>
+            <a:r>
+              <a:rPr lang="en-US" b="1" u="sng" dirty="0"/>
+              <a:t>Software Requirements:</a:t>
+            </a:r>
+            <a:endParaRPr lang="en-US" u="sng" dirty="0"/>
+          </a:p>
+          <a:p>
+            <a:pPr lvl="0"/>
+            <a:r>
+              <a:rPr lang="en-US" b="1" dirty="0"/>
+              <a:t>Operating system:</a:t>
+            </a:r>
+            <a:r>
+              <a:rPr lang="en-US" dirty="0"/>
+              <a:t> Windows XP / windows 7 and Android</a:t>
+            </a:r>
+          </a:p>
+          <a:p>
+            <a:pPr lvl="0"/>
+            <a:r>
+              <a:rPr lang="en-US" b="1" dirty="0"/>
+              <a:t>Technology:</a:t>
+            </a:r>
+            <a:r>
+              <a:rPr lang="en-US" dirty="0"/>
+              <a:t> Java language </a:t>
+            </a:r>
+          </a:p>
+          <a:p>
+            <a:pPr lvl="0"/>
+            <a:r>
+              <a:rPr lang="en-US" b="1" dirty="0"/>
+              <a:t>Database:</a:t>
+            </a:r>
+            <a:r>
+              <a:rPr lang="en-US" dirty="0"/>
+              <a:t> Firebase</a:t>
+            </a:r>
+          </a:p>
+          <a:p>
+            <a:pPr lvl="0"/>
+            <a:r>
+              <a:rPr lang="en-US" dirty="0"/>
+              <a:t>Java </a:t>
+            </a:r>
+            <a:r>
+              <a:rPr lang="en-US" dirty="0" err="1"/>
+              <a:t>sdk</a:t>
+            </a:r>
+            <a:endParaRPr lang="en-US" dirty="0"/>
+          </a:p>
+          <a:p>
+            <a:pPr lvl="0"/>
+            <a:r>
+              <a:rPr lang="en-US" dirty="0"/>
+              <a:t>Android studio</a:t>
+            </a:r>
+          </a:p>
+          <a:p>
+            <a:pPr lvl="0"/>
+            <a:r>
+              <a:rPr lang="en-US" dirty="0" err="1"/>
+              <a:t>Github</a:t>
+            </a:r>
+            <a:endParaRPr lang="en-US" dirty="0"/>
+          </a:p>
+          <a:p>
+            <a:pPr lvl="0"/>
+            <a:r>
+              <a:rPr lang="en-US" dirty="0"/>
+              <a:t>Slack</a:t>
+            </a:r>
+          </a:p>
+          <a:p>
+            <a:pPr lvl="0"/>
+            <a:r>
+              <a:rPr lang="en-US" dirty="0" err="1"/>
+              <a:t>Trello</a:t>
+            </a:r>
+            <a:endParaRPr lang="en-US" dirty="0"/>
+          </a:p>
+          <a:p>
+            <a:endParaRPr lang="en-US" dirty="0"/>
+          </a:p>
+        </p:txBody>
+      </p:sp>
+    </p:spTree>
+    <p:extLst>
+      <p:ext uri="{BB962C8B-B14F-4D97-AF65-F5344CB8AC3E}">
+        <p14:creationId xmlns:p14="http://schemas.microsoft.com/office/powerpoint/2010/main" val="1614607431"/>
       </p:ext>
     </p:extLst>
   </p:cSld>

</xml_diff>

<commit_message>
"Proposal_Group7.pptx" Final Version Slide Updated
</commit_message>
<xml_diff>
--- a/Documentation/Proposal/Proposal_Group7.pptx
+++ b/Documentation/Proposal/Proposal_Group7.pptx
@@ -12,6 +12,11 @@
     <p:sldId id="261" r:id="rId6"/>
     <p:sldId id="262" r:id="rId7"/>
     <p:sldId id="263" r:id="rId8"/>
+    <p:sldId id="264" r:id="rId9"/>
+    <p:sldId id="265" r:id="rId10"/>
+    <p:sldId id="266" r:id="rId11"/>
+    <p:sldId id="267" r:id="rId12"/>
+    <p:sldId id="268" r:id="rId13"/>
   </p:sldIdLst>
   <p:sldSz cx="12192000" cy="6858000"/>
   <p:notesSz cx="6858000" cy="9144000"/>
@@ -13855,6 +13860,276 @@
 </p:sld>
 </file>
 
+<file path=ppt/slides/slide10.xml><?xml version="1.0" encoding="utf-8"?>
+<p:sld xmlns:a="http://schemas.openxmlformats.org/drawingml/2006/main" xmlns:r="http://schemas.openxmlformats.org/officeDocument/2006/relationships" xmlns:p="http://schemas.openxmlformats.org/presentationml/2006/main">
+  <p:cSld>
+    <p:spTree>
+      <p:nvGrpSpPr>
+        <p:cNvPr id="1" name=""/>
+        <p:cNvGrpSpPr/>
+        <p:nvPr/>
+      </p:nvGrpSpPr>
+      <p:grpSpPr>
+        <a:xfrm>
+          <a:off x="0" y="0"/>
+          <a:ext cx="0" cy="0"/>
+          <a:chOff x="0" y="0"/>
+          <a:chExt cx="0" cy="0"/>
+        </a:xfrm>
+      </p:grpSpPr>
+      <p:sp>
+        <p:nvSpPr>
+          <p:cNvPr id="2" name="Title 1"/>
+          <p:cNvSpPr>
+            <a:spLocks noGrp="1"/>
+          </p:cNvSpPr>
+          <p:nvPr>
+            <p:ph type="title"/>
+          </p:nvPr>
+        </p:nvSpPr>
+        <p:spPr/>
+        <p:txBody>
+          <a:bodyPr/>
+          <a:lstStyle/>
+          <a:p>
+            <a:r>
+              <a:rPr lang="en-US" sz="4000" b="1" dirty="0"/>
+              <a:t>Planning – Gantt Chart</a:t>
+            </a:r>
+          </a:p>
+        </p:txBody>
+      </p:sp>
+      <p:sp>
+        <p:nvSpPr>
+          <p:cNvPr id="6" name="Content Placeholder 5"/>
+          <p:cNvSpPr>
+            <a:spLocks noGrp="1"/>
+          </p:cNvSpPr>
+          <p:nvPr>
+            <p:ph idx="1"/>
+          </p:nvPr>
+        </p:nvSpPr>
+        <p:spPr/>
+        <p:txBody>
+          <a:bodyPr/>
+          <a:lstStyle/>
+          <a:p>
+            <a:pPr marL="0" indent="0">
+              <a:buNone/>
+            </a:pPr>
+            <a:endParaRPr lang="en-US" dirty="0"/>
+          </a:p>
+        </p:txBody>
+      </p:sp>
+      <p:pic>
+        <p:nvPicPr>
+          <p:cNvPr id="9" name="Content Placeholder 6"/>
+          <p:cNvPicPr>
+            <a:picLocks/>
+          </p:cNvPicPr>
+          <p:nvPr/>
+        </p:nvPicPr>
+        <p:blipFill>
+          <a:blip r:embed="rId2">
+            <a:extLst>
+              <a:ext uri="{28A0092B-C50C-407E-A947-70E740481C1C}">
+                <a14:useLocalDpi xmlns:a14="http://schemas.microsoft.com/office/drawing/2010/main" val="0"/>
+              </a:ext>
+            </a:extLst>
+          </a:blip>
+          <a:stretch>
+            <a:fillRect/>
+          </a:stretch>
+        </p:blipFill>
+        <p:spPr>
+          <a:xfrm>
+            <a:off x="1154953" y="2593171"/>
+            <a:ext cx="8761413" cy="3291161"/>
+          </a:xfrm>
+          <a:prstGeom prst="rect">
+            <a:avLst/>
+          </a:prstGeom>
+        </p:spPr>
+      </p:pic>
+    </p:spTree>
+    <p:extLst>
+      <p:ext uri="{BB962C8B-B14F-4D97-AF65-F5344CB8AC3E}">
+        <p14:creationId xmlns:p14="http://schemas.microsoft.com/office/powerpoint/2010/main" val="3394607143"/>
+      </p:ext>
+    </p:extLst>
+  </p:cSld>
+  <p:clrMapOvr>
+    <a:masterClrMapping/>
+  </p:clrMapOvr>
+</p:sld>
+</file>
+
+<file path=ppt/slides/slide11.xml><?xml version="1.0" encoding="utf-8"?>
+<p:sld xmlns:a="http://schemas.openxmlformats.org/drawingml/2006/main" xmlns:r="http://schemas.openxmlformats.org/officeDocument/2006/relationships" xmlns:p="http://schemas.openxmlformats.org/presentationml/2006/main">
+  <p:cSld>
+    <p:spTree>
+      <p:nvGrpSpPr>
+        <p:cNvPr id="1" name=""/>
+        <p:cNvGrpSpPr/>
+        <p:nvPr/>
+      </p:nvGrpSpPr>
+      <p:grpSpPr>
+        <a:xfrm>
+          <a:off x="0" y="0"/>
+          <a:ext cx="0" cy="0"/>
+          <a:chOff x="0" y="0"/>
+          <a:chExt cx="0" cy="0"/>
+        </a:xfrm>
+      </p:grpSpPr>
+      <p:sp>
+        <p:nvSpPr>
+          <p:cNvPr id="2" name="Title 1"/>
+          <p:cNvSpPr>
+            <a:spLocks noGrp="1"/>
+          </p:cNvSpPr>
+          <p:nvPr>
+            <p:ph type="title"/>
+          </p:nvPr>
+        </p:nvSpPr>
+        <p:spPr/>
+        <p:txBody>
+          <a:bodyPr/>
+          <a:lstStyle/>
+          <a:p>
+            <a:r>
+              <a:rPr lang="en-US" sz="4000" b="1" dirty="0"/>
+              <a:t>Process Model – Waterfall</a:t>
+            </a:r>
+          </a:p>
+        </p:txBody>
+      </p:sp>
+      <p:pic>
+        <p:nvPicPr>
+          <p:cNvPr id="6" name="Content Placeholder 5">
+            <a:extLst>
+              <a:ext uri="{FF2B5EF4-FFF2-40B4-BE49-F238E27FC236}">
+                <a16:creationId xmlns:a16="http://schemas.microsoft.com/office/drawing/2014/main" id="{07EEB2F3-0346-437A-8F9D-76382A64543A}"/>
+              </a:ext>
+            </a:extLst>
+          </p:cNvPr>
+          <p:cNvPicPr>
+            <a:picLocks noGrp="1" noChangeAspect="1"/>
+          </p:cNvPicPr>
+          <p:nvPr>
+            <p:ph idx="1"/>
+          </p:nvPr>
+        </p:nvPicPr>
+        <p:blipFill>
+          <a:blip r:embed="rId2">
+            <a:extLst>
+              <a:ext uri="{28A0092B-C50C-407E-A947-70E740481C1C}">
+                <a14:useLocalDpi xmlns:a14="http://schemas.microsoft.com/office/drawing/2010/main" val="0"/>
+              </a:ext>
+            </a:extLst>
+          </a:blip>
+          <a:stretch>
+            <a:fillRect/>
+          </a:stretch>
+        </p:blipFill>
+        <p:spPr>
+          <a:xfrm>
+            <a:off x="1969477" y="2644726"/>
+            <a:ext cx="7174523" cy="3239606"/>
+          </a:xfrm>
+        </p:spPr>
+      </p:pic>
+    </p:spTree>
+    <p:extLst>
+      <p:ext uri="{BB962C8B-B14F-4D97-AF65-F5344CB8AC3E}">
+        <p14:creationId xmlns:p14="http://schemas.microsoft.com/office/powerpoint/2010/main" val="360794255"/>
+      </p:ext>
+    </p:extLst>
+  </p:cSld>
+  <p:clrMapOvr>
+    <a:masterClrMapping/>
+  </p:clrMapOvr>
+</p:sld>
+</file>
+
+<file path=ppt/slides/slide12.xml><?xml version="1.0" encoding="utf-8"?>
+<p:sld xmlns:a="http://schemas.openxmlformats.org/drawingml/2006/main" xmlns:r="http://schemas.openxmlformats.org/officeDocument/2006/relationships" xmlns:p="http://schemas.openxmlformats.org/presentationml/2006/main">
+  <p:cSld>
+    <p:spTree>
+      <p:nvGrpSpPr>
+        <p:cNvPr id="1" name=""/>
+        <p:cNvGrpSpPr/>
+        <p:nvPr/>
+      </p:nvGrpSpPr>
+      <p:grpSpPr>
+        <a:xfrm>
+          <a:off x="0" y="0"/>
+          <a:ext cx="0" cy="0"/>
+          <a:chOff x="0" y="0"/>
+          <a:chExt cx="0" cy="0"/>
+        </a:xfrm>
+      </p:grpSpPr>
+      <p:sp>
+        <p:nvSpPr>
+          <p:cNvPr id="2" name="Title 1"/>
+          <p:cNvSpPr>
+            <a:spLocks noGrp="1"/>
+          </p:cNvSpPr>
+          <p:nvPr>
+            <p:ph type="title"/>
+          </p:nvPr>
+        </p:nvSpPr>
+        <p:spPr/>
+        <p:txBody>
+          <a:bodyPr/>
+          <a:lstStyle/>
+          <a:p>
+            <a:r>
+              <a:rPr lang="en-US" sz="4000" b="1" dirty="0"/>
+              <a:t>Conclusion</a:t>
+            </a:r>
+          </a:p>
+        </p:txBody>
+      </p:sp>
+      <p:sp>
+        <p:nvSpPr>
+          <p:cNvPr id="3" name="Content Placeholder 2"/>
+          <p:cNvSpPr>
+            <a:spLocks noGrp="1"/>
+          </p:cNvSpPr>
+          <p:nvPr>
+            <p:ph idx="1"/>
+          </p:nvPr>
+        </p:nvSpPr>
+        <p:spPr/>
+        <p:txBody>
+          <a:bodyPr>
+            <a:normAutofit/>
+          </a:bodyPr>
+          <a:lstStyle/>
+          <a:p>
+            <a:pPr marL="0" indent="0" algn="just">
+              <a:buNone/>
+            </a:pPr>
+            <a:r>
+              <a:rPr lang="en-US" sz="2000" dirty="0"/>
+              <a:t>This project is not difficult to use, operate and understand by the users. Design of this project is pretty responsive so that user won’t find it difficult to understand, use and navigate. This project provides the simplest system for managing pizza orders. </a:t>
+            </a:r>
+          </a:p>
+        </p:txBody>
+      </p:sp>
+    </p:spTree>
+    <p:extLst>
+      <p:ext uri="{BB962C8B-B14F-4D97-AF65-F5344CB8AC3E}">
+        <p14:creationId xmlns:p14="http://schemas.microsoft.com/office/powerpoint/2010/main" val="2632949503"/>
+      </p:ext>
+    </p:extLst>
+  </p:cSld>
+  <p:clrMapOvr>
+    <a:masterClrMapping/>
+  </p:clrMapOvr>
+</p:sld>
+</file>
+
 <file path=ppt/slides/slide2.xml><?xml version="1.0" encoding="utf-8"?>
 <p:sld xmlns:a="http://schemas.openxmlformats.org/drawingml/2006/main" xmlns:r="http://schemas.openxmlformats.org/officeDocument/2006/relationships" xmlns:p="http://schemas.openxmlformats.org/presentationml/2006/main">
   <p:cSld>
@@ -13894,10 +14169,9 @@
           <a:lstStyle/>
           <a:p>
             <a:r>
-              <a:rPr lang="en-US" b="1"/>
+              <a:rPr lang="en-US" sz="4000" b="1" dirty="0"/>
               <a:t>Introduction</a:t>
             </a:r>
-            <a:endParaRPr lang="en-US" b="1" dirty="0"/>
           </a:p>
         </p:txBody>
       </p:sp>
@@ -13919,14 +14193,16 @@
         </p:nvSpPr>
         <p:spPr/>
         <p:txBody>
-          <a:bodyPr/>
+          <a:bodyPr>
+            <a:normAutofit/>
+          </a:bodyPr>
           <a:lstStyle/>
           <a:p>
             <a:pPr marL="0" indent="0" algn="just">
               <a:buNone/>
             </a:pPr>
             <a:r>
-              <a:rPr lang="en-US" dirty="0"/>
+              <a:rPr lang="en-US" sz="2000" dirty="0"/>
               <a:t>Pizza Ordering App is based on a concept of making pizza orders and payments. Here, the user can login, select pizza sets, quantity and proceed towards payment. Other features include viewing full payment receipt which includes each and every detail. Prices will be displayed in BDT currency. This mini project contains limited features, but the essential ones.</a:t>
             </a:r>
           </a:p>
@@ -13984,7 +14260,7 @@
           <a:lstStyle/>
           <a:p>
             <a:r>
-              <a:rPr lang="en-US" b="1" dirty="0"/>
+              <a:rPr lang="en-US" sz="4000" b="1" dirty="0"/>
               <a:t>Objectives</a:t>
             </a:r>
           </a:p>
@@ -14008,35 +14284,37 @@
         </p:nvSpPr>
         <p:spPr/>
         <p:txBody>
-          <a:bodyPr/>
+          <a:bodyPr>
+            <a:normAutofit/>
+          </a:bodyPr>
           <a:lstStyle/>
           <a:p>
             <a:r>
-              <a:rPr lang="en-US" dirty="0"/>
+              <a:rPr lang="en-US" sz="2000" dirty="0"/>
               <a:t>Build Your Own Pizza</a:t>
             </a:r>
           </a:p>
           <a:p>
             <a:r>
-              <a:rPr lang="en-US" dirty="0"/>
+              <a:rPr lang="en-US" sz="2000" dirty="0"/>
               <a:t>Online Payment</a:t>
             </a:r>
           </a:p>
           <a:p>
             <a:r>
-              <a:rPr lang="en-US" dirty="0"/>
+              <a:rPr lang="en-US" sz="2000" dirty="0"/>
               <a:t>Know Delivery Time</a:t>
             </a:r>
           </a:p>
           <a:p>
             <a:r>
-              <a:rPr lang="en-US" dirty="0"/>
+              <a:rPr lang="en-US" sz="2000" dirty="0"/>
               <a:t>Better Knowledge</a:t>
             </a:r>
           </a:p>
           <a:p>
             <a:r>
-              <a:rPr lang="en-US" dirty="0"/>
+              <a:rPr lang="en-US" sz="2000" dirty="0"/>
               <a:t>Improves Efficiency</a:t>
             </a:r>
           </a:p>
@@ -14094,7 +14372,7 @@
           <a:lstStyle/>
           <a:p>
             <a:r>
-              <a:rPr lang="en-US" b="1" dirty="0"/>
+              <a:rPr lang="en-US" sz="4000" b="1" dirty="0"/>
               <a:t>Scope</a:t>
             </a:r>
           </a:p>
@@ -14118,14 +14396,16 @@
         </p:nvSpPr>
         <p:spPr/>
         <p:txBody>
-          <a:bodyPr/>
+          <a:bodyPr>
+            <a:normAutofit/>
+          </a:bodyPr>
           <a:lstStyle/>
           <a:p>
             <a:pPr marL="0" indent="0" algn="just">
               <a:buNone/>
             </a:pPr>
             <a:r>
-              <a:rPr lang="en-US" dirty="0"/>
+              <a:rPr lang="en-US" sz="2000" dirty="0"/>
               <a:t>The scope of the proposed system will be based on the features and functionalities proposed for pizza restaurant which is located in Bashundhara R/a. Online pizza ordering system will be an android based application whose main language of programming will be Java. Its main aim is to simplify and improve the efficiency of the ordering process for both customer and restaurant, minimize manual data entry and ensure data accuracy and security during order placement process.</a:t>
             </a:r>
           </a:p>
@@ -14183,7 +14463,7 @@
           <a:lstStyle/>
           <a:p>
             <a:r>
-              <a:rPr lang="en-US" b="1" dirty="0"/>
+              <a:rPr lang="en-US" sz="4000" b="1" dirty="0"/>
               <a:t>Limitation</a:t>
             </a:r>
           </a:p>
@@ -14207,23 +14487,28 @@
         </p:nvSpPr>
         <p:spPr/>
         <p:txBody>
-          <a:bodyPr/>
+          <a:bodyPr>
+            <a:normAutofit/>
+          </a:bodyPr>
           <a:lstStyle/>
           <a:p>
+            <a:pPr algn="just"/>
             <a:r>
-              <a:rPr lang="en-US" dirty="0"/>
+              <a:rPr lang="en-US" sz="2000" dirty="0"/>
               <a:t>Requires internet connection.</a:t>
             </a:r>
           </a:p>
           <a:p>
+            <a:pPr algn="just"/>
             <a:r>
-              <a:rPr lang="en-US" dirty="0"/>
+              <a:rPr lang="en-US" sz="2000" dirty="0"/>
               <a:t>The set back of the system is that the customers targeted are adults with access to android phone.</a:t>
             </a:r>
           </a:p>
           <a:p>
+            <a:pPr algn="just"/>
             <a:r>
-              <a:rPr lang="en-US" dirty="0"/>
+              <a:rPr lang="en-US" sz="2000" dirty="0"/>
               <a:t>The other limitation is that the system will only be convenient to people with a small geographical region.</a:t>
             </a:r>
           </a:p>
@@ -14281,7 +14566,7 @@
           <a:lstStyle/>
           <a:p>
             <a:r>
-              <a:rPr lang="en-US" b="1" dirty="0"/>
+              <a:rPr lang="en-US" sz="4000" b="1" dirty="0"/>
               <a:t>How it works</a:t>
             </a:r>
           </a:p>
@@ -14303,12 +14588,47 @@
             <p:ph idx="1"/>
           </p:nvPr>
         </p:nvSpPr>
-        <p:spPr/>
+        <p:spPr>
+          <a:xfrm>
+            <a:off x="1154955" y="2560320"/>
+            <a:ext cx="8761412" cy="3459480"/>
+          </a:xfrm>
+        </p:spPr>
         <p:txBody>
-          <a:bodyPr/>
+          <a:bodyPr>
+            <a:normAutofit fontScale="92500" lnSpcReduction="10000"/>
+          </a:bodyPr>
           <a:lstStyle/>
           <a:p>
-            <a:endParaRPr lang="en-US"/>
+            <a:pPr algn="just"/>
+            <a:r>
+              <a:rPr lang="en-US" sz="2000" dirty="0"/>
+              <a:t>Firstly, the customer has to provide his/her details like name, phone number, address, email id into the registration field. </a:t>
+            </a:r>
+          </a:p>
+          <a:p>
+            <a:pPr algn="just"/>
+            <a:r>
+              <a:rPr lang="en-US" sz="2000" dirty="0"/>
+              <a:t>After successfully logging in, the menu will be visible to the customer with the pizza customizations and other non-pizza products on offers along with the prices.</a:t>
+            </a:r>
+          </a:p>
+          <a:p>
+            <a:pPr algn="just"/>
+            <a:r>
+              <a:rPr lang="en-US" sz="2000" dirty="0"/>
+              <a:t>Next, after adding the items to be ordered, the customer will select the type of drop-off process whether it will be a home delivery or a pick up.</a:t>
+            </a:r>
+          </a:p>
+          <a:p>
+            <a:pPr algn="just"/>
+            <a:r>
+              <a:rPr lang="en-US" sz="2000" dirty="0"/>
+              <a:t>Lastly, the payment option will be shown to the customer. He/she will choose from the various online payment methods or cash on delivery option.</a:t>
+            </a:r>
+          </a:p>
+          <a:p>
+            <a:endParaRPr lang="en-US" dirty="0"/>
           </a:p>
         </p:txBody>
       </p:sp>
@@ -14364,10 +14684,9 @@
           <a:lstStyle/>
           <a:p>
             <a:r>
-              <a:rPr lang="en-US" b="1"/>
+              <a:rPr lang="en-US" sz="4000" b="1" dirty="0"/>
               <a:t>ER Diagram</a:t>
             </a:r>
-            <a:endParaRPr lang="en-US" b="1" dirty="0"/>
           </a:p>
         </p:txBody>
       </p:sp>
@@ -14410,6 +14729,292 @@
     <p:extLst>
       <p:ext uri="{BB962C8B-B14F-4D97-AF65-F5344CB8AC3E}">
         <p14:creationId xmlns:p14="http://schemas.microsoft.com/office/powerpoint/2010/main" val="3857193171"/>
+      </p:ext>
+    </p:extLst>
+  </p:cSld>
+  <p:clrMapOvr>
+    <a:masterClrMapping/>
+  </p:clrMapOvr>
+</p:sld>
+</file>
+
+<file path=ppt/slides/slide8.xml><?xml version="1.0" encoding="utf-8"?>
+<p:sld xmlns:a="http://schemas.openxmlformats.org/drawingml/2006/main" xmlns:r="http://schemas.openxmlformats.org/officeDocument/2006/relationships" xmlns:p="http://schemas.openxmlformats.org/presentationml/2006/main">
+  <p:cSld>
+    <p:spTree>
+      <p:nvGrpSpPr>
+        <p:cNvPr id="1" name=""/>
+        <p:cNvGrpSpPr/>
+        <p:nvPr/>
+      </p:nvGrpSpPr>
+      <p:grpSpPr>
+        <a:xfrm>
+          <a:off x="0" y="0"/>
+          <a:ext cx="0" cy="0"/>
+          <a:chOff x="0" y="0"/>
+          <a:chExt cx="0" cy="0"/>
+        </a:xfrm>
+      </p:grpSpPr>
+      <p:sp>
+        <p:nvSpPr>
+          <p:cNvPr id="2" name="Title 1"/>
+          <p:cNvSpPr>
+            <a:spLocks noGrp="1"/>
+          </p:cNvSpPr>
+          <p:nvPr>
+            <p:ph type="title"/>
+          </p:nvPr>
+        </p:nvSpPr>
+        <p:spPr/>
+        <p:txBody>
+          <a:bodyPr/>
+          <a:lstStyle/>
+          <a:p>
+            <a:r>
+              <a:rPr lang="en-US" sz="4000" b="1" dirty="0"/>
+              <a:t>Hardware Requirements</a:t>
+            </a:r>
+          </a:p>
+        </p:txBody>
+      </p:sp>
+      <p:sp>
+        <p:nvSpPr>
+          <p:cNvPr id="3" name="Content Placeholder 2"/>
+          <p:cNvSpPr>
+            <a:spLocks noGrp="1"/>
+          </p:cNvSpPr>
+          <p:nvPr>
+            <p:ph idx="1"/>
+          </p:nvPr>
+        </p:nvSpPr>
+        <p:spPr/>
+        <p:txBody>
+          <a:bodyPr>
+            <a:noAutofit/>
+          </a:bodyPr>
+          <a:lstStyle/>
+          <a:p>
+            <a:pPr lvl="0"/>
+            <a:r>
+              <a:rPr lang="en-US" sz="2000" b="1" dirty="0"/>
+              <a:t>Processor:</a:t>
+            </a:r>
+            <a:r>
+              <a:rPr lang="en-US" sz="2000" dirty="0"/>
+              <a:t> Intel dual core or above</a:t>
+            </a:r>
+          </a:p>
+          <a:p>
+            <a:pPr lvl="0"/>
+            <a:r>
+              <a:rPr lang="en-US" sz="2000" b="1" dirty="0"/>
+              <a:t>Processor Speed:</a:t>
+            </a:r>
+            <a:r>
+              <a:rPr lang="en-US" sz="2000" dirty="0"/>
+              <a:t> 1.0GHZ or above</a:t>
+            </a:r>
+          </a:p>
+          <a:p>
+            <a:pPr lvl="0"/>
+            <a:r>
+              <a:rPr lang="en-US" sz="2000" b="1" dirty="0"/>
+              <a:t>RAM:</a:t>
+            </a:r>
+            <a:r>
+              <a:rPr lang="en-US" sz="2000" dirty="0"/>
+              <a:t> 1 GB RAM or above</a:t>
+            </a:r>
+          </a:p>
+          <a:p>
+            <a:pPr lvl="0"/>
+            <a:r>
+              <a:rPr lang="en-US" sz="2000" b="1" dirty="0"/>
+              <a:t>Hard Disk:</a:t>
+            </a:r>
+            <a:r>
+              <a:rPr lang="en-US" sz="2000" dirty="0"/>
+              <a:t> 20 GB hard disk or above</a:t>
+            </a:r>
+          </a:p>
+          <a:p>
+            <a:pPr lvl="0"/>
+            <a:r>
+              <a:rPr lang="en-US" sz="2000" b="1" dirty="0"/>
+              <a:t>Mobile:</a:t>
+            </a:r>
+            <a:r>
+              <a:rPr lang="en-US" sz="2000" dirty="0"/>
+              <a:t> Android phone</a:t>
+            </a:r>
+          </a:p>
+          <a:p>
+            <a:pPr lvl="0"/>
+            <a:r>
+              <a:rPr lang="en-US" sz="2000" dirty="0"/>
+              <a:t>USB flash disk (At least 2GB)</a:t>
+            </a:r>
+          </a:p>
+          <a:p>
+            <a:pPr marL="0" indent="0">
+              <a:buNone/>
+            </a:pPr>
+            <a:endParaRPr lang="en-US" sz="1600" dirty="0"/>
+          </a:p>
+        </p:txBody>
+      </p:sp>
+    </p:spTree>
+    <p:extLst>
+      <p:ext uri="{BB962C8B-B14F-4D97-AF65-F5344CB8AC3E}">
+        <p14:creationId xmlns:p14="http://schemas.microsoft.com/office/powerpoint/2010/main" val="524867340"/>
+      </p:ext>
+    </p:extLst>
+  </p:cSld>
+  <p:clrMapOvr>
+    <a:masterClrMapping/>
+  </p:clrMapOvr>
+</p:sld>
+</file>
+
+<file path=ppt/slides/slide9.xml><?xml version="1.0" encoding="utf-8"?>
+<p:sld xmlns:a="http://schemas.openxmlformats.org/drawingml/2006/main" xmlns:r="http://schemas.openxmlformats.org/officeDocument/2006/relationships" xmlns:p="http://schemas.openxmlformats.org/presentationml/2006/main">
+  <p:cSld>
+    <p:spTree>
+      <p:nvGrpSpPr>
+        <p:cNvPr id="1" name=""/>
+        <p:cNvGrpSpPr/>
+        <p:nvPr/>
+      </p:nvGrpSpPr>
+      <p:grpSpPr>
+        <a:xfrm>
+          <a:off x="0" y="0"/>
+          <a:ext cx="0" cy="0"/>
+          <a:chOff x="0" y="0"/>
+          <a:chExt cx="0" cy="0"/>
+        </a:xfrm>
+      </p:grpSpPr>
+      <p:sp>
+        <p:nvSpPr>
+          <p:cNvPr id="2" name="Title 1"/>
+          <p:cNvSpPr>
+            <a:spLocks noGrp="1"/>
+          </p:cNvSpPr>
+          <p:nvPr>
+            <p:ph type="title"/>
+          </p:nvPr>
+        </p:nvSpPr>
+        <p:spPr/>
+        <p:txBody>
+          <a:bodyPr/>
+          <a:lstStyle/>
+          <a:p>
+            <a:r>
+              <a:rPr lang="en-US" sz="4000" b="1" dirty="0"/>
+              <a:t>Software Requirements</a:t>
+            </a:r>
+          </a:p>
+        </p:txBody>
+      </p:sp>
+      <p:sp>
+        <p:nvSpPr>
+          <p:cNvPr id="3" name="Content Placeholder 2"/>
+          <p:cNvSpPr>
+            <a:spLocks noGrp="1"/>
+          </p:cNvSpPr>
+          <p:nvPr>
+            <p:ph idx="1"/>
+          </p:nvPr>
+        </p:nvSpPr>
+        <p:spPr/>
+        <p:txBody>
+          <a:bodyPr>
+            <a:normAutofit lnSpcReduction="10000"/>
+          </a:bodyPr>
+          <a:lstStyle/>
+          <a:p>
+            <a:pPr lvl="0"/>
+            <a:r>
+              <a:rPr lang="en-US" sz="2000" b="1" dirty="0"/>
+              <a:t>Operating system:</a:t>
+            </a:r>
+            <a:r>
+              <a:rPr lang="en-US" sz="2000" dirty="0"/>
+              <a:t> Windows XP / windows 7 and Android</a:t>
+            </a:r>
+          </a:p>
+          <a:p>
+            <a:pPr lvl="0"/>
+            <a:r>
+              <a:rPr lang="en-US" sz="2000" b="1" dirty="0"/>
+              <a:t>Technology:</a:t>
+            </a:r>
+            <a:r>
+              <a:rPr lang="en-US" sz="2000" dirty="0"/>
+              <a:t> Java language </a:t>
+            </a:r>
+          </a:p>
+          <a:p>
+            <a:pPr lvl="0"/>
+            <a:r>
+              <a:rPr lang="en-US" sz="2000" b="1" dirty="0"/>
+              <a:t>Database:</a:t>
+            </a:r>
+            <a:r>
+              <a:rPr lang="en-US" sz="2000" dirty="0"/>
+              <a:t> Firebase</a:t>
+            </a:r>
+          </a:p>
+          <a:p>
+            <a:pPr lvl="0"/>
+            <a:r>
+              <a:rPr lang="en-US" sz="2000" dirty="0"/>
+              <a:t>Java </a:t>
+            </a:r>
+            <a:r>
+              <a:rPr lang="en-US" sz="2000" dirty="0" err="1"/>
+              <a:t>sdk</a:t>
+            </a:r>
+            <a:endParaRPr lang="en-US" sz="2000" dirty="0"/>
+          </a:p>
+          <a:p>
+            <a:pPr lvl="0"/>
+            <a:r>
+              <a:rPr lang="en-US" sz="2000" dirty="0"/>
+              <a:t>Android studio</a:t>
+            </a:r>
+          </a:p>
+          <a:p>
+            <a:pPr lvl="0"/>
+            <a:r>
+              <a:rPr lang="en-US" sz="2000" dirty="0" err="1"/>
+              <a:t>Github</a:t>
+            </a:r>
+            <a:endParaRPr lang="en-US" sz="2000" dirty="0"/>
+          </a:p>
+          <a:p>
+            <a:pPr lvl="0"/>
+            <a:r>
+              <a:rPr lang="en-US" sz="2000" dirty="0"/>
+              <a:t>Slack</a:t>
+            </a:r>
+          </a:p>
+          <a:p>
+            <a:pPr lvl="0"/>
+            <a:r>
+              <a:rPr lang="en-US" sz="2000" dirty="0" err="1"/>
+              <a:t>Trello</a:t>
+            </a:r>
+            <a:endParaRPr lang="en-US" sz="2000" dirty="0"/>
+          </a:p>
+          <a:p>
+            <a:endParaRPr lang="en-US" dirty="0"/>
+          </a:p>
+        </p:txBody>
+      </p:sp>
+    </p:spTree>
+    <p:extLst>
+      <p:ext uri="{BB962C8B-B14F-4D97-AF65-F5344CB8AC3E}">
+        <p14:creationId xmlns:p14="http://schemas.microsoft.com/office/powerpoint/2010/main" val="1614607431"/>
       </p:ext>
     </p:extLst>
   </p:cSld>

</xml_diff>

<commit_message>
Upadated Final Version Proposal_Group7.pptx
</commit_message>
<xml_diff>
--- a/Documentation/Proposal/Proposal_Group7.pptx
+++ b/Documentation/Proposal/Proposal_Group7.pptx
@@ -13782,10 +13782,6 @@
               <a:rPr lang="en-US" sz="3200" dirty="0"/>
               <a:t>Project Proposal on</a:t>
             </a:r>
-            <a:r>
-              <a:rPr lang="en-US" dirty="0"/>
-              <a:t/>
-            </a:r>
             <a:br>
               <a:rPr lang="en-US" dirty="0"/>
             </a:br>
@@ -13897,10 +13893,9 @@
           <a:lstStyle/>
           <a:p>
             <a:r>
-              <a:rPr lang="en-US" dirty="0" smtClean="0"/>
-              <a:t>Planning</a:t>
+              <a:rPr lang="en-US" sz="4000" b="1" dirty="0"/>
+              <a:t>Planning – Gantt Chart</a:t>
             </a:r>
-            <a:endParaRPr lang="en-US" dirty="0"/>
           </a:p>
         </p:txBody>
       </p:sp>
@@ -13919,12 +13914,9 @@
           <a:bodyPr/>
           <a:lstStyle/>
           <a:p>
-            <a:r>
-              <a:rPr lang="en-US" dirty="0" smtClean="0"/>
-              <a:t>Gantt Chart:</a:t>
-            </a:r>
-          </a:p>
-          <a:p>
+            <a:pPr marL="0" indent="0">
+              <a:buNone/>
+            </a:pPr>
             <a:endParaRPr lang="en-US" dirty="0"/>
           </a:p>
         </p:txBody>
@@ -13951,7 +13943,7 @@
         </p:blipFill>
         <p:spPr>
           <a:xfrm>
-            <a:off x="2096513" y="2937622"/>
+            <a:off x="1154953" y="2593171"/>
             <a:ext cx="8761413" cy="3291161"/>
           </a:xfrm>
           <a:prstGeom prst="rect">
@@ -14004,40 +13996,28 @@
           <a:bodyPr/>
           <a:lstStyle/>
           <a:p>
-            <a:endParaRPr lang="en-US"/>
-          </a:p>
-        </p:txBody>
-      </p:sp>
-      <p:sp>
-        <p:nvSpPr>
-          <p:cNvPr id="3" name="Content Placeholder 2"/>
-          <p:cNvSpPr>
-            <a:spLocks noGrp="1"/>
-          </p:cNvSpPr>
-          <p:nvPr>
-            <p:ph idx="1"/>
-          </p:nvPr>
-        </p:nvSpPr>
-        <p:spPr/>
-        <p:txBody>
-          <a:bodyPr/>
-          <a:lstStyle/>
-          <a:p>
             <a:r>
-              <a:rPr lang="en-US" dirty="0" smtClean="0"/>
-              <a:t>Process Model:</a:t>
+              <a:rPr lang="en-US" sz="4000" b="1" dirty="0"/>
+              <a:t>Process Model – Waterfall</a:t>
             </a:r>
-          </a:p>
-          <a:p>
-            <a:endParaRPr lang="en-US" dirty="0"/>
           </a:p>
         </p:txBody>
       </p:sp>
       <p:pic>
         <p:nvPicPr>
-          <p:cNvPr id="4" name="Picture 3"/>
-          <p:cNvPicPr/>
-          <p:nvPr/>
+          <p:cNvPr id="6" name="Content Placeholder 5">
+            <a:extLst>
+              <a:ext uri="{FF2B5EF4-FFF2-40B4-BE49-F238E27FC236}">
+                <a16:creationId xmlns:a16="http://schemas.microsoft.com/office/drawing/2014/main" id="{07EEB2F3-0346-437A-8F9D-76382A64543A}"/>
+              </a:ext>
+            </a:extLst>
+          </p:cNvPr>
+          <p:cNvPicPr>
+            <a:picLocks noGrp="1" noChangeAspect="1"/>
+          </p:cNvPicPr>
+          <p:nvPr>
+            <p:ph idx="1"/>
+          </p:nvPr>
         </p:nvPicPr>
         <p:blipFill>
           <a:blip r:embed="rId2">
@@ -14053,12 +14033,9 @@
         </p:blipFill>
         <p:spPr>
           <a:xfrm>
-            <a:off x="2519958" y="3017067"/>
-            <a:ext cx="7013340" cy="3302252"/>
+            <a:off x="1969477" y="2644726"/>
+            <a:ext cx="7174523" cy="3239606"/>
           </a:xfrm>
-          <a:prstGeom prst="rect">
-            <a:avLst/>
-          </a:prstGeom>
         </p:spPr>
       </p:pic>
     </p:spTree>
@@ -14107,10 +14084,9 @@
           <a:lstStyle/>
           <a:p>
             <a:r>
-              <a:rPr lang="en-US" dirty="0" smtClean="0"/>
+              <a:rPr lang="en-US" sz="4000" b="1" dirty="0"/>
               <a:t>Conclusion</a:t>
             </a:r>
-            <a:endParaRPr lang="en-US" dirty="0"/>
           </a:p>
         </p:txBody>
       </p:sp>
@@ -14126,30 +14102,18 @@
         </p:nvSpPr>
         <p:spPr/>
         <p:txBody>
-          <a:bodyPr/>
+          <a:bodyPr>
+            <a:normAutofit/>
+          </a:bodyPr>
           <a:lstStyle/>
           <a:p>
+            <a:pPr marL="0" indent="0" algn="just">
+              <a:buNone/>
+            </a:pPr>
             <a:r>
-              <a:rPr lang="en-US" dirty="0"/>
-              <a:t>This project is not difficult to use, operate and understand by the users. Design of this project is </a:t>
+              <a:rPr lang="en-US" sz="2000" dirty="0"/>
+              <a:t>This project is not difficult to use, operate and understand by the users. Design of this project is pretty responsive so that user won’t find it difficult to understand, use and navigate. This project provides the simplest system for managing pizza orders. </a:t>
             </a:r>
-            <a:r>
-              <a:rPr lang="en-US" dirty="0" smtClean="0"/>
-              <a:t>pretty responsive </a:t>
-            </a:r>
-            <a:r>
-              <a:rPr lang="en-US" dirty="0"/>
-              <a:t>so that user won’t find it difficult to understand, use and navigate. This project provides the simplest system for managing </a:t>
-            </a:r>
-            <a:r>
-              <a:rPr lang="en-US"/>
-              <a:t>pizza </a:t>
-            </a:r>
-            <a:r>
-              <a:rPr lang="en-US" smtClean="0"/>
-              <a:t>orders. </a:t>
-            </a:r>
-            <a:endParaRPr lang="en-US" dirty="0"/>
           </a:p>
         </p:txBody>
       </p:sp>
@@ -14188,7 +14152,7 @@
           <p:cNvPr id="2" name="Title 1">
             <a:extLst>
               <a:ext uri="{FF2B5EF4-FFF2-40B4-BE49-F238E27FC236}">
-                <a16:creationId xmlns:a16="http://schemas.microsoft.com/office/drawing/2014/main" xmlns="" id="{3A3A44A3-C234-41A6-97E8-A56683FCD26B}"/>
+                <a16:creationId xmlns:a16="http://schemas.microsoft.com/office/drawing/2014/main" id="{3A3A44A3-C234-41A6-97E8-A56683FCD26B}"/>
               </a:ext>
             </a:extLst>
           </p:cNvPr>
@@ -14205,10 +14169,9 @@
           <a:lstStyle/>
           <a:p>
             <a:r>
-              <a:rPr lang="en-US" b="1"/>
+              <a:rPr lang="en-US" sz="4000" b="1" dirty="0"/>
               <a:t>Introduction</a:t>
             </a:r>
-            <a:endParaRPr lang="en-US" b="1" dirty="0"/>
           </a:p>
         </p:txBody>
       </p:sp>
@@ -14217,7 +14180,7 @@
           <p:cNvPr id="3" name="Content Placeholder 2">
             <a:extLst>
               <a:ext uri="{FF2B5EF4-FFF2-40B4-BE49-F238E27FC236}">
-                <a16:creationId xmlns:a16="http://schemas.microsoft.com/office/drawing/2014/main" xmlns="" id="{316A26FA-5144-4898-BD05-6AD0496394ED}"/>
+                <a16:creationId xmlns:a16="http://schemas.microsoft.com/office/drawing/2014/main" id="{316A26FA-5144-4898-BD05-6AD0496394ED}"/>
               </a:ext>
             </a:extLst>
           </p:cNvPr>
@@ -14230,14 +14193,16 @@
         </p:nvSpPr>
         <p:spPr/>
         <p:txBody>
-          <a:bodyPr/>
+          <a:bodyPr>
+            <a:normAutofit/>
+          </a:bodyPr>
           <a:lstStyle/>
           <a:p>
             <a:pPr marL="0" indent="0" algn="just">
               <a:buNone/>
             </a:pPr>
             <a:r>
-              <a:rPr lang="en-US" dirty="0"/>
+              <a:rPr lang="en-US" sz="2000" dirty="0"/>
               <a:t>Pizza Ordering App is based on a concept of making pizza orders and payments. Here, the user can login, select pizza sets, quantity and proceed towards payment. Other features include viewing full payment receipt which includes each and every detail. Prices will be displayed in BDT currency. This mini project contains limited features, but the essential ones.</a:t>
             </a:r>
           </a:p>
@@ -14278,7 +14243,7 @@
           <p:cNvPr id="2" name="Title 1">
             <a:extLst>
               <a:ext uri="{FF2B5EF4-FFF2-40B4-BE49-F238E27FC236}">
-                <a16:creationId xmlns:a16="http://schemas.microsoft.com/office/drawing/2014/main" xmlns="" id="{93193155-613B-4312-AC5E-07AEAE53FBD3}"/>
+                <a16:creationId xmlns:a16="http://schemas.microsoft.com/office/drawing/2014/main" id="{93193155-613B-4312-AC5E-07AEAE53FBD3}"/>
               </a:ext>
             </a:extLst>
           </p:cNvPr>
@@ -14295,7 +14260,7 @@
           <a:lstStyle/>
           <a:p>
             <a:r>
-              <a:rPr lang="en-US" b="1" dirty="0"/>
+              <a:rPr lang="en-US" sz="4000" b="1" dirty="0"/>
               <a:t>Objectives</a:t>
             </a:r>
           </a:p>
@@ -14306,7 +14271,7 @@
           <p:cNvPr id="3" name="Content Placeholder 2">
             <a:extLst>
               <a:ext uri="{FF2B5EF4-FFF2-40B4-BE49-F238E27FC236}">
-                <a16:creationId xmlns:a16="http://schemas.microsoft.com/office/drawing/2014/main" xmlns="" id="{BF5ECD95-9B0A-4F2B-A563-09B3C772A6E8}"/>
+                <a16:creationId xmlns:a16="http://schemas.microsoft.com/office/drawing/2014/main" id="{BF5ECD95-9B0A-4F2B-A563-09B3C772A6E8}"/>
               </a:ext>
             </a:extLst>
           </p:cNvPr>
@@ -14319,35 +14284,37 @@
         </p:nvSpPr>
         <p:spPr/>
         <p:txBody>
-          <a:bodyPr/>
+          <a:bodyPr>
+            <a:normAutofit/>
+          </a:bodyPr>
           <a:lstStyle/>
           <a:p>
             <a:r>
-              <a:rPr lang="en-US" dirty="0"/>
+              <a:rPr lang="en-US" sz="2000" dirty="0"/>
               <a:t>Build Your Own Pizza</a:t>
             </a:r>
           </a:p>
           <a:p>
             <a:r>
-              <a:rPr lang="en-US" dirty="0"/>
+              <a:rPr lang="en-US" sz="2000" dirty="0"/>
               <a:t>Online Payment</a:t>
             </a:r>
           </a:p>
           <a:p>
             <a:r>
-              <a:rPr lang="en-US" dirty="0"/>
+              <a:rPr lang="en-US" sz="2000" dirty="0"/>
               <a:t>Know Delivery Time</a:t>
             </a:r>
           </a:p>
           <a:p>
             <a:r>
-              <a:rPr lang="en-US" dirty="0"/>
+              <a:rPr lang="en-US" sz="2000" dirty="0"/>
               <a:t>Better Knowledge</a:t>
             </a:r>
           </a:p>
           <a:p>
             <a:r>
-              <a:rPr lang="en-US" dirty="0"/>
+              <a:rPr lang="en-US" sz="2000" dirty="0"/>
               <a:t>Improves Efficiency</a:t>
             </a:r>
           </a:p>
@@ -14388,7 +14355,7 @@
           <p:cNvPr id="2" name="Title 1">
             <a:extLst>
               <a:ext uri="{FF2B5EF4-FFF2-40B4-BE49-F238E27FC236}">
-                <a16:creationId xmlns:a16="http://schemas.microsoft.com/office/drawing/2014/main" xmlns="" id="{DB1F0797-2856-4F73-A957-637216384404}"/>
+                <a16:creationId xmlns:a16="http://schemas.microsoft.com/office/drawing/2014/main" id="{DB1F0797-2856-4F73-A957-637216384404}"/>
               </a:ext>
             </a:extLst>
           </p:cNvPr>
@@ -14405,7 +14372,7 @@
           <a:lstStyle/>
           <a:p>
             <a:r>
-              <a:rPr lang="en-US" b="1" dirty="0"/>
+              <a:rPr lang="en-US" sz="4000" b="1" dirty="0"/>
               <a:t>Scope</a:t>
             </a:r>
           </a:p>
@@ -14416,7 +14383,7 @@
           <p:cNvPr id="3" name="Content Placeholder 2">
             <a:extLst>
               <a:ext uri="{FF2B5EF4-FFF2-40B4-BE49-F238E27FC236}">
-                <a16:creationId xmlns:a16="http://schemas.microsoft.com/office/drawing/2014/main" xmlns="" id="{C34A6749-C050-407B-B65A-95338919C099}"/>
+                <a16:creationId xmlns:a16="http://schemas.microsoft.com/office/drawing/2014/main" id="{C34A6749-C050-407B-B65A-95338919C099}"/>
               </a:ext>
             </a:extLst>
           </p:cNvPr>
@@ -14429,14 +14396,16 @@
         </p:nvSpPr>
         <p:spPr/>
         <p:txBody>
-          <a:bodyPr/>
+          <a:bodyPr>
+            <a:normAutofit/>
+          </a:bodyPr>
           <a:lstStyle/>
           <a:p>
             <a:pPr marL="0" indent="0" algn="just">
               <a:buNone/>
             </a:pPr>
             <a:r>
-              <a:rPr lang="en-US" dirty="0"/>
+              <a:rPr lang="en-US" sz="2000" dirty="0"/>
               <a:t>The scope of the proposed system will be based on the features and functionalities proposed for pizza restaurant which is located in Bashundhara R/a. Online pizza ordering system will be an android based application whose main language of programming will be Java. Its main aim is to simplify and improve the efficiency of the ordering process for both customer and restaurant, minimize manual data entry and ensure data accuracy and security during order placement process.</a:t>
             </a:r>
           </a:p>
@@ -14477,7 +14446,7 @@
           <p:cNvPr id="2" name="Title 1">
             <a:extLst>
               <a:ext uri="{FF2B5EF4-FFF2-40B4-BE49-F238E27FC236}">
-                <a16:creationId xmlns:a16="http://schemas.microsoft.com/office/drawing/2014/main" xmlns="" id="{A22270A4-3A56-4325-BF56-CB45C33A3805}"/>
+                <a16:creationId xmlns:a16="http://schemas.microsoft.com/office/drawing/2014/main" id="{A22270A4-3A56-4325-BF56-CB45C33A3805}"/>
               </a:ext>
             </a:extLst>
           </p:cNvPr>
@@ -14494,7 +14463,7 @@
           <a:lstStyle/>
           <a:p>
             <a:r>
-              <a:rPr lang="en-US" b="1" dirty="0"/>
+              <a:rPr lang="en-US" sz="4000" b="1" dirty="0"/>
               <a:t>Limitation</a:t>
             </a:r>
           </a:p>
@@ -14505,7 +14474,7 @@
           <p:cNvPr id="3" name="Content Placeholder 2">
             <a:extLst>
               <a:ext uri="{FF2B5EF4-FFF2-40B4-BE49-F238E27FC236}">
-                <a16:creationId xmlns:a16="http://schemas.microsoft.com/office/drawing/2014/main" xmlns="" id="{5570A365-707B-4515-A559-4B633EFFA6B8}"/>
+                <a16:creationId xmlns:a16="http://schemas.microsoft.com/office/drawing/2014/main" id="{5570A365-707B-4515-A559-4B633EFFA6B8}"/>
               </a:ext>
             </a:extLst>
           </p:cNvPr>
@@ -14518,23 +14487,28 @@
         </p:nvSpPr>
         <p:spPr/>
         <p:txBody>
-          <a:bodyPr/>
+          <a:bodyPr>
+            <a:normAutofit/>
+          </a:bodyPr>
           <a:lstStyle/>
           <a:p>
+            <a:pPr algn="just"/>
             <a:r>
-              <a:rPr lang="en-US" dirty="0"/>
+              <a:rPr lang="en-US" sz="2000" dirty="0"/>
               <a:t>Requires internet connection.</a:t>
             </a:r>
           </a:p>
           <a:p>
+            <a:pPr algn="just"/>
             <a:r>
-              <a:rPr lang="en-US" dirty="0"/>
+              <a:rPr lang="en-US" sz="2000" dirty="0"/>
               <a:t>The set back of the system is that the customers targeted are adults with access to android phone.</a:t>
             </a:r>
           </a:p>
           <a:p>
+            <a:pPr algn="just"/>
             <a:r>
-              <a:rPr lang="en-US" dirty="0"/>
+              <a:rPr lang="en-US" sz="2000" dirty="0"/>
               <a:t>The other limitation is that the system will only be convenient to people with a small geographical region.</a:t>
             </a:r>
           </a:p>
@@ -14575,7 +14549,7 @@
           <p:cNvPr id="2" name="Title 1">
             <a:extLst>
               <a:ext uri="{FF2B5EF4-FFF2-40B4-BE49-F238E27FC236}">
-                <a16:creationId xmlns:a16="http://schemas.microsoft.com/office/drawing/2014/main" xmlns="" id="{554BA979-9361-49D7-A193-E9497DD745C8}"/>
+                <a16:creationId xmlns:a16="http://schemas.microsoft.com/office/drawing/2014/main" id="{554BA979-9361-49D7-A193-E9497DD745C8}"/>
               </a:ext>
             </a:extLst>
           </p:cNvPr>
@@ -14592,7 +14566,7 @@
           <a:lstStyle/>
           <a:p>
             <a:r>
-              <a:rPr lang="en-US" b="1" dirty="0"/>
+              <a:rPr lang="en-US" sz="4000" b="1" dirty="0"/>
               <a:t>How it works</a:t>
             </a:r>
           </a:p>
@@ -14603,7 +14577,7 @@
           <p:cNvPr id="3" name="Content Placeholder 2">
             <a:extLst>
               <a:ext uri="{FF2B5EF4-FFF2-40B4-BE49-F238E27FC236}">
-                <a16:creationId xmlns:a16="http://schemas.microsoft.com/office/drawing/2014/main" xmlns="" id="{85BE19C4-BAD8-4D36-8EAB-B14F0535DB0D}"/>
+                <a16:creationId xmlns:a16="http://schemas.microsoft.com/office/drawing/2014/main" id="{85BE19C4-BAD8-4D36-8EAB-B14F0535DB0D}"/>
               </a:ext>
             </a:extLst>
           </p:cNvPr>
@@ -14614,65 +14588,44 @@
             <p:ph idx="1"/>
           </p:nvPr>
         </p:nvSpPr>
-        <p:spPr/>
+        <p:spPr>
+          <a:xfrm>
+            <a:off x="1154955" y="2560320"/>
+            <a:ext cx="8761412" cy="3459480"/>
+          </a:xfrm>
+        </p:spPr>
         <p:txBody>
           <a:bodyPr>
-            <a:normAutofit/>
+            <a:normAutofit fontScale="92500" lnSpcReduction="10000"/>
           </a:bodyPr>
           <a:lstStyle/>
           <a:p>
+            <a:pPr algn="just"/>
             <a:r>
-              <a:rPr lang="en-US" dirty="0" smtClean="0"/>
-              <a:t>Firstly, the </a:t>
+              <a:rPr lang="en-US" sz="2000" dirty="0"/>
+              <a:t>Firstly, the customer has to provide his/her details like name, phone number, address, email id into the registration field. </a:t>
             </a:r>
+          </a:p>
+          <a:p>
+            <a:pPr algn="just"/>
             <a:r>
-              <a:rPr lang="en-US" dirty="0"/>
-              <a:t>customer has to provide his/her details like name, phone number, address, email id into the registration field. </a:t>
+              <a:rPr lang="en-US" sz="2000" dirty="0"/>
+              <a:t>After successfully logging in, the menu will be visible to the customer with the pizza customizations and other non-pizza products on offers along with the prices.</a:t>
             </a:r>
           </a:p>
           <a:p>
+            <a:pPr algn="just"/>
             <a:r>
-              <a:rPr lang="en-US" dirty="0"/>
-              <a:t>After successfully logging in, the menu will be visible to the customer with the pizza customizations and other non-pizza products on </a:t>
+              <a:rPr lang="en-US" sz="2000" dirty="0"/>
+              <a:t>Next, after adding the items to be ordered, the customer will select the type of drop-off process whether it will be a home delivery or a pick up.</a:t>
             </a:r>
+          </a:p>
+          <a:p>
+            <a:pPr algn="just"/>
             <a:r>
-              <a:rPr lang="en-US" dirty="0" smtClean="0"/>
-              <a:t>offers</a:t>
+              <a:rPr lang="en-US" sz="2000" dirty="0"/>
+              <a:t>Lastly, the payment option will be shown to the customer. He/she will choose from the various online payment methods or cash on delivery option.</a:t>
             </a:r>
-            <a:r>
-              <a:rPr lang="en-US" dirty="0"/>
-              <a:t> </a:t>
-            </a:r>
-            <a:r>
-              <a:rPr lang="en-US" dirty="0" smtClean="0"/>
-              <a:t>along with the prices.</a:t>
-            </a:r>
-            <a:endParaRPr lang="en-US" dirty="0"/>
-          </a:p>
-          <a:p>
-            <a:r>
-              <a:rPr lang="en-US" dirty="0"/>
-              <a:t>Next, </a:t>
-            </a:r>
-            <a:r>
-              <a:rPr lang="en-US" dirty="0" smtClean="0"/>
-              <a:t>after adding the items </a:t>
-            </a:r>
-            <a:r>
-              <a:rPr lang="en-US" dirty="0"/>
-              <a:t>to be ordered, the customer will select the type of drop-off process whether it will be a home delivery or a pick up.</a:t>
-            </a:r>
-          </a:p>
-          <a:p>
-            <a:r>
-              <a:rPr lang="en-US" dirty="0"/>
-              <a:t>Lastly, the payment option will be shown to the customer. He/she will choose from the various online payment methods or cash on delivery option</a:t>
-            </a:r>
-            <a:r>
-              <a:rPr lang="en-US" dirty="0" smtClean="0"/>
-              <a:t>.</a:t>
-            </a:r>
-            <a:endParaRPr lang="en-US" dirty="0"/>
           </a:p>
           <a:p>
             <a:endParaRPr lang="en-US" dirty="0"/>
@@ -14714,7 +14667,7 @@
           <p:cNvPr id="2" name="Title 1">
             <a:extLst>
               <a:ext uri="{FF2B5EF4-FFF2-40B4-BE49-F238E27FC236}">
-                <a16:creationId xmlns:a16="http://schemas.microsoft.com/office/drawing/2014/main" xmlns="" id="{F738B851-F72B-4012-8144-A951C269453F}"/>
+                <a16:creationId xmlns:a16="http://schemas.microsoft.com/office/drawing/2014/main" id="{F738B851-F72B-4012-8144-A951C269453F}"/>
               </a:ext>
             </a:extLst>
           </p:cNvPr>
@@ -14731,10 +14684,9 @@
           <a:lstStyle/>
           <a:p>
             <a:r>
-              <a:rPr lang="en-US" b="1"/>
+              <a:rPr lang="en-US" sz="4000" b="1" dirty="0"/>
               <a:t>ER Diagram</a:t>
             </a:r>
-            <a:endParaRPr lang="en-US" b="1" dirty="0"/>
           </a:p>
         </p:txBody>
       </p:sp>
@@ -14743,7 +14695,7 @@
           <p:cNvPr id="5" name="Content Placeholder 4">
             <a:extLst>
               <a:ext uri="{FF2B5EF4-FFF2-40B4-BE49-F238E27FC236}">
-                <a16:creationId xmlns:a16="http://schemas.microsoft.com/office/drawing/2014/main" xmlns="" id="{DC69674D-8240-47D3-99C2-1D9CF40E45AA}"/>
+                <a16:creationId xmlns:a16="http://schemas.microsoft.com/office/drawing/2014/main" id="{DC69674D-8240-47D3-99C2-1D9CF40E45AA}"/>
               </a:ext>
             </a:extLst>
           </p:cNvPr>
@@ -14819,10 +14771,9 @@
           <a:lstStyle/>
           <a:p>
             <a:r>
-              <a:rPr lang="en-US" dirty="0" smtClean="0"/>
-              <a:t>Requirements</a:t>
+              <a:rPr lang="en-US" sz="4000" b="1" dirty="0"/>
+              <a:t>Hardware Requirements</a:t>
             </a:r>
-            <a:endParaRPr lang="en-US" dirty="0"/>
           </a:p>
         </p:txBody>
       </p:sp>
@@ -14843,74 +14794,64 @@
           </a:bodyPr>
           <a:lstStyle/>
           <a:p>
-            <a:pPr marL="0" lvl="0" indent="0">
-              <a:buNone/>
-            </a:pPr>
-            <a:r>
-              <a:rPr lang="en-US" sz="1600" b="1" u="sng" dirty="0"/>
-              <a:t>Hardware Requirements:</a:t>
-            </a:r>
-            <a:endParaRPr lang="en-US" sz="1600" u="sng" dirty="0"/>
-          </a:p>
-          <a:p>
             <a:pPr lvl="0"/>
             <a:r>
-              <a:rPr lang="en-US" sz="1600" b="1" dirty="0"/>
+              <a:rPr lang="en-US" sz="2000" b="1" dirty="0"/>
               <a:t>Processor:</a:t>
             </a:r>
             <a:r>
-              <a:rPr lang="en-US" sz="1600" dirty="0"/>
+              <a:rPr lang="en-US" sz="2000" dirty="0"/>
               <a:t> Intel dual core or above</a:t>
             </a:r>
           </a:p>
           <a:p>
             <a:pPr lvl="0"/>
             <a:r>
-              <a:rPr lang="en-US" sz="1600" b="1" dirty="0"/>
+              <a:rPr lang="en-US" sz="2000" b="1" dirty="0"/>
               <a:t>Processor Speed:</a:t>
             </a:r>
             <a:r>
-              <a:rPr lang="en-US" sz="1600" dirty="0"/>
+              <a:rPr lang="en-US" sz="2000" dirty="0"/>
               <a:t> 1.0GHZ or above</a:t>
             </a:r>
           </a:p>
           <a:p>
             <a:pPr lvl="0"/>
             <a:r>
-              <a:rPr lang="en-US" sz="1600" b="1" dirty="0"/>
+              <a:rPr lang="en-US" sz="2000" b="1" dirty="0"/>
               <a:t>RAM:</a:t>
             </a:r>
             <a:r>
-              <a:rPr lang="en-US" sz="1600" dirty="0"/>
+              <a:rPr lang="en-US" sz="2000" dirty="0"/>
               <a:t> 1 GB RAM or above</a:t>
             </a:r>
           </a:p>
           <a:p>
             <a:pPr lvl="0"/>
             <a:r>
-              <a:rPr lang="en-US" sz="1600" b="1" dirty="0"/>
+              <a:rPr lang="en-US" sz="2000" b="1" dirty="0"/>
               <a:t>Hard Disk:</a:t>
             </a:r>
             <a:r>
-              <a:rPr lang="en-US" sz="1600" dirty="0"/>
+              <a:rPr lang="en-US" sz="2000" dirty="0"/>
               <a:t> 20 GB hard disk or above</a:t>
             </a:r>
           </a:p>
           <a:p>
             <a:pPr lvl="0"/>
             <a:r>
-              <a:rPr lang="en-US" sz="1600" b="1" dirty="0"/>
+              <a:rPr lang="en-US" sz="2000" b="1" dirty="0"/>
               <a:t>Mobile:</a:t>
             </a:r>
             <a:r>
-              <a:rPr lang="en-US" sz="1600" dirty="0"/>
+              <a:rPr lang="en-US" sz="2000" dirty="0"/>
               <a:t> Android phone</a:t>
             </a:r>
           </a:p>
           <a:p>
             <a:pPr lvl="0"/>
             <a:r>
-              <a:rPr lang="en-US" sz="1600" dirty="0"/>
+              <a:rPr lang="en-US" sz="2000" dirty="0"/>
               <a:t>USB flash disk (At least 2GB)</a:t>
             </a:r>
           </a:p>
@@ -14967,7 +14908,10 @@
           <a:bodyPr/>
           <a:lstStyle/>
           <a:p>
-            <a:endParaRPr lang="en-US"/>
+            <a:r>
+              <a:rPr lang="en-US" sz="4000" b="1" dirty="0"/>
+              <a:t>Software Requirements</a:t>
+            </a:r>
           </a:p>
         </p:txBody>
       </p:sp>
@@ -14988,89 +14932,79 @@
           </a:bodyPr>
           <a:lstStyle/>
           <a:p>
-            <a:pPr marL="0" lvl="0" indent="0">
-              <a:buNone/>
-            </a:pPr>
-            <a:r>
-              <a:rPr lang="en-US" b="1" u="sng" dirty="0"/>
-              <a:t>Software Requirements:</a:t>
-            </a:r>
-            <a:endParaRPr lang="en-US" u="sng" dirty="0"/>
-          </a:p>
-          <a:p>
             <a:pPr lvl="0"/>
             <a:r>
-              <a:rPr lang="en-US" b="1" dirty="0"/>
+              <a:rPr lang="en-US" sz="2000" b="1" dirty="0"/>
               <a:t>Operating system:</a:t>
             </a:r>
             <a:r>
-              <a:rPr lang="en-US" dirty="0"/>
+              <a:rPr lang="en-US" sz="2000" dirty="0"/>
               <a:t> Windows XP / windows 7 and Android</a:t>
             </a:r>
           </a:p>
           <a:p>
             <a:pPr lvl="0"/>
             <a:r>
-              <a:rPr lang="en-US" b="1" dirty="0"/>
+              <a:rPr lang="en-US" sz="2000" b="1" dirty="0"/>
               <a:t>Technology:</a:t>
             </a:r>
             <a:r>
-              <a:rPr lang="en-US" dirty="0"/>
+              <a:rPr lang="en-US" sz="2000" dirty="0"/>
               <a:t> Java language </a:t>
             </a:r>
           </a:p>
           <a:p>
             <a:pPr lvl="0"/>
             <a:r>
-              <a:rPr lang="en-US" b="1" dirty="0"/>
+              <a:rPr lang="en-US" sz="2000" b="1" dirty="0"/>
               <a:t>Database:</a:t>
             </a:r>
             <a:r>
-              <a:rPr lang="en-US" dirty="0"/>
+              <a:rPr lang="en-US" sz="2000" dirty="0"/>
               <a:t> Firebase</a:t>
             </a:r>
           </a:p>
           <a:p>
             <a:pPr lvl="0"/>
             <a:r>
-              <a:rPr lang="en-US" dirty="0"/>
+              <a:rPr lang="en-US" sz="2000" dirty="0"/>
               <a:t>Java </a:t>
             </a:r>
             <a:r>
-              <a:rPr lang="en-US" dirty="0" err="1"/>
+              <a:rPr lang="en-US" sz="2000" dirty="0" err="1"/>
               <a:t>sdk</a:t>
             </a:r>
-            <a:endParaRPr lang="en-US" dirty="0"/>
+            <a:endParaRPr lang="en-US" sz="2000" dirty="0"/>
           </a:p>
           <a:p>
             <a:pPr lvl="0"/>
             <a:r>
-              <a:rPr lang="en-US" dirty="0"/>
+              <a:rPr lang="en-US" sz="2000" dirty="0"/>
               <a:t>Android studio</a:t>
             </a:r>
           </a:p>
           <a:p>
             <a:pPr lvl="0"/>
             <a:r>
-              <a:rPr lang="en-US" dirty="0" err="1"/>
+              <a:rPr lang="en-US" sz="2000" dirty="0" err="1"/>
               <a:t>Github</a:t>
             </a:r>
-            <a:endParaRPr lang="en-US" dirty="0"/>
+            <a:endParaRPr lang="en-US" sz="2000" dirty="0"/>
           </a:p>
           <a:p>
             <a:pPr lvl="0"/>
             <a:r>
-              <a:rPr lang="en-US" dirty="0"/>
+              <a:rPr lang="en-US" sz="2000" dirty="0"/>
               <a:t>Slack</a:t>
             </a:r>
           </a:p>
           <a:p>
             <a:pPr lvl="0"/>
             <a:r>
-              <a:rPr lang="en-US" dirty="0" err="1"/>
+              <a:rPr lang="en-US" sz="2000" dirty="0" err="1"/>
               <a:t>Trello</a:t>
             </a:r>
-            <a:endParaRPr lang="en-US" dirty="0"/>
+            <a:endParaRPr lang="en-US" sz="2000" dirty="0"/>
           </a:p>
           <a:p>
             <a:endParaRPr lang="en-US" dirty="0"/>

</xml_diff>